<commit_message>
Atualizados casos de uso
</commit_message>
<xml_diff>
--- a/documentos/Casos de Uso/CasosDeUso_Requisitos.pptx
+++ b/documentos/Casos de Uso/CasosDeUso_Requisitos.pptx
@@ -30,6 +30,7 @@
     <p:sldId id="275" r:id="rId26"/>
     <p:sldId id="276" r:id="rId27"/>
     <p:sldId id="277" r:id="rId28"/>
+    <p:sldId id="278" r:id="rId29"/>
   </p:sldIdLst>
   <p:sldSz cy="5143500" cx="9144000"/>
   <p:notesSz cx="6858000" cy="9144000"/>
@@ -278,7 +279,7 @@
       </p15:sldGuideLst>
     </p:ext>
     <p:ext uri="http://customooxmlschemas.google.com/">
-      <go:slidesCustomData xmlns:go="http://customooxmlschemas.google.com/" r:id="rId29" roundtripDataSignature="AMtx7mjO8aMOSlf+2Qf8Re13ls7xi64XVQ=="/>
+      <go:slidesCustomData xmlns:go="http://customooxmlschemas.google.com/" r:id="rId30" roundtripDataSignature="AMtx7mjuqK4fhT7+5pQ0wAgNYrgr+oTJ6A=="/>
     </p:ext>
   </p:extLst>
 </p:presentation>
@@ -2392,7 +2393,7 @@
       </p:grpSpPr>
       <p:sp>
         <p:nvSpPr>
-          <p:cNvPr id="234" name="Google Shape;234;p18:notes"/>
+          <p:cNvPr id="234" name="Google Shape;234;gf42afdaaeb_0_58:notes"/>
           <p:cNvSpPr/>
           <p:nvPr>
             <p:ph idx="2" type="sldImg"/>
@@ -2437,7 +2438,7 @@
       </p:sp>
       <p:sp>
         <p:nvSpPr>
-          <p:cNvPr id="235" name="Google Shape;235;p18:notes"/>
+          <p:cNvPr id="235" name="Google Shape;235;gf42afdaaeb_0_58:notes"/>
           <p:cNvSpPr txBox="1"/>
           <p:nvPr>
             <p:ph idx="1" type="body"/>
@@ -2495,7 +2496,7 @@
   <p:cSld>
     <p:spTree>
       <p:nvGrpSpPr>
-        <p:cNvPr id="239" name="Shape 239"/>
+        <p:cNvPr id="238" name="Shape 238"/>
         <p:cNvGrpSpPr/>
         <p:nvPr/>
       </p:nvGrpSpPr>
@@ -2509,7 +2510,7 @@
       </p:grpSpPr>
       <p:sp>
         <p:nvSpPr>
-          <p:cNvPr id="240" name="Google Shape;240;p19:notes"/>
+          <p:cNvPr id="239" name="Google Shape;239;p18:notes"/>
           <p:cNvSpPr/>
           <p:nvPr>
             <p:ph idx="2" type="sldImg"/>
@@ -2554,7 +2555,124 @@
       </p:sp>
       <p:sp>
         <p:nvSpPr>
-          <p:cNvPr id="241" name="Google Shape;241;p19:notes"/>
+          <p:cNvPr id="240" name="Google Shape;240;p18:notes"/>
+          <p:cNvSpPr txBox="1"/>
+          <p:nvPr>
+            <p:ph idx="1" type="body"/>
+          </p:nvPr>
+        </p:nvSpPr>
+        <p:spPr>
+          <a:xfrm>
+            <a:off x="685800" y="4343400"/>
+            <a:ext cx="5486400" cy="4114800"/>
+          </a:xfrm>
+          <a:prstGeom prst="rect">
+            <a:avLst/>
+          </a:prstGeom>
+          <a:noFill/>
+          <a:ln>
+            <a:noFill/>
+          </a:ln>
+        </p:spPr>
+        <p:txBody>
+          <a:bodyPr anchorCtr="0" anchor="t" bIns="91425" lIns="91425" spcFirstLastPara="1" rIns="91425" wrap="square" tIns="91425">
+            <a:noAutofit/>
+          </a:bodyPr>
+          <a:lstStyle/>
+          <a:p>
+            <a:pPr indent="0" lvl="0" marL="0" rtl="0" algn="l">
+              <a:lnSpc>
+                <a:spcPct val="100000"/>
+              </a:lnSpc>
+              <a:spcBef>
+                <a:spcPts val="0"/>
+              </a:spcBef>
+              <a:spcAft>
+                <a:spcPts val="0"/>
+              </a:spcAft>
+              <a:buSzPts val="1100"/>
+              <a:buNone/>
+            </a:pPr>
+            <a:r>
+              <a:t/>
+            </a:r>
+            <a:endParaRPr/>
+          </a:p>
+        </p:txBody>
+      </p:sp>
+    </p:spTree>
+  </p:cSld>
+  <p:clrMapOvr>
+    <a:masterClrMapping/>
+  </p:clrMapOvr>
+</p:notes>
+</file>
+
+<file path=ppt/notesSlides/notesSlide23.xml><?xml version="1.0" encoding="utf-8"?>
+<p:notes xmlns:a="http://schemas.openxmlformats.org/drawingml/2006/main" xmlns:r="http://schemas.openxmlformats.org/officeDocument/2006/relationships" xmlns:mc="http://schemas.openxmlformats.org/markup-compatibility/2006" xmlns:mv="urn:schemas-microsoft-com:mac:vml" xmlns:p="http://schemas.openxmlformats.org/presentationml/2006/main" xmlns:c="http://schemas.openxmlformats.org/drawingml/2006/chart" xmlns:dgm="http://schemas.openxmlformats.org/drawingml/2006/diagram" xmlns:o="urn:schemas-microsoft-com:office:office" xmlns:v="urn:schemas-microsoft-com:vml" xmlns:pvml="urn:schemas-microsoft-com:office:powerpoint" xmlns:com="http://schemas.openxmlformats.org/drawingml/2006/compatibility" xmlns:p14="http://schemas.microsoft.com/office/powerpoint/2010/main" xmlns:p15="http://schemas.microsoft.com/office/powerpoint/2012/main" xmlns:ahyp="http://schemas.microsoft.com/office/drawing/2018/hyperlinkcolor" showMasterPhAnim="0" showMasterSp="0">
+  <p:cSld>
+    <p:spTree>
+      <p:nvGrpSpPr>
+        <p:cNvPr id="244" name="Shape 244"/>
+        <p:cNvGrpSpPr/>
+        <p:nvPr/>
+      </p:nvGrpSpPr>
+      <p:grpSpPr>
+        <a:xfrm>
+          <a:off x="0" y="0"/>
+          <a:ext cx="0" cy="0"/>
+          <a:chOff x="0" y="0"/>
+          <a:chExt cx="0" cy="0"/>
+        </a:xfrm>
+      </p:grpSpPr>
+      <p:sp>
+        <p:nvSpPr>
+          <p:cNvPr id="245" name="Google Shape;245;p19:notes"/>
+          <p:cNvSpPr/>
+          <p:nvPr>
+            <p:ph idx="2" type="sldImg"/>
+          </p:nvPr>
+        </p:nvSpPr>
+        <p:spPr>
+          <a:xfrm>
+            <a:off x="381000" y="685800"/>
+            <a:ext cx="6096000" cy="3429000"/>
+          </a:xfrm>
+          <a:custGeom>
+            <a:rect b="b" l="l" r="r" t="t"/>
+            <a:pathLst>
+              <a:path extrusionOk="0" h="120000" w="120000">
+                <a:moveTo>
+                  <a:pt x="0" y="0"/>
+                </a:moveTo>
+                <a:lnTo>
+                  <a:pt x="120000" y="0"/>
+                </a:lnTo>
+                <a:lnTo>
+                  <a:pt x="120000" y="120000"/>
+                </a:lnTo>
+                <a:lnTo>
+                  <a:pt x="0" y="120000"/>
+                </a:lnTo>
+                <a:close/>
+              </a:path>
+            </a:pathLst>
+          </a:custGeom>
+          <a:noFill/>
+          <a:ln cap="flat" cmpd="sng" w="9525">
+            <a:solidFill>
+              <a:srgbClr val="000000"/>
+            </a:solidFill>
+            <a:prstDash val="solid"/>
+            <a:round/>
+            <a:headEnd len="sm" w="sm" type="none"/>
+            <a:tailEnd len="sm" w="sm" type="none"/>
+          </a:ln>
+        </p:spPr>
+      </p:sp>
+      <p:sp>
+        <p:nvSpPr>
+          <p:cNvPr id="246" name="Google Shape;246;p19:notes"/>
           <p:cNvSpPr txBox="1"/>
           <p:nvPr>
             <p:ph idx="1" type="body"/>
@@ -19553,7 +19671,7 @@
             <a:tbl>
               <a:tblPr>
                 <a:noFill/>
-                <a:tableStyleId>{2FBA5331-9FB4-4AE7-B17D-9EC093DBF87E}</a:tableStyleId>
+                <a:tableStyleId>{50B2C5D1-D99D-4A31-A7E5-88A7BF6D1CC2}</a:tableStyleId>
               </a:tblPr>
               <a:tblGrid>
                 <a:gridCol w="2049100"/>
@@ -19610,14 +19728,21 @@
                           <a:schemeClr val="dk1"/>
                         </a:buClr>
                         <a:buSzPts val="1400"/>
-                        <a:buFont typeface="Arial"/>
                         <a:buAutoNum type="arabicPeriod"/>
                       </a:pPr>
                       <a:r>
-                        <a:rPr lang="pt-BR" sz="1350" u="none" cap="none" strike="noStrike"/>
-                        <a:t>O administrador acessa a listagem de produtos</a:t>
-                      </a:r>
-                      <a:endParaRPr sz="1350" u="none" cap="none" strike="noStrike"/>
+                        <a:rPr lang="pt-BR" sz="1350"/>
+                        <a:t>Administrador acessa a área de controle de usuários em seu </a:t>
+                      </a:r>
+                      <a:r>
+                        <a:rPr lang="pt-BR" sz="1350"/>
+                        <a:t>p</a:t>
+                      </a:r>
+                      <a:r>
+                        <a:rPr lang="pt-BR" sz="1350"/>
+                        <a:t>ainel</a:t>
+                      </a:r>
+                      <a:endParaRPr sz="1350"/>
                     </a:p>
                     <a:p>
                       <a:pPr indent="-317500" lvl="0" marL="457200" marR="0" rtl="0" algn="l">
@@ -19634,14 +19759,13 @@
                           <a:schemeClr val="dk1"/>
                         </a:buClr>
                         <a:buSzPts val="1400"/>
-                        <a:buFont typeface="Arial"/>
                         <a:buAutoNum type="arabicPeriod"/>
                       </a:pPr>
                       <a:r>
-                        <a:rPr lang="pt-BR" sz="1350" u="none" cap="none" strike="noStrike"/>
-                        <a:t>O sistema retorna a listagem de produtos</a:t>
-                      </a:r>
-                      <a:endParaRPr sz="1350" u="none" cap="none" strike="noStrike"/>
+                        <a:rPr lang="pt-BR" sz="1350"/>
+                        <a:t>Administrador seleciona para editar um dos usuários já cadastrados</a:t>
+                      </a:r>
+                      <a:endParaRPr sz="1350"/>
                     </a:p>
                     <a:p>
                       <a:pPr indent="-317500" lvl="0" marL="457200" marR="0" rtl="0" algn="l">
@@ -19658,14 +19782,13 @@
                           <a:schemeClr val="dk1"/>
                         </a:buClr>
                         <a:buSzPts val="1400"/>
-                        <a:buFont typeface="Arial"/>
                         <a:buAutoNum type="arabicPeriod"/>
                       </a:pPr>
                       <a:r>
-                        <a:rPr lang="pt-BR" sz="1350" u="none" cap="none" strike="noStrike"/>
-                        <a:t>O administrador filtra pelo produto desejado</a:t>
-                      </a:r>
-                      <a:endParaRPr sz="1350" u="none" cap="none" strike="noStrike"/>
+                        <a:rPr lang="pt-BR" sz="1350"/>
+                        <a:t>Administrador altera o nome do usuário</a:t>
+                      </a:r>
+                      <a:endParaRPr sz="1350"/>
                     </a:p>
                     <a:p>
                       <a:pPr indent="-317500" lvl="0" marL="457200" marR="0" rtl="0" algn="l">
@@ -19682,14 +19805,13 @@
                           <a:schemeClr val="dk1"/>
                         </a:buClr>
                         <a:buSzPts val="1400"/>
-                        <a:buFont typeface="Arial"/>
                         <a:buAutoNum type="arabicPeriod"/>
                       </a:pPr>
                       <a:r>
-                        <a:rPr lang="pt-BR" sz="1350" u="none" cap="none" strike="noStrike"/>
-                        <a:t>O sistema retorna uma listagem de produtos com base nos dados do filtro</a:t>
-                      </a:r>
-                      <a:endParaRPr sz="1350" u="none" cap="none" strike="noStrike"/>
+                        <a:rPr lang="pt-BR" sz="1350"/>
+                        <a:t>Administrador salva a edição dos dados</a:t>
+                      </a:r>
+                      <a:endParaRPr sz="1350"/>
                     </a:p>
                     <a:p>
                       <a:pPr indent="-317500" lvl="0" marL="457200" marR="0" rtl="0" algn="l">
@@ -19706,14 +19828,13 @@
                           <a:schemeClr val="dk1"/>
                         </a:buClr>
                         <a:buSzPts val="1400"/>
-                        <a:buFont typeface="Arial"/>
                         <a:buAutoNum type="arabicPeriod"/>
                       </a:pPr>
                       <a:r>
-                        <a:rPr lang="pt-BR" sz="1350" u="none" cap="none" strike="noStrike"/>
-                        <a:t>O administrador seleciona para editar o produto desejado</a:t>
-                      </a:r>
-                      <a:endParaRPr sz="1350" u="none" cap="none" strike="noStrike"/>
+                        <a:rPr lang="pt-BR" sz="1350"/>
+                        <a:t>Sistema informa que o cadastro foi atualizado com sucesso</a:t>
+                      </a:r>
+                      <a:endParaRPr sz="1350"/>
                     </a:p>
                     <a:p>
                       <a:pPr indent="-317500" lvl="0" marL="457200" marR="0" rtl="0" algn="l">
@@ -19730,86 +19851,13 @@
                           <a:schemeClr val="dk1"/>
                         </a:buClr>
                         <a:buSzPts val="1400"/>
-                        <a:buFont typeface="Arial"/>
                         <a:buAutoNum type="arabicPeriod"/>
                       </a:pPr>
                       <a:r>
-                        <a:rPr lang="pt-BR" sz="1350" u="none" cap="none" strike="noStrike"/>
-                        <a:t>O sistema abre a tela de edição do produto</a:t>
-                      </a:r>
-                      <a:endParaRPr sz="1350" u="none" cap="none" strike="noStrike"/>
-                    </a:p>
-                    <a:p>
-                      <a:pPr indent="-317500" lvl="0" marL="457200" marR="0" rtl="0" algn="l">
-                        <a:lnSpc>
-                          <a:spcPct val="100000"/>
-                        </a:lnSpc>
-                        <a:spcBef>
-                          <a:spcPts val="0"/>
-                        </a:spcBef>
-                        <a:spcAft>
-                          <a:spcPts val="0"/>
-                        </a:spcAft>
-                        <a:buClr>
-                          <a:schemeClr val="dk1"/>
-                        </a:buClr>
-                        <a:buSzPts val="1400"/>
-                        <a:buFont typeface="Arial"/>
-                        <a:buAutoNum type="arabicPeriod"/>
-                      </a:pPr>
-                      <a:r>
-                        <a:rPr lang="pt-BR" sz="1350" u="none" cap="none" strike="noStrike"/>
-                        <a:t>O administrador altera os dados que deseja no cadastro do produto</a:t>
-                      </a:r>
-                      <a:endParaRPr sz="1350" u="none" cap="none" strike="noStrike"/>
-                    </a:p>
-                    <a:p>
-                      <a:pPr indent="-317500" lvl="0" marL="457200" marR="0" rtl="0" algn="l">
-                        <a:lnSpc>
-                          <a:spcPct val="100000"/>
-                        </a:lnSpc>
-                        <a:spcBef>
-                          <a:spcPts val="0"/>
-                        </a:spcBef>
-                        <a:spcAft>
-                          <a:spcPts val="0"/>
-                        </a:spcAft>
-                        <a:buClr>
-                          <a:schemeClr val="dk1"/>
-                        </a:buClr>
-                        <a:buSzPts val="1400"/>
-                        <a:buFont typeface="Arial"/>
-                        <a:buAutoNum type="arabicPeriod"/>
-                      </a:pPr>
-                      <a:r>
-                        <a:rPr lang="pt-BR" sz="1350" u="none" cap="none" strike="noStrike"/>
-                        <a:t>O administrador salva a edição dos dados</a:t>
-                      </a:r>
-                      <a:endParaRPr sz="1350" u="none" cap="none" strike="noStrike"/>
-                    </a:p>
-                    <a:p>
-                      <a:pPr indent="-317500" lvl="0" marL="457200" marR="0" rtl="0" algn="l">
-                        <a:lnSpc>
-                          <a:spcPct val="100000"/>
-                        </a:lnSpc>
-                        <a:spcBef>
-                          <a:spcPts val="0"/>
-                        </a:spcBef>
-                        <a:spcAft>
-                          <a:spcPts val="0"/>
-                        </a:spcAft>
-                        <a:buClr>
-                          <a:schemeClr val="dk1"/>
-                        </a:buClr>
-                        <a:buSzPts val="1400"/>
-                        <a:buFont typeface="Arial"/>
-                        <a:buAutoNum type="arabicPeriod"/>
-                      </a:pPr>
-                      <a:r>
-                        <a:rPr lang="pt-BR" sz="1350" u="none" cap="none" strike="noStrike"/>
-                        <a:t>O sistema retorna uma mensagem de sucesso para a edição realizada</a:t>
-                      </a:r>
-                      <a:endParaRPr sz="1350" u="none" cap="none" strike="noStrike"/>
+                        <a:rPr lang="pt-BR" sz="1350"/>
+                        <a:t>Sistema retorna para a tela de controle de usuários</a:t>
+                      </a:r>
+                      <a:endParaRPr sz="1350"/>
                     </a:p>
                   </a:txBody>
                   <a:tcPr marT="91425" marB="91425" marR="91425" marL="91425"/>
@@ -19982,7 +20030,7 @@
             <a:tbl>
               <a:tblPr>
                 <a:noFill/>
-                <a:tableStyleId>{2FBA5331-9FB4-4AE7-B17D-9EC093DBF87E}</a:tableStyleId>
+                <a:tableStyleId>{50B2C5D1-D99D-4A31-A7E5-88A7BF6D1CC2}</a:tableStyleId>
               </a:tblPr>
               <a:tblGrid>
                 <a:gridCol w="2053225"/>
@@ -20044,7 +20092,11 @@
                       </a:pPr>
                       <a:r>
                         <a:rPr lang="pt-BR" sz="1350" u="none" cap="none" strike="noStrike"/>
-                        <a:t>UC4 - Cadastrar novo usuário</a:t>
+                        <a:t>UC4 - </a:t>
+                      </a:r>
+                      <a:r>
+                        <a:rPr lang="pt-BR" sz="1350"/>
+                        <a:t>Redefinir senha do usuário</a:t>
                       </a:r>
                       <a:endParaRPr sz="1350" u="none" cap="none" strike="noStrike"/>
                     </a:p>
@@ -20171,8 +20223,8 @@
                         <a:buNone/>
                       </a:pPr>
                       <a:r>
-                        <a:rPr lang="pt-BR" sz="1350" u="none" cap="none" strike="noStrike"/>
-                        <a:t>O administrador deseja cadastrar um novo administrador ou operador de caixa</a:t>
+                        <a:rPr lang="pt-BR" sz="1350"/>
+                        <a:t>O administrador deseja redefinir a senha de um usuário que esqueceu qual era sua senha</a:t>
                       </a:r>
                       <a:endParaRPr sz="1350" u="none" cap="none" strike="noStrike"/>
                     </a:p>
@@ -20235,8 +20287,8 @@
                         <a:buNone/>
                       </a:pPr>
                       <a:r>
-                        <a:rPr lang="pt-BR" sz="1350" u="none" cap="none" strike="noStrike"/>
-                        <a:t>UC1</a:t>
+                        <a:rPr lang="pt-BR" sz="1350"/>
+                        <a:t>UC1, UC2</a:t>
                       </a:r>
                       <a:endParaRPr sz="1350" u="none" cap="none" strike="noStrike"/>
                     </a:p>
@@ -20299,12 +20351,12 @@
                         <a:buNone/>
                       </a:pPr>
                       <a:r>
-                        <a:rPr lang="pt-BR" sz="1350" u="none" cap="none" strike="noStrike">
+                        <a:rPr lang="pt-BR" sz="1350">
                           <a:solidFill>
                             <a:schemeClr val="dk1"/>
                           </a:solidFill>
                         </a:rPr>
-                        <a:t>Acessar a funcionalidade de cadastro de usuários</a:t>
+                        <a:t>Acessar a funcionalidade de redefinir senha de um usuário no painel do administrador</a:t>
                       </a:r>
                       <a:endParaRPr sz="1350" u="none" cap="none" strike="noStrike"/>
                     </a:p>
@@ -20367,12 +20419,44 @@
                         <a:buNone/>
                       </a:pPr>
                       <a:r>
-                        <a:rPr lang="pt-BR" sz="1350" u="none" cap="none" strike="noStrike">
+                        <a:rPr lang="pt-BR" sz="1350">
                           <a:solidFill>
                             <a:schemeClr val="dk1"/>
                           </a:solidFill>
                         </a:rPr>
                         <a:t>Administrador autenticado no sistema</a:t>
+                      </a:r>
+                      <a:endParaRPr sz="1350">
+                        <a:solidFill>
+                          <a:schemeClr val="dk1"/>
+                        </a:solidFill>
+                      </a:endParaRPr>
+                    </a:p>
+                    <a:p>
+                      <a:pPr indent="0" lvl="0" marL="0" marR="0" rtl="0" algn="l">
+                        <a:lnSpc>
+                          <a:spcPct val="100000"/>
+                        </a:lnSpc>
+                        <a:spcBef>
+                          <a:spcPts val="0"/>
+                        </a:spcBef>
+                        <a:spcAft>
+                          <a:spcPts val="0"/>
+                        </a:spcAft>
+                        <a:buClr>
+                          <a:schemeClr val="dk1"/>
+                        </a:buClr>
+                        <a:buSzPts val="1350"/>
+                        <a:buFont typeface="Arial"/>
+                        <a:buNone/>
+                      </a:pPr>
+                      <a:r>
+                        <a:rPr lang="pt-BR" sz="1350">
+                          <a:solidFill>
+                            <a:schemeClr val="dk1"/>
+                          </a:solidFill>
+                        </a:rPr>
+                        <a:t>Usuário cadastrado</a:t>
                       </a:r>
                       <a:endParaRPr sz="1350" u="none" cap="none" strike="noStrike"/>
                     </a:p>
@@ -20435,8 +20519,8 @@
                         <a:buNone/>
                       </a:pPr>
                       <a:r>
-                        <a:rPr lang="pt-BR" sz="1350" u="none" cap="none" strike="noStrike"/>
-                        <a:t>Novo usuário cadastrado no sistema</a:t>
+                        <a:rPr lang="pt-BR" sz="1350"/>
+                        <a:t>Nova senha temporária para o usuário gerada</a:t>
                       </a:r>
                       <a:endParaRPr sz="1350" u="none" cap="none" strike="noStrike"/>
                     </a:p>
@@ -20488,7 +20572,7 @@
             <a:tbl>
               <a:tblPr>
                 <a:noFill/>
-                <a:tableStyleId>{2FBA5331-9FB4-4AE7-B17D-9EC093DBF87E}</a:tableStyleId>
+                <a:tableStyleId>{50B2C5D1-D99D-4A31-A7E5-88A7BF6D1CC2}</a:tableStyleId>
               </a:tblPr>
               <a:tblGrid>
                 <a:gridCol w="2053225"/>
@@ -20531,7 +20615,7 @@
                     <a:bodyPr/>
                     <a:lstStyle/>
                     <a:p>
-                      <a:pPr indent="-317500" lvl="0" marL="457200" marR="0" rtl="0" algn="l">
+                      <a:pPr indent="-314325" lvl="0" marL="457200" marR="0" rtl="0" algn="l">
                         <a:lnSpc>
                           <a:spcPct val="100000"/>
                         </a:lnSpc>
@@ -20544,26 +20628,25 @@
                         <a:buClr>
                           <a:schemeClr val="dk1"/>
                         </a:buClr>
-                        <a:buSzPts val="1400"/>
-                        <a:buFont typeface="Arial"/>
+                        <a:buSzPts val="1350"/>
                         <a:buAutoNum type="arabicPeriod"/>
                       </a:pPr>
                       <a:r>
-                        <a:rPr lang="pt-BR" sz="1350" u="none" cap="none" strike="noStrike">
+                        <a:rPr lang="pt-BR" sz="1350">
                           <a:solidFill>
                             <a:schemeClr val="dk1"/>
                           </a:solidFill>
                         </a:rPr>
-                        <a:t>Administrador acessa a área de cadastro de usuários</a:t>
-                      </a:r>
-                      <a:endParaRPr sz="1350" u="none" cap="none" strike="noStrike">
+                        <a:t>Administrador acessa a área de controle de usuários em seu painel</a:t>
+                      </a:r>
+                      <a:endParaRPr sz="1350">
                         <a:solidFill>
                           <a:schemeClr val="dk1"/>
                         </a:solidFill>
                       </a:endParaRPr>
                     </a:p>
                     <a:p>
-                      <a:pPr indent="-317500" lvl="0" marL="457200" marR="0" rtl="0" algn="l">
+                      <a:pPr indent="-314325" lvl="0" marL="457200" marR="0" rtl="0" algn="l">
                         <a:lnSpc>
                           <a:spcPct val="100000"/>
                         </a:lnSpc>
@@ -20576,26 +20659,25 @@
                         <a:buClr>
                           <a:schemeClr val="dk1"/>
                         </a:buClr>
-                        <a:buSzPts val="1400"/>
-                        <a:buFont typeface="Arial"/>
+                        <a:buSzPts val="1350"/>
                         <a:buAutoNum type="arabicPeriod"/>
                       </a:pPr>
                       <a:r>
-                        <a:rPr lang="pt-BR" sz="1350" u="none" cap="none" strike="noStrike">
+                        <a:rPr lang="pt-BR" sz="1350">
                           <a:solidFill>
                             <a:schemeClr val="dk1"/>
                           </a:solidFill>
                         </a:rPr>
-                        <a:t>Administrador seleciona para cadastrar um novo usuário</a:t>
-                      </a:r>
-                      <a:endParaRPr sz="1350" u="none" cap="none" strike="noStrike">
+                        <a:t>Administrador seleciona o usuário cuja senha deseja redefinir</a:t>
+                      </a:r>
+                      <a:endParaRPr sz="1350">
                         <a:solidFill>
                           <a:schemeClr val="dk1"/>
                         </a:solidFill>
                       </a:endParaRPr>
                     </a:p>
                     <a:p>
-                      <a:pPr indent="-317500" lvl="0" marL="457200" marR="0" rtl="0" algn="l">
+                      <a:pPr indent="-314325" lvl="0" marL="457200" marR="0" rtl="0" algn="l">
                         <a:lnSpc>
                           <a:spcPct val="100000"/>
                         </a:lnSpc>
@@ -20608,34 +20690,25 @@
                         <a:buClr>
                           <a:schemeClr val="dk1"/>
                         </a:buClr>
-                        <a:buSzPts val="1400"/>
-                        <a:buFont typeface="Arial"/>
+                        <a:buSzPts val="1350"/>
                         <a:buAutoNum type="arabicPeriod"/>
                       </a:pPr>
-                      <a:r>
-                        <a:rPr lang="pt-BR" sz="1350" u="none" cap="none" strike="noStrike">
-                          <a:solidFill>
-                            <a:schemeClr val="dk1"/>
-                          </a:solidFill>
-                        </a:rPr>
-                        <a:t>Administrador preenche o</a:t>
-                      </a:r>
                       <a:r>
                         <a:rPr lang="pt-BR" sz="1350">
                           <a:solidFill>
                             <a:schemeClr val="dk1"/>
                           </a:solidFill>
                         </a:rPr>
-                        <a:t> nome, cpf e data de nascimento do usuário</a:t>
-                      </a:r>
-                      <a:endParaRPr sz="1350" u="none" cap="none" strike="noStrike">
+                        <a:t>Administrador seleciona “Redefinir senha”</a:t>
+                      </a:r>
+                      <a:endParaRPr sz="1350">
                         <a:solidFill>
                           <a:schemeClr val="dk1"/>
                         </a:solidFill>
                       </a:endParaRPr>
                     </a:p>
                     <a:p>
-                      <a:pPr indent="-317500" lvl="0" marL="457200" marR="0" rtl="0" algn="l">
+                      <a:pPr indent="-314325" lvl="0" marL="457200" marR="0" rtl="0" algn="l">
                         <a:lnSpc>
                           <a:spcPct val="100000"/>
                         </a:lnSpc>
@@ -20648,26 +20721,25 @@
                         <a:buClr>
                           <a:schemeClr val="dk1"/>
                         </a:buClr>
-                        <a:buSzPts val="1400"/>
-                        <a:buFont typeface="Arial"/>
+                        <a:buSzPts val="1350"/>
                         <a:buAutoNum type="arabicPeriod"/>
                       </a:pPr>
                       <a:r>
-                        <a:rPr lang="pt-BR" sz="1350" u="none" cap="none" strike="noStrike">
+                        <a:rPr lang="pt-BR" sz="1350">
                           <a:solidFill>
                             <a:schemeClr val="dk1"/>
                           </a:solidFill>
                         </a:rPr>
-                        <a:t>Administrador salva o usuário</a:t>
-                      </a:r>
-                      <a:endParaRPr sz="1350" u="none" cap="none" strike="noStrike">
+                        <a:t>Sistema pede uma confirmação para a ação</a:t>
+                      </a:r>
+                      <a:endParaRPr sz="1350">
                         <a:solidFill>
                           <a:schemeClr val="dk1"/>
                         </a:solidFill>
                       </a:endParaRPr>
                     </a:p>
                     <a:p>
-                      <a:pPr indent="-317500" lvl="0" marL="457200" marR="0" rtl="0" algn="l">
+                      <a:pPr indent="-314325" lvl="0" marL="457200" marR="0" rtl="0" algn="l">
                         <a:lnSpc>
                           <a:spcPct val="100000"/>
                         </a:lnSpc>
@@ -20680,19 +20752,173 @@
                         <a:buClr>
                           <a:schemeClr val="dk1"/>
                         </a:buClr>
-                        <a:buSzPts val="1400"/>
-                        <a:buFont typeface="Arial"/>
+                        <a:buSzPts val="1350"/>
                         <a:buAutoNum type="arabicPeriod"/>
                       </a:pPr>
                       <a:r>
-                        <a:rPr lang="pt-BR" sz="1350" u="none" cap="none" strike="noStrike">
+                        <a:rPr lang="pt-BR" sz="1350">
                           <a:solidFill>
                             <a:schemeClr val="dk1"/>
                           </a:solidFill>
                         </a:rPr>
-                        <a:t>O sistema informa que o cadastro foi realizado com sucesso</a:t>
-                      </a:r>
-                      <a:endParaRPr sz="1350" u="none" cap="none" strike="noStrike">
+                        <a:t>Administrador confirma a redefinição de senha</a:t>
+                      </a:r>
+                      <a:endParaRPr sz="1350">
+                        <a:solidFill>
+                          <a:schemeClr val="dk1"/>
+                        </a:solidFill>
+                      </a:endParaRPr>
+                    </a:p>
+                    <a:p>
+                      <a:pPr indent="-314325" lvl="0" marL="457200" marR="0" rtl="0" algn="l">
+                        <a:lnSpc>
+                          <a:spcPct val="100000"/>
+                        </a:lnSpc>
+                        <a:spcBef>
+                          <a:spcPts val="0"/>
+                        </a:spcBef>
+                        <a:spcAft>
+                          <a:spcPts val="0"/>
+                        </a:spcAft>
+                        <a:buClr>
+                          <a:schemeClr val="dk1"/>
+                        </a:buClr>
+                        <a:buSzPts val="1350"/>
+                        <a:buAutoNum type="arabicPeriod"/>
+                      </a:pPr>
+                      <a:r>
+                        <a:rPr lang="pt-BR" sz="1350">
+                          <a:solidFill>
+                            <a:schemeClr val="dk1"/>
+                          </a:solidFill>
+                        </a:rPr>
+                        <a:t>Sistema redefine senha do usuário</a:t>
+                      </a:r>
+                      <a:endParaRPr sz="1350">
+                        <a:solidFill>
+                          <a:schemeClr val="dk1"/>
+                        </a:solidFill>
+                      </a:endParaRPr>
+                    </a:p>
+                    <a:p>
+                      <a:pPr indent="-314325" lvl="0" marL="457200" marR="0" rtl="0" algn="l">
+                        <a:lnSpc>
+                          <a:spcPct val="100000"/>
+                        </a:lnSpc>
+                        <a:spcBef>
+                          <a:spcPts val="0"/>
+                        </a:spcBef>
+                        <a:spcAft>
+                          <a:spcPts val="0"/>
+                        </a:spcAft>
+                        <a:buClr>
+                          <a:schemeClr val="dk1"/>
+                        </a:buClr>
+                        <a:buSzPts val="1350"/>
+                        <a:buAutoNum type="arabicPeriod"/>
+                      </a:pPr>
+                      <a:r>
+                        <a:rPr lang="pt-BR" sz="1350">
+                          <a:solidFill>
+                            <a:schemeClr val="dk1"/>
+                          </a:solidFill>
+                        </a:rPr>
+                        <a:t>Sistema retorna para o administrador nova senha temporária do usuário</a:t>
+                      </a:r>
+                      <a:endParaRPr sz="1350">
+                        <a:solidFill>
+                          <a:schemeClr val="dk1"/>
+                        </a:solidFill>
+                      </a:endParaRPr>
+                    </a:p>
+                    <a:p>
+                      <a:pPr indent="-314325" lvl="0" marL="457200" marR="0" rtl="0" algn="l">
+                        <a:lnSpc>
+                          <a:spcPct val="100000"/>
+                        </a:lnSpc>
+                        <a:spcBef>
+                          <a:spcPts val="0"/>
+                        </a:spcBef>
+                        <a:spcAft>
+                          <a:spcPts val="0"/>
+                        </a:spcAft>
+                        <a:buClr>
+                          <a:schemeClr val="dk1"/>
+                        </a:buClr>
+                        <a:buSzPts val="1350"/>
+                        <a:buAutoNum type="arabicPeriod"/>
+                      </a:pPr>
+                      <a:r>
+                        <a:rPr lang="pt-BR" sz="1350">
+                          <a:solidFill>
+                            <a:schemeClr val="dk1"/>
+                          </a:solidFill>
+                        </a:rPr>
+                        <a:t>Administrador seleciona para copiar a senha temporária</a:t>
+                      </a:r>
+                      <a:endParaRPr sz="1350">
+                        <a:solidFill>
+                          <a:schemeClr val="dk1"/>
+                        </a:solidFill>
+                      </a:endParaRPr>
+                    </a:p>
+                    <a:p>
+                      <a:pPr indent="-314325" lvl="0" marL="457200" marR="0" rtl="0" algn="l">
+                        <a:lnSpc>
+                          <a:spcPct val="100000"/>
+                        </a:lnSpc>
+                        <a:spcBef>
+                          <a:spcPts val="0"/>
+                        </a:spcBef>
+                        <a:spcAft>
+                          <a:spcPts val="0"/>
+                        </a:spcAft>
+                        <a:buClr>
+                          <a:schemeClr val="dk1"/>
+                        </a:buClr>
+                        <a:buSzPts val="1350"/>
+                        <a:buAutoNum type="arabicPeriod"/>
+                      </a:pPr>
+                      <a:r>
+                        <a:rPr lang="pt-BR" sz="1350">
+                          <a:solidFill>
+                            <a:schemeClr val="dk1"/>
+                          </a:solidFill>
+                        </a:rPr>
+                        <a:t>Administrador seleciona para voltar para o painel de controle</a:t>
+                      </a:r>
+                      <a:endParaRPr sz="1350">
+                        <a:solidFill>
+                          <a:schemeClr val="dk1"/>
+                        </a:solidFill>
+                      </a:endParaRPr>
+                    </a:p>
+                    <a:p>
+                      <a:pPr indent="-314325" lvl="0" marL="457200" marR="0" rtl="0" algn="l">
+                        <a:lnSpc>
+                          <a:spcPct val="100000"/>
+                        </a:lnSpc>
+                        <a:spcBef>
+                          <a:spcPts val="0"/>
+                        </a:spcBef>
+                        <a:spcAft>
+                          <a:spcPts val="0"/>
+                        </a:spcAft>
+                        <a:buClr>
+                          <a:schemeClr val="dk1"/>
+                        </a:buClr>
+                        <a:buSzPts val="1350"/>
+                        <a:buAutoNum type="arabicPeriod"/>
+                      </a:pPr>
+                      <a:r>
+                        <a:rPr lang="pt-BR" sz="1350">
+                          <a:solidFill>
+                            <a:schemeClr val="dk1"/>
+                          </a:solidFill>
+                        </a:rPr>
+                        <a:t>Sistema retorna para a tela de controle de usuários</a:t>
+                      </a:r>
+                      <a:endParaRPr sz="1350">
                         <a:solidFill>
                           <a:schemeClr val="dk1"/>
                         </a:solidFill>
@@ -20719,7 +20945,11 @@
                       <a:r>
                         <a:t/>
                       </a:r>
-                      <a:endParaRPr sz="1350" u="none" cap="none" strike="noStrike"/>
+                      <a:endParaRPr sz="1350">
+                        <a:solidFill>
+                          <a:schemeClr val="dk1"/>
+                        </a:solidFill>
+                      </a:endParaRPr>
                     </a:p>
                   </a:txBody>
                   <a:tcPr marT="91425" marB="91425" marR="91425" marL="91425"/>
@@ -20762,9 +20992,9 @@
                     <a:bodyPr/>
                     <a:lstStyle/>
                     <a:p>
-                      <a:pPr indent="0" lvl="0" marL="0" marR="0" rtl="0" algn="l">
+                      <a:pPr indent="0" lvl="0" marL="0" rtl="0" algn="l">
                         <a:lnSpc>
-                          <a:spcPct val="100000"/>
+                          <a:spcPct val="115000"/>
                         </a:lnSpc>
                         <a:spcBef>
                           <a:spcPts val="0"/>
@@ -20773,16 +21003,41 @@
                           <a:spcPts val="0"/>
                         </a:spcAft>
                         <a:buClr>
-                          <a:schemeClr val="lt1"/>
+                          <a:schemeClr val="dk1"/>
                         </a:buClr>
-                        <a:buSzPts val="1350"/>
+                        <a:buSzPts val="1100"/>
                         <a:buFont typeface="Arial"/>
                         <a:buNone/>
                       </a:pPr>
                       <a:r>
-                        <a:t/>
-                      </a:r>
-                      <a:endParaRPr sz="1350" u="none" cap="none" strike="noStrike"/>
+                        <a:rPr lang="pt-BR" sz="1350"/>
+                        <a:t>5.1 Administrador seleciona para cancelar redefinição de senha</a:t>
+                      </a:r>
+                      <a:endParaRPr sz="1350"/>
+                    </a:p>
+                    <a:p>
+                      <a:pPr indent="0" lvl="0" marL="0" rtl="0" algn="l">
+                        <a:lnSpc>
+                          <a:spcPct val="115000"/>
+                        </a:lnSpc>
+                        <a:spcBef>
+                          <a:spcPts val="0"/>
+                        </a:spcBef>
+                        <a:spcAft>
+                          <a:spcPts val="1200"/>
+                        </a:spcAft>
+                        <a:buClr>
+                          <a:schemeClr val="dk1"/>
+                        </a:buClr>
+                        <a:buSzPts val="1100"/>
+                        <a:buFont typeface="Arial"/>
+                        <a:buNone/>
+                      </a:pPr>
+                      <a:r>
+                        <a:rPr lang="pt-BR" sz="1350"/>
+                        <a:t>5.1.1 Sistema retorna para a tela de controle de usuários</a:t>
+                      </a:r>
+                      <a:endParaRPr sz="1350"/>
                     </a:p>
                   </a:txBody>
                   <a:tcPr marT="91425" marB="91425" marR="91425" marL="91425"/>
@@ -20892,7 +21147,7 @@
             <a:tbl>
               <a:tblPr>
                 <a:noFill/>
-                <a:tableStyleId>{2FBA5331-9FB4-4AE7-B17D-9EC093DBF87E}</a:tableStyleId>
+                <a:tableStyleId>{50B2C5D1-D99D-4A31-A7E5-88A7BF6D1CC2}</a:tableStyleId>
               </a:tblPr>
               <a:tblGrid>
                 <a:gridCol w="2055275"/>
@@ -20954,7 +21209,11 @@
                       </a:pPr>
                       <a:r>
                         <a:rPr lang="pt-BR" sz="1350" u="none" cap="none" strike="noStrike"/>
-                        <a:t>UC5 - Editar usuário cadastrado</a:t>
+                        <a:t>UC5 -</a:t>
+                      </a:r>
+                      <a:r>
+                        <a:rPr lang="pt-BR" sz="1350"/>
+                        <a:t> Ativar/Desativar usuário cadastrado</a:t>
                       </a:r>
                       <a:endParaRPr sz="1350" u="none" cap="none" strike="noStrike"/>
                     </a:p>
@@ -21081,8 +21340,8 @@
                         <a:buNone/>
                       </a:pPr>
                       <a:r>
-                        <a:rPr lang="pt-BR" sz="1350" u="none" cap="none" strike="noStrike"/>
-                        <a:t>O administrador deseja editar o cadastro de um usuário</a:t>
+                        <a:rPr lang="pt-BR" sz="1350"/>
+                        <a:t>O administrador deseja ativar/desativar o acesso de um usuário</a:t>
                       </a:r>
                       <a:endParaRPr sz="1350" u="none" cap="none" strike="noStrike"/>
                     </a:p>
@@ -21154,7 +21413,11 @@
                       </a:r>
                       <a:r>
                         <a:rPr lang="pt-BR" sz="1350" u="none" cap="none" strike="noStrike"/>
-                        <a:t>UC3</a:t>
+                        <a:t>UC</a:t>
+                      </a:r>
+                      <a:r>
+                        <a:rPr lang="pt-BR" sz="1350"/>
+                        <a:t>2</a:t>
                       </a:r>
                       <a:endParaRPr sz="1350" u="none" cap="none" strike="noStrike"/>
                     </a:p>
@@ -21217,12 +21480,12 @@
                         <a:buNone/>
                       </a:pPr>
                       <a:r>
-                        <a:rPr lang="pt-BR" sz="1350" u="none" cap="none" strike="noStrike">
+                        <a:rPr lang="pt-BR" sz="1350">
                           <a:solidFill>
                             <a:schemeClr val="dk1"/>
                           </a:solidFill>
                         </a:rPr>
-                        <a:t>Acessar a funcionalidade de edição de usuários</a:t>
+                        <a:t>Acessar a funcionalidade de ativar/desativar um usuário no painel do administrador</a:t>
                       </a:r>
                       <a:endParaRPr sz="1350" u="none" cap="none" strike="noStrike"/>
                     </a:p>
@@ -21381,8 +21644,8 @@
                         <a:buNone/>
                       </a:pPr>
                       <a:r>
-                        <a:rPr lang="pt-BR" sz="1350" u="none" cap="none" strike="noStrike"/>
-                        <a:t>Usuário editado</a:t>
+                        <a:rPr lang="pt-BR" sz="1350"/>
+                        <a:t>Acesso do usuário ativado/desativado</a:t>
                       </a:r>
                       <a:endParaRPr sz="1350" u="none" cap="none" strike="noStrike"/>
                     </a:p>
@@ -21434,7 +21697,7 @@
             <a:tbl>
               <a:tblPr>
                 <a:noFill/>
-                <a:tableStyleId>{2FBA5331-9FB4-4AE7-B17D-9EC093DBF87E}</a:tableStyleId>
+                <a:tableStyleId>{50B2C5D1-D99D-4A31-A7E5-88A7BF6D1CC2}</a:tableStyleId>
               </a:tblPr>
               <a:tblGrid>
                 <a:gridCol w="2055275"/>
@@ -21477,7 +21740,7 @@
                     <a:bodyPr/>
                     <a:lstStyle/>
                     <a:p>
-                      <a:pPr indent="-317500" lvl="0" marL="457200" marR="0" rtl="0" algn="l">
+                      <a:pPr indent="-314325" lvl="0" marL="457200" marR="0" rtl="0" algn="l">
                         <a:lnSpc>
                           <a:spcPct val="100000"/>
                         </a:lnSpc>
@@ -21490,26 +21753,25 @@
                         <a:buClr>
                           <a:schemeClr val="dk1"/>
                         </a:buClr>
-                        <a:buSzPts val="1400"/>
-                        <a:buFont typeface="Arial"/>
+                        <a:buSzPts val="1350"/>
                         <a:buAutoNum type="arabicPeriod"/>
                       </a:pPr>
                       <a:r>
-                        <a:rPr lang="pt-BR" sz="1350" u="none" cap="none" strike="noStrike">
+                        <a:rPr lang="pt-BR" sz="1350">
                           <a:solidFill>
                             <a:schemeClr val="dk1"/>
                           </a:solidFill>
                         </a:rPr>
-                        <a:t>O administrador acessa a listagem de usuários</a:t>
-                      </a:r>
-                      <a:endParaRPr sz="1350" u="none" cap="none" strike="noStrike">
+                        <a:t>Administrador acessa a área de controle de usuários em seu painel</a:t>
+                      </a:r>
+                      <a:endParaRPr sz="1350">
                         <a:solidFill>
                           <a:schemeClr val="dk1"/>
                         </a:solidFill>
                       </a:endParaRPr>
                     </a:p>
                     <a:p>
-                      <a:pPr indent="-317500" lvl="0" marL="457200" marR="0" rtl="0" algn="l">
+                      <a:pPr indent="-314325" lvl="0" marL="457200" marR="0" rtl="0" algn="l">
                         <a:lnSpc>
                           <a:spcPct val="100000"/>
                         </a:lnSpc>
@@ -21522,26 +21784,25 @@
                         <a:buClr>
                           <a:schemeClr val="dk1"/>
                         </a:buClr>
-                        <a:buSzPts val="1400"/>
-                        <a:buFont typeface="Arial"/>
+                        <a:buSzPts val="1350"/>
                         <a:buAutoNum type="arabicPeriod"/>
                       </a:pPr>
                       <a:r>
-                        <a:rPr lang="pt-BR" sz="1350" u="none" cap="none" strike="noStrike">
+                        <a:rPr lang="pt-BR" sz="1350">
                           <a:solidFill>
                             <a:schemeClr val="dk1"/>
                           </a:solidFill>
                         </a:rPr>
-                        <a:t>O sistema retorna a listagem de usuários</a:t>
-                      </a:r>
-                      <a:endParaRPr sz="1350" u="none" cap="none" strike="noStrike">
+                        <a:t>Administrador seleciona o usuário que deseja ativar/desativar</a:t>
+                      </a:r>
+                      <a:endParaRPr sz="1350">
                         <a:solidFill>
                           <a:schemeClr val="dk1"/>
                         </a:solidFill>
                       </a:endParaRPr>
                     </a:p>
                     <a:p>
-                      <a:pPr indent="-317500" lvl="0" marL="457200" marR="0" rtl="0" algn="l">
+                      <a:pPr indent="-314325" lvl="0" marL="457200" marR="0" rtl="0" algn="l">
                         <a:lnSpc>
                           <a:spcPct val="100000"/>
                         </a:lnSpc>
@@ -21554,26 +21815,25 @@
                         <a:buClr>
                           <a:schemeClr val="dk1"/>
                         </a:buClr>
-                        <a:buSzPts val="1400"/>
-                        <a:buFont typeface="Arial"/>
+                        <a:buSzPts val="1350"/>
                         <a:buAutoNum type="arabicPeriod"/>
                       </a:pPr>
                       <a:r>
-                        <a:rPr lang="pt-BR" sz="1350" u="none" cap="none" strike="noStrike">
+                        <a:rPr lang="pt-BR" sz="1350">
                           <a:solidFill>
                             <a:schemeClr val="dk1"/>
                           </a:solidFill>
                         </a:rPr>
-                        <a:t>O administrador filtra pelo usuário desejado</a:t>
-                      </a:r>
-                      <a:endParaRPr sz="1350" u="none" cap="none" strike="noStrike">
+                        <a:t>Administrador seleciona “Reativar usuário”/“Desativar usuário”</a:t>
+                      </a:r>
+                      <a:endParaRPr sz="1350">
                         <a:solidFill>
                           <a:schemeClr val="dk1"/>
                         </a:solidFill>
                       </a:endParaRPr>
                     </a:p>
                     <a:p>
-                      <a:pPr indent="-317500" lvl="0" marL="457200" marR="0" rtl="0" algn="l">
+                      <a:pPr indent="-314325" lvl="0" marL="457200" marR="0" rtl="0" algn="l">
                         <a:lnSpc>
                           <a:spcPct val="100000"/>
                         </a:lnSpc>
@@ -21586,26 +21846,25 @@
                         <a:buClr>
                           <a:schemeClr val="dk1"/>
                         </a:buClr>
-                        <a:buSzPts val="1400"/>
-                        <a:buFont typeface="Arial"/>
+                        <a:buSzPts val="1350"/>
                         <a:buAutoNum type="arabicPeriod"/>
                       </a:pPr>
                       <a:r>
-                        <a:rPr lang="pt-BR" sz="1350" u="none" cap="none" strike="noStrike">
+                        <a:rPr lang="pt-BR" sz="1350">
                           <a:solidFill>
                             <a:schemeClr val="dk1"/>
                           </a:solidFill>
                         </a:rPr>
-                        <a:t>O sistema retorna uma listagem de usuários com base nos dados do filtro</a:t>
-                      </a:r>
-                      <a:endParaRPr sz="1350" u="none" cap="none" strike="noStrike">
+                        <a:t>Sistema pede uma confirmação para a ação</a:t>
+                      </a:r>
+                      <a:endParaRPr sz="1350">
                         <a:solidFill>
                           <a:schemeClr val="dk1"/>
                         </a:solidFill>
                       </a:endParaRPr>
                     </a:p>
                     <a:p>
-                      <a:pPr indent="-317500" lvl="0" marL="457200" marR="0" rtl="0" algn="l">
+                      <a:pPr indent="-314325" lvl="0" marL="457200" marR="0" rtl="0" algn="l">
                         <a:lnSpc>
                           <a:spcPct val="100000"/>
                         </a:lnSpc>
@@ -21618,26 +21877,25 @@
                         <a:buClr>
                           <a:schemeClr val="dk1"/>
                         </a:buClr>
-                        <a:buSzPts val="1400"/>
-                        <a:buFont typeface="Arial"/>
+                        <a:buSzPts val="1350"/>
                         <a:buAutoNum type="arabicPeriod"/>
                       </a:pPr>
                       <a:r>
-                        <a:rPr lang="pt-BR" sz="1350" u="none" cap="none" strike="noStrike">
+                        <a:rPr lang="pt-BR" sz="1350">
                           <a:solidFill>
                             <a:schemeClr val="dk1"/>
                           </a:solidFill>
                         </a:rPr>
-                        <a:t>O administrador seleciona para editar o usuário desejado</a:t>
-                      </a:r>
-                      <a:endParaRPr sz="1350" u="none" cap="none" strike="noStrike">
+                        <a:t>Administrador confirma a desativação do usuário</a:t>
+                      </a:r>
+                      <a:endParaRPr sz="1350">
                         <a:solidFill>
                           <a:schemeClr val="dk1"/>
                         </a:solidFill>
                       </a:endParaRPr>
                     </a:p>
                     <a:p>
-                      <a:pPr indent="-317500" lvl="0" marL="457200" marR="0" rtl="0" algn="l">
+                      <a:pPr indent="-314325" lvl="0" marL="457200" marR="0" rtl="0" algn="l">
                         <a:lnSpc>
                           <a:spcPct val="100000"/>
                         </a:lnSpc>
@@ -21650,26 +21908,25 @@
                         <a:buClr>
                           <a:schemeClr val="dk1"/>
                         </a:buClr>
-                        <a:buSzPts val="1400"/>
-                        <a:buFont typeface="Arial"/>
+                        <a:buSzPts val="1350"/>
                         <a:buAutoNum type="arabicPeriod"/>
                       </a:pPr>
                       <a:r>
-                        <a:rPr lang="pt-BR" sz="1350" u="none" cap="none" strike="noStrike">
+                        <a:rPr lang="pt-BR" sz="1350">
                           <a:solidFill>
                             <a:schemeClr val="dk1"/>
                           </a:solidFill>
                         </a:rPr>
-                        <a:t>O sistema abre a tela de edição do usuário</a:t>
-                      </a:r>
-                      <a:endParaRPr sz="1350" u="none" cap="none" strike="noStrike">
+                        <a:t>Sistema ativa/desativa usuário</a:t>
+                      </a:r>
+                      <a:endParaRPr sz="1350">
                         <a:solidFill>
                           <a:schemeClr val="dk1"/>
                         </a:solidFill>
                       </a:endParaRPr>
                     </a:p>
                     <a:p>
-                      <a:pPr indent="-317500" lvl="0" marL="457200" marR="0" rtl="0" algn="l">
+                      <a:pPr indent="-314325" lvl="0" marL="457200" marR="0" rtl="0" algn="l">
                         <a:lnSpc>
                           <a:spcPct val="100000"/>
                         </a:lnSpc>
@@ -21682,83 +21939,18 @@
                         <a:buClr>
                           <a:schemeClr val="dk1"/>
                         </a:buClr>
-                        <a:buSzPts val="1400"/>
-                        <a:buFont typeface="Arial"/>
+                        <a:buSzPts val="1350"/>
                         <a:buAutoNum type="arabicPeriod"/>
                       </a:pPr>
                       <a:r>
-                        <a:rPr lang="pt-BR" sz="1350" u="none" cap="none" strike="noStrike">
+                        <a:rPr lang="pt-BR" sz="1350">
                           <a:solidFill>
                             <a:schemeClr val="dk1"/>
                           </a:solidFill>
                         </a:rPr>
-                        <a:t>O administrador altera os dados que deseja no cadastro do usuário</a:t>
-                      </a:r>
-                      <a:endParaRPr sz="1350" u="none" cap="none" strike="noStrike">
-                        <a:solidFill>
-                          <a:schemeClr val="dk1"/>
-                        </a:solidFill>
-                      </a:endParaRPr>
-                    </a:p>
-                    <a:p>
-                      <a:pPr indent="-317500" lvl="0" marL="457200" marR="0" rtl="0" algn="l">
-                        <a:lnSpc>
-                          <a:spcPct val="100000"/>
-                        </a:lnSpc>
-                        <a:spcBef>
-                          <a:spcPts val="0"/>
-                        </a:spcBef>
-                        <a:spcAft>
-                          <a:spcPts val="0"/>
-                        </a:spcAft>
-                        <a:buClr>
-                          <a:schemeClr val="dk1"/>
-                        </a:buClr>
-                        <a:buSzPts val="1400"/>
-                        <a:buFont typeface="Arial"/>
-                        <a:buAutoNum type="arabicPeriod"/>
-                      </a:pPr>
-                      <a:r>
-                        <a:rPr lang="pt-BR" sz="1350" u="none" cap="none" strike="noStrike">
-                          <a:solidFill>
-                            <a:schemeClr val="dk1"/>
-                          </a:solidFill>
-                        </a:rPr>
-                        <a:t>O administrador salva a edição dos dados</a:t>
-                      </a:r>
-                      <a:endParaRPr sz="1350" u="none" cap="none" strike="noStrike">
-                        <a:solidFill>
-                          <a:schemeClr val="dk1"/>
-                        </a:solidFill>
-                      </a:endParaRPr>
-                    </a:p>
-                    <a:p>
-                      <a:pPr indent="-317500" lvl="0" marL="457200" marR="0" rtl="0" algn="l">
-                        <a:lnSpc>
-                          <a:spcPct val="100000"/>
-                        </a:lnSpc>
-                        <a:spcBef>
-                          <a:spcPts val="0"/>
-                        </a:spcBef>
-                        <a:spcAft>
-                          <a:spcPts val="0"/>
-                        </a:spcAft>
-                        <a:buClr>
-                          <a:schemeClr val="dk1"/>
-                        </a:buClr>
-                        <a:buSzPts val="1400"/>
-                        <a:buFont typeface="Arial"/>
-                        <a:buAutoNum type="arabicPeriod"/>
-                      </a:pPr>
-                      <a:r>
-                        <a:rPr lang="pt-BR" sz="1350" u="none" cap="none" strike="noStrike">
-                          <a:solidFill>
-                            <a:schemeClr val="dk1"/>
-                          </a:solidFill>
-                        </a:rPr>
-                        <a:t>O sistema retorna uma mensagem de sucesso para a edição realizada</a:t>
-                      </a:r>
-                      <a:endParaRPr sz="1350" u="none" cap="none" strike="noStrike">
+                        <a:t>Sistema retorna para a tela de controle de usuários</a:t>
+                      </a:r>
+                      <a:endParaRPr sz="1350">
                         <a:solidFill>
                           <a:schemeClr val="dk1"/>
                         </a:solidFill>
@@ -21785,7 +21977,11 @@
                       <a:r>
                         <a:t/>
                       </a:r>
-                      <a:endParaRPr sz="1350" u="none" cap="none" strike="noStrike"/>
+                      <a:endParaRPr sz="1350">
+                        <a:solidFill>
+                          <a:schemeClr val="dk1"/>
+                        </a:solidFill>
+                      </a:endParaRPr>
                     </a:p>
                   </a:txBody>
                   <a:tcPr marT="91425" marB="91425" marR="91425" marL="91425"/>
@@ -21828,12 +22024,60 @@
                     <a:bodyPr/>
                     <a:lstStyle/>
                     <a:p>
+                      <a:pPr indent="0" lvl="0" marL="0" rtl="0" algn="l">
+                        <a:lnSpc>
+                          <a:spcPct val="115000"/>
+                        </a:lnSpc>
+                        <a:spcBef>
+                          <a:spcPts val="1200"/>
+                        </a:spcBef>
+                        <a:spcAft>
+                          <a:spcPts val="0"/>
+                        </a:spcAft>
+                        <a:buClr>
+                          <a:schemeClr val="dk1"/>
+                        </a:buClr>
+                        <a:buSzPts val="1100"/>
+                        <a:buFont typeface="Arial"/>
+                        <a:buNone/>
+                      </a:pPr>
+                      <a:r>
+                        <a:rPr lang="pt-BR" sz="1350"/>
+                        <a:t>5.1 Administrador cancela a ação</a:t>
+                      </a:r>
+                      <a:endParaRPr sz="1350"/>
+                    </a:p>
+                    <a:p>
+                      <a:pPr indent="0" lvl="0" marL="0" rtl="0" algn="l">
+                        <a:lnSpc>
+                          <a:spcPct val="115000"/>
+                        </a:lnSpc>
+                        <a:spcBef>
+                          <a:spcPts val="0"/>
+                        </a:spcBef>
+                        <a:spcAft>
+                          <a:spcPts val="0"/>
+                        </a:spcAft>
+                        <a:buClr>
+                          <a:schemeClr val="dk1"/>
+                        </a:buClr>
+                        <a:buSzPts val="1100"/>
+                        <a:buFont typeface="Arial"/>
+                        <a:buNone/>
+                      </a:pPr>
+                      <a:r>
+                        <a:rPr lang="pt-BR" sz="1350"/>
+                        <a:t>5.1.1 Sistema retorna para a tela de controle de usuários</a:t>
+                      </a:r>
+                      <a:endParaRPr sz="1350"/>
+                    </a:p>
+                    <a:p>
                       <a:pPr indent="0" lvl="0" marL="0" marR="0" rtl="0" algn="l">
                         <a:lnSpc>
                           <a:spcPct val="100000"/>
                         </a:lnSpc>
                         <a:spcBef>
-                          <a:spcPts val="0"/>
+                          <a:spcPts val="1200"/>
                         </a:spcBef>
                         <a:spcAft>
                           <a:spcPts val="0"/>
@@ -21848,7 +22092,7 @@
                       <a:r>
                         <a:t/>
                       </a:r>
-                      <a:endParaRPr sz="1350" u="none" cap="none" strike="noStrike"/>
+                      <a:endParaRPr sz="1350"/>
                     </a:p>
                   </a:txBody>
                   <a:tcPr marT="91425" marB="91425" marR="91425" marL="91425"/>
@@ -21958,7 +22202,7 @@
             <a:tbl>
               <a:tblPr>
                 <a:noFill/>
-                <a:tableStyleId>{2FBA5331-9FB4-4AE7-B17D-9EC093DBF87E}</a:tableStyleId>
+                <a:tableStyleId>{50B2C5D1-D99D-4A31-A7E5-88A7BF6D1CC2}</a:tableStyleId>
               </a:tblPr>
               <a:tblGrid>
                 <a:gridCol w="2051150"/>
@@ -22020,7 +22264,11 @@
                       </a:pPr>
                       <a:r>
                         <a:rPr lang="pt-BR" sz="1350" u="none" cap="none" strike="noStrike"/>
-                        <a:t>UC6 - Registrar produto na venda</a:t>
+                        <a:t>UC6 -</a:t>
+                      </a:r>
+                      <a:r>
+                        <a:rPr lang="pt-BR" sz="1350"/>
+                        <a:t> Cadastrar novo produto</a:t>
                       </a:r>
                       <a:endParaRPr sz="1350" u="none" cap="none" strike="noStrike"/>
                     </a:p>
@@ -22083,8 +22331,8 @@
                         <a:buNone/>
                       </a:pPr>
                       <a:r>
-                        <a:rPr lang="pt-BR" sz="1350" u="none" cap="none" strike="noStrike"/>
-                        <a:t>Operador do caixa</a:t>
+                        <a:rPr lang="pt-BR" sz="1350"/>
+                        <a:t>Administrador</a:t>
                       </a:r>
                       <a:endParaRPr sz="1350" u="none" cap="none" strike="noStrike"/>
                     </a:p>
@@ -22147,8 +22395,8 @@
                         <a:buNone/>
                       </a:pPr>
                       <a:r>
-                        <a:rPr lang="pt-BR" sz="1350" u="none" cap="none" strike="noStrike"/>
-                        <a:t>O operador deseja registrar um produto na venda</a:t>
+                        <a:rPr lang="pt-BR" sz="1350"/>
+                        <a:t>O administrador deseja cadastrar um novo produto</a:t>
                       </a:r>
                       <a:endParaRPr sz="1350" u="none" cap="none" strike="noStrike"/>
                     </a:p>
@@ -22275,8 +22523,8 @@
                         <a:buNone/>
                       </a:pPr>
                       <a:r>
-                        <a:rPr lang="pt-BR" sz="1350" u="none" cap="none" strike="noStrike"/>
-                        <a:t>Acessar a funcionalidade de cadastro de venda</a:t>
+                        <a:rPr lang="pt-BR" sz="1350"/>
+                        <a:t>Acessar a funcionalidade de cadastro de produtos no painel do administrador</a:t>
                       </a:r>
                       <a:endParaRPr sz="1350" u="none" cap="none" strike="noStrike"/>
                     </a:p>
@@ -22339,32 +22587,8 @@
                         <a:buNone/>
                       </a:pPr>
                       <a:r>
-                        <a:rPr lang="pt-BR" sz="1350" u="none" cap="none" strike="noStrike"/>
-                        <a:t>Operador autenticado no sistema</a:t>
-                      </a:r>
-                      <a:endParaRPr sz="1350" u="none" cap="none" strike="noStrike"/>
-                    </a:p>
-                    <a:p>
-                      <a:pPr indent="0" lvl="0" marL="0" marR="0" rtl="0" algn="l">
-                        <a:lnSpc>
-                          <a:spcPct val="100000"/>
-                        </a:lnSpc>
-                        <a:spcBef>
-                          <a:spcPts val="0"/>
-                        </a:spcBef>
-                        <a:spcAft>
-                          <a:spcPts val="0"/>
-                        </a:spcAft>
-                        <a:buClr>
-                          <a:schemeClr val="lt1"/>
-                        </a:buClr>
-                        <a:buSzPts val="1350"/>
-                        <a:buFont typeface="Arial"/>
-                        <a:buNone/>
-                      </a:pPr>
-                      <a:r>
-                        <a:rPr lang="pt-BR" sz="1350" u="none" cap="none" strike="noStrike"/>
-                        <a:t>Produto cadastrado no sistema</a:t>
+                        <a:rPr lang="pt-BR" sz="1350"/>
+                        <a:t>Administrador autenticado no sistema</a:t>
                       </a:r>
                       <a:endParaRPr sz="1350" u="none" cap="none" strike="noStrike"/>
                     </a:p>
@@ -22427,8 +22651,8 @@
                         <a:buNone/>
                       </a:pPr>
                       <a:r>
-                        <a:rPr lang="pt-BR" sz="1350" u="none" cap="none" strike="noStrike"/>
-                        <a:t>Produto registrado na venda</a:t>
+                        <a:rPr lang="pt-BR" sz="1350"/>
+                        <a:t>Novo produto cadastrado no sistema</a:t>
                       </a:r>
                       <a:endParaRPr sz="1350" u="none" cap="none" strike="noStrike"/>
                     </a:p>
@@ -22480,7 +22704,7 @@
             <a:tbl>
               <a:tblPr>
                 <a:noFill/>
-                <a:tableStyleId>{2FBA5331-9FB4-4AE7-B17D-9EC093DBF87E}</a:tableStyleId>
+                <a:tableStyleId>{50B2C5D1-D99D-4A31-A7E5-88A7BF6D1CC2}</a:tableStyleId>
               </a:tblPr>
               <a:tblGrid>
                 <a:gridCol w="2055275"/>
@@ -22537,14 +22761,13 @@
                           <a:schemeClr val="dk1"/>
                         </a:buClr>
                         <a:buSzPts val="1400"/>
-                        <a:buFont typeface="Arial"/>
                         <a:buAutoNum type="arabicPeriod"/>
                       </a:pPr>
                       <a:r>
-                        <a:rPr lang="pt-BR" sz="1350" u="none" cap="none" strike="noStrike"/>
-                        <a:t>Operador inicia uma venda</a:t>
-                      </a:r>
-                      <a:endParaRPr sz="1350" u="none" cap="none" strike="noStrike"/>
+                        <a:rPr lang="pt-BR" sz="1350"/>
+                        <a:t>Administrador acessa a área de controle de produtos em seu painel</a:t>
+                      </a:r>
+                      <a:endParaRPr sz="1350"/>
                     </a:p>
                     <a:p>
                       <a:pPr indent="-317500" lvl="0" marL="457200" marR="0" rtl="0" algn="l">
@@ -22561,14 +22784,13 @@
                           <a:schemeClr val="dk1"/>
                         </a:buClr>
                         <a:buSzPts val="1400"/>
-                        <a:buFont typeface="Arial"/>
                         <a:buAutoNum type="arabicPeriod"/>
                       </a:pPr>
                       <a:r>
-                        <a:rPr lang="pt-BR" sz="1350" u="none" cap="none" strike="noStrike"/>
-                        <a:t>Para cada produto operador digita o código de barras do produto</a:t>
-                      </a:r>
-                      <a:endParaRPr sz="1350" u="none" cap="none" strike="noStrike"/>
+                        <a:rPr lang="pt-BR" sz="1350"/>
+                        <a:t>Administrador seleciona para cadastrar um novo produto</a:t>
+                      </a:r>
+                      <a:endParaRPr sz="1350"/>
                     </a:p>
                     <a:p>
                       <a:pPr indent="-317500" lvl="0" marL="457200" marR="0" rtl="0" algn="l">
@@ -22585,14 +22807,13 @@
                           <a:schemeClr val="dk1"/>
                         </a:buClr>
                         <a:buSzPts val="1400"/>
-                        <a:buFont typeface="Arial"/>
                         <a:buAutoNum type="arabicPeriod"/>
                       </a:pPr>
                       <a:r>
-                        <a:rPr lang="pt-BR" sz="1350" u="none" cap="none" strike="noStrike"/>
-                        <a:t>Sistema adiciona os produtos a venda</a:t>
-                      </a:r>
-                      <a:endParaRPr sz="1350" u="none" cap="none" strike="noStrike"/>
+                        <a:rPr lang="pt-BR" sz="1350"/>
+                        <a:t>Administrador preenche o nome, código de barras, preço e quantidade em estoque do produto</a:t>
+                      </a:r>
+                      <a:endParaRPr sz="1350"/>
                     </a:p>
                     <a:p>
                       <a:pPr indent="-317500" lvl="0" marL="457200" marR="0" rtl="0" algn="l">
@@ -22609,14 +22830,59 @@
                           <a:schemeClr val="dk1"/>
                         </a:buClr>
                         <a:buSzPts val="1400"/>
-                        <a:buFont typeface="Arial"/>
                         <a:buAutoNum type="arabicPeriod"/>
                       </a:pPr>
                       <a:r>
-                        <a:rPr lang="pt-BR" sz="1350" u="none" cap="none" strike="noStrike"/>
-                        <a:t>Sistema prossegue para a finalização da venda</a:t>
-                      </a:r>
-                      <a:endParaRPr sz="1350" u="none" cap="none" strike="noStrike"/>
+                        <a:rPr lang="pt-BR" sz="1350"/>
+                        <a:t>Administrador seleciona para salvar o novo produto</a:t>
+                      </a:r>
+                      <a:endParaRPr sz="1350"/>
+                    </a:p>
+                    <a:p>
+                      <a:pPr indent="-317500" lvl="0" marL="457200" marR="0" rtl="0" algn="l">
+                        <a:lnSpc>
+                          <a:spcPct val="100000"/>
+                        </a:lnSpc>
+                        <a:spcBef>
+                          <a:spcPts val="0"/>
+                        </a:spcBef>
+                        <a:spcAft>
+                          <a:spcPts val="0"/>
+                        </a:spcAft>
+                        <a:buClr>
+                          <a:schemeClr val="dk1"/>
+                        </a:buClr>
+                        <a:buSzPts val="1400"/>
+                        <a:buAutoNum type="arabicPeriod"/>
+                      </a:pPr>
+                      <a:r>
+                        <a:rPr lang="pt-BR" sz="1350"/>
+                        <a:t>Sistema informa que o cadastro foi realizado com sucesso</a:t>
+                      </a:r>
+                      <a:endParaRPr sz="1350"/>
+                    </a:p>
+                    <a:p>
+                      <a:pPr indent="-317500" lvl="0" marL="457200" marR="0" rtl="0" algn="l">
+                        <a:lnSpc>
+                          <a:spcPct val="100000"/>
+                        </a:lnSpc>
+                        <a:spcBef>
+                          <a:spcPts val="0"/>
+                        </a:spcBef>
+                        <a:spcAft>
+                          <a:spcPts val="0"/>
+                        </a:spcAft>
+                        <a:buClr>
+                          <a:schemeClr val="dk1"/>
+                        </a:buClr>
+                        <a:buSzPts val="1400"/>
+                        <a:buAutoNum type="arabicPeriod"/>
+                      </a:pPr>
+                      <a:r>
+                        <a:rPr lang="pt-BR" sz="1350"/>
+                        <a:t>Sistema retorna para a tela de controle de produtos</a:t>
+                      </a:r>
+                      <a:endParaRPr sz="1350"/>
                     </a:p>
                   </a:txBody>
                   <a:tcPr marT="91425" marB="91425" marR="91425" marL="91425"/>
@@ -22670,6 +22936,78 @@
                           <a:spcPts val="0"/>
                         </a:spcAft>
                         <a:buClr>
+                          <a:schemeClr val="dk1"/>
+                        </a:buClr>
+                        <a:buSzPts val="1100"/>
+                        <a:buFont typeface="Arial"/>
+                        <a:buNone/>
+                      </a:pPr>
+                      <a:r>
+                        <a:rPr lang="pt-BR" sz="1350"/>
+                        <a:t>4.1 Sistema informa que já existe um produto cadastrado com o código de barras informado</a:t>
+                      </a:r>
+                      <a:endParaRPr sz="1350"/>
+                    </a:p>
+                    <a:p>
+                      <a:pPr indent="0" lvl="0" marL="0" marR="0" rtl="0" algn="l">
+                        <a:lnSpc>
+                          <a:spcPct val="100000"/>
+                        </a:lnSpc>
+                        <a:spcBef>
+                          <a:spcPts val="0"/>
+                        </a:spcBef>
+                        <a:spcAft>
+                          <a:spcPts val="0"/>
+                        </a:spcAft>
+                        <a:buClr>
+                          <a:schemeClr val="dk1"/>
+                        </a:buClr>
+                        <a:buSzPts val="1100"/>
+                        <a:buFont typeface="Arial"/>
+                        <a:buNone/>
+                      </a:pPr>
+                      <a:r>
+                        <a:rPr lang="pt-BR" sz="1350"/>
+                        <a:t>4.1.1 Administrador seleciona para cancelar o cadastro</a:t>
+                      </a:r>
+                      <a:endParaRPr sz="1350"/>
+                    </a:p>
+                    <a:p>
+                      <a:pPr indent="0" lvl="0" marL="0" marR="0" rtl="0" algn="l">
+                        <a:lnSpc>
+                          <a:spcPct val="100000"/>
+                        </a:lnSpc>
+                        <a:spcBef>
+                          <a:spcPts val="0"/>
+                        </a:spcBef>
+                        <a:spcAft>
+                          <a:spcPts val="0"/>
+                        </a:spcAft>
+                        <a:buClr>
+                          <a:schemeClr val="dk1"/>
+                        </a:buClr>
+                        <a:buSzPts val="1100"/>
+                        <a:buFont typeface="Arial"/>
+                        <a:buNone/>
+                      </a:pPr>
+                      <a:r>
+                        <a:rPr lang="pt-BR" sz="1350"/>
+                        <a:t>4.1.2 Sistema retorna para a tela de controle de produtos</a:t>
+                      </a:r>
+                      <a:endParaRPr sz="1350"/>
+                    </a:p>
+                    <a:p>
+                      <a:pPr indent="0" lvl="0" marL="0" marR="0" rtl="0" algn="l">
+                        <a:lnSpc>
+                          <a:spcPct val="100000"/>
+                        </a:lnSpc>
+                        <a:spcBef>
+                          <a:spcPts val="0"/>
+                        </a:spcBef>
+                        <a:spcAft>
+                          <a:spcPts val="0"/>
+                        </a:spcAft>
+                        <a:buClr>
                           <a:schemeClr val="lt1"/>
                         </a:buClr>
                         <a:buSzPts val="1350"/>
@@ -22679,7 +23017,7 @@
                       <a:r>
                         <a:t/>
                       </a:r>
-                      <a:endParaRPr sz="1350" u="none" cap="none" strike="noStrike"/>
+                      <a:endParaRPr sz="1350"/>
                     </a:p>
                   </a:txBody>
                   <a:tcPr marT="91425" marB="91425" marR="91425" marL="91425"/>
@@ -22789,7 +23127,7 @@
             <a:tbl>
               <a:tblPr>
                 <a:noFill/>
-                <a:tableStyleId>{2FBA5331-9FB4-4AE7-B17D-9EC093DBF87E}</a:tableStyleId>
+                <a:tableStyleId>{50B2C5D1-D99D-4A31-A7E5-88A7BF6D1CC2}</a:tableStyleId>
               </a:tblPr>
               <a:tblGrid>
                 <a:gridCol w="2051150"/>
@@ -22851,7 +23189,11 @@
                       </a:pPr>
                       <a:r>
                         <a:rPr lang="pt-BR" sz="1350" u="none" cap="none" strike="noStrike"/>
-                        <a:t>UC7 - Finalizar venda</a:t>
+                        <a:t>UC7 -</a:t>
+                      </a:r>
+                      <a:r>
+                        <a:rPr lang="pt-BR" sz="1350"/>
+                        <a:t> Editar produto cadastrado</a:t>
                       </a:r>
                       <a:endParaRPr sz="1350" u="none" cap="none" strike="noStrike"/>
                     </a:p>
@@ -22914,8 +23256,8 @@
                         <a:buNone/>
                       </a:pPr>
                       <a:r>
-                        <a:rPr lang="pt-BR" sz="1350" u="none" cap="none" strike="noStrike"/>
-                        <a:t>Operador do caixa, sistema de pagamento</a:t>
+                        <a:rPr lang="pt-BR" sz="1350"/>
+                        <a:t>Administrador</a:t>
                       </a:r>
                       <a:endParaRPr sz="1350" u="none" cap="none" strike="noStrike"/>
                     </a:p>
@@ -22978,8 +23320,8 @@
                         <a:buNone/>
                       </a:pPr>
                       <a:r>
-                        <a:rPr lang="pt-BR" sz="1350" u="none" cap="none" strike="noStrike"/>
-                        <a:t>Operador deseja finalizar a venda e registrar o pagamento do cliente</a:t>
+                        <a:rPr lang="pt-BR" sz="1350"/>
+                        <a:t>O administrador deseja editar o cadastro de um produto</a:t>
                       </a:r>
                       <a:endParaRPr sz="1350" u="none" cap="none" strike="noStrike"/>
                     </a:p>
@@ -23114,8 +23456,8 @@
                         <a:buNone/>
                       </a:pPr>
                       <a:r>
-                        <a:rPr lang="pt-BR" sz="1350" u="none" cap="none" strike="noStrike"/>
-                        <a:t>Operador acessa a funcionalidade de finalizar venda</a:t>
+                        <a:rPr lang="pt-BR" sz="1350"/>
+                        <a:t>Acessar a funcionalidade de edição de produtos no painel do administrador</a:t>
                       </a:r>
                       <a:endParaRPr sz="1350" u="none" cap="none" strike="noStrike"/>
                     </a:p>
@@ -23178,10 +23520,10 @@
                         <a:buNone/>
                       </a:pPr>
                       <a:r>
-                        <a:rPr lang="pt-BR" sz="1350" u="none" cap="none" strike="noStrike"/>
-                        <a:t>Operador autenticado no sistema</a:t>
-                      </a:r>
-                      <a:endParaRPr sz="1350" u="none" cap="none" strike="noStrike"/>
+                        <a:rPr lang="pt-BR" sz="1350"/>
+                        <a:t>Administrador autenticado no sistema</a:t>
+                      </a:r>
+                      <a:endParaRPr sz="1350"/>
                     </a:p>
                     <a:p>
                       <a:pPr indent="0" lvl="0" marL="0" marR="0" rtl="0" algn="l">
@@ -23202,8 +23544,8 @@
                         <a:buNone/>
                       </a:pPr>
                       <a:r>
-                        <a:rPr lang="pt-BR" sz="1350" u="none" cap="none" strike="noStrike"/>
-                        <a:t>Produtos da venda em aberto já registrados</a:t>
+                        <a:rPr lang="pt-BR" sz="1350"/>
+                        <a:t>Produto cadastrado no sistema</a:t>
                       </a:r>
                       <a:endParaRPr sz="1350" u="none" cap="none" strike="noStrike"/>
                     </a:p>
@@ -23266,56 +23608,8 @@
                         <a:buNone/>
                       </a:pPr>
                       <a:r>
-                        <a:rPr lang="pt-BR" sz="1350" u="none" cap="none" strike="noStrike"/>
-                        <a:t>Pagamento recebido</a:t>
-                      </a:r>
-                      <a:endParaRPr sz="1350" u="none" cap="none" strike="noStrike"/>
-                    </a:p>
-                    <a:p>
-                      <a:pPr indent="0" lvl="0" marL="0" marR="0" rtl="0" algn="l">
-                        <a:lnSpc>
-                          <a:spcPct val="100000"/>
-                        </a:lnSpc>
-                        <a:spcBef>
-                          <a:spcPts val="0"/>
-                        </a:spcBef>
-                        <a:spcAft>
-                          <a:spcPts val="0"/>
-                        </a:spcAft>
-                        <a:buClr>
-                          <a:schemeClr val="lt1"/>
-                        </a:buClr>
-                        <a:buSzPts val="1350"/>
-                        <a:buFont typeface="Arial"/>
-                        <a:buNone/>
-                      </a:pPr>
-                      <a:r>
-                        <a:rPr lang="pt-BR" sz="1350" u="none" cap="none" strike="noStrike"/>
-                        <a:t>Emissão da nota fiscal</a:t>
-                      </a:r>
-                      <a:endParaRPr sz="1350" u="none" cap="none" strike="noStrike"/>
-                    </a:p>
-                    <a:p>
-                      <a:pPr indent="0" lvl="0" marL="0" marR="0" rtl="0" algn="l">
-                        <a:lnSpc>
-                          <a:spcPct val="100000"/>
-                        </a:lnSpc>
-                        <a:spcBef>
-                          <a:spcPts val="0"/>
-                        </a:spcBef>
-                        <a:spcAft>
-                          <a:spcPts val="0"/>
-                        </a:spcAft>
-                        <a:buClr>
-                          <a:schemeClr val="lt1"/>
-                        </a:buClr>
-                        <a:buSzPts val="1350"/>
-                        <a:buFont typeface="Arial"/>
-                        <a:buNone/>
-                      </a:pPr>
-                      <a:r>
-                        <a:rPr lang="pt-BR" sz="1350" u="none" cap="none" strike="noStrike"/>
-                        <a:t>Registro da venda no sistema</a:t>
+                        <a:rPr lang="pt-BR" sz="1350"/>
+                        <a:t>Produto editado</a:t>
                       </a:r>
                       <a:endParaRPr sz="1350" u="none" cap="none" strike="noStrike"/>
                     </a:p>
@@ -23367,7 +23661,7 @@
             <a:tbl>
               <a:tblPr>
                 <a:noFill/>
-                <a:tableStyleId>{2FBA5331-9FB4-4AE7-B17D-9EC093DBF87E}</a:tableStyleId>
+                <a:tableStyleId>{50B2C5D1-D99D-4A31-A7E5-88A7BF6D1CC2}</a:tableStyleId>
               </a:tblPr>
               <a:tblGrid>
                 <a:gridCol w="2053225"/>
@@ -23424,14 +23718,13 @@
                           <a:schemeClr val="dk1"/>
                         </a:buClr>
                         <a:buSzPts val="1400"/>
-                        <a:buFont typeface="Arial"/>
                         <a:buAutoNum type="arabicPeriod"/>
                       </a:pPr>
                       <a:r>
-                        <a:rPr lang="pt-BR" sz="1350" u="none" cap="none" strike="noStrike"/>
-                        <a:t>Operador seleciona que deseja finalizar a venda</a:t>
-                      </a:r>
-                      <a:endParaRPr sz="1350" u="none" cap="none" strike="noStrike"/>
+                        <a:rPr lang="pt-BR" sz="1350"/>
+                        <a:t>Administrador acessa a área de controle de produtos em seu painel</a:t>
+                      </a:r>
+                      <a:endParaRPr sz="1350"/>
                     </a:p>
                     <a:p>
                       <a:pPr indent="-317500" lvl="0" marL="457200" marR="0" rtl="0" algn="l">
@@ -23448,14 +23741,13 @@
                           <a:schemeClr val="dk1"/>
                         </a:buClr>
                         <a:buSzPts val="1400"/>
-                        <a:buFont typeface="Arial"/>
                         <a:buAutoNum type="arabicPeriod"/>
                       </a:pPr>
                       <a:r>
-                        <a:rPr lang="pt-BR" sz="1350" u="none" cap="none" strike="noStrike"/>
-                        <a:t>O sistema solicita a forma de pagamento desejada</a:t>
-                      </a:r>
-                      <a:endParaRPr sz="1350" u="none" cap="none" strike="noStrike"/>
+                        <a:rPr lang="pt-BR" sz="1350"/>
+                        <a:t>Administrador seleciona para editar um dos produtos já cadastrados</a:t>
+                      </a:r>
+                      <a:endParaRPr sz="1350"/>
                     </a:p>
                     <a:p>
                       <a:pPr indent="-317500" lvl="0" marL="457200" marR="0" rtl="0" algn="l">
@@ -23472,14 +23764,13 @@
                           <a:schemeClr val="dk1"/>
                         </a:buClr>
                         <a:buSzPts val="1400"/>
-                        <a:buFont typeface="Arial"/>
                         <a:buAutoNum type="arabicPeriod"/>
                       </a:pPr>
                       <a:r>
-                        <a:rPr lang="pt-BR" sz="1350" u="none" cap="none" strike="noStrike"/>
-                        <a:t>O operador seleciona a opção “cartão de crédito/débito”</a:t>
-                      </a:r>
-                      <a:endParaRPr sz="1350" u="none" cap="none" strike="noStrike"/>
+                        <a:rPr lang="pt-BR" sz="1350"/>
+                        <a:t>Administrador altera o dado desejado do produto (código de barras, nome, preço e/ou quantidade do produto)</a:t>
+                      </a:r>
+                      <a:endParaRPr sz="1350"/>
                     </a:p>
                     <a:p>
                       <a:pPr indent="-317500" lvl="0" marL="457200" marR="0" rtl="0" algn="l">
@@ -23496,14 +23787,13 @@
                           <a:schemeClr val="dk1"/>
                         </a:buClr>
                         <a:buSzPts val="1400"/>
-                        <a:buFont typeface="Arial"/>
                         <a:buAutoNum type="arabicPeriod"/>
                       </a:pPr>
                       <a:r>
-                        <a:rPr lang="pt-BR" sz="1350" u="none" cap="none" strike="noStrike"/>
-                        <a:t>O sistema envia para o sistema de pagamento os dados a respeito do valor da venda</a:t>
-                      </a:r>
-                      <a:endParaRPr sz="1350" u="none" cap="none" strike="noStrike"/>
+                        <a:rPr lang="pt-BR" sz="1350"/>
+                        <a:t>Administrador salva a edição dos dados</a:t>
+                      </a:r>
+                      <a:endParaRPr sz="1350"/>
                     </a:p>
                     <a:p>
                       <a:pPr indent="-317500" lvl="0" marL="457200" marR="0" rtl="0" algn="l">
@@ -23520,14 +23810,13 @@
                           <a:schemeClr val="dk1"/>
                         </a:buClr>
                         <a:buSzPts val="1400"/>
-                        <a:buFont typeface="Arial"/>
                         <a:buAutoNum type="arabicPeriod"/>
                       </a:pPr>
                       <a:r>
-                        <a:rPr lang="pt-BR" sz="1350" u="none" cap="none" strike="noStrike"/>
-                        <a:t>O sistema de pagamento informa ao sistema que a transação foi realizada com sucesso</a:t>
-                      </a:r>
-                      <a:endParaRPr sz="1350" u="none" cap="none" strike="noStrike"/>
+                        <a:rPr lang="pt-BR" sz="1350"/>
+                        <a:t>Sistema informa que o cadastro foi atualizado com sucesso</a:t>
+                      </a:r>
+                      <a:endParaRPr sz="1350"/>
                     </a:p>
                     <a:p>
                       <a:pPr indent="-317500" lvl="0" marL="457200" marR="0" rtl="0" algn="l">
@@ -23544,86 +23833,13 @@
                           <a:schemeClr val="dk1"/>
                         </a:buClr>
                         <a:buSzPts val="1400"/>
-                        <a:buFont typeface="Arial"/>
                         <a:buAutoNum type="arabicPeriod"/>
                       </a:pPr>
                       <a:r>
-                        <a:rPr lang="pt-BR" sz="1350" u="none" cap="none" strike="noStrike"/>
-                        <a:t>O sistema registra a saída dos produtos</a:t>
-                      </a:r>
-                      <a:endParaRPr sz="1350" u="none" cap="none" strike="noStrike"/>
-                    </a:p>
-                    <a:p>
-                      <a:pPr indent="-317500" lvl="0" marL="457200" marR="0" rtl="0" algn="l">
-                        <a:lnSpc>
-                          <a:spcPct val="100000"/>
-                        </a:lnSpc>
-                        <a:spcBef>
-                          <a:spcPts val="0"/>
-                        </a:spcBef>
-                        <a:spcAft>
-                          <a:spcPts val="0"/>
-                        </a:spcAft>
-                        <a:buClr>
-                          <a:schemeClr val="dk1"/>
-                        </a:buClr>
-                        <a:buSzPts val="1400"/>
-                        <a:buFont typeface="Arial"/>
-                        <a:buAutoNum type="arabicPeriod"/>
-                      </a:pPr>
-                      <a:r>
-                        <a:rPr lang="pt-BR" sz="1350" u="none" cap="none" strike="noStrike"/>
-                        <a:t>O sistema gera a nota fiscal</a:t>
-                      </a:r>
-                      <a:endParaRPr sz="1350" u="none" cap="none" strike="noStrike"/>
-                    </a:p>
-                    <a:p>
-                      <a:pPr indent="-317500" lvl="0" marL="457200" marR="0" rtl="0" algn="l">
-                        <a:lnSpc>
-                          <a:spcPct val="100000"/>
-                        </a:lnSpc>
-                        <a:spcBef>
-                          <a:spcPts val="0"/>
-                        </a:spcBef>
-                        <a:spcAft>
-                          <a:spcPts val="0"/>
-                        </a:spcAft>
-                        <a:buClr>
-                          <a:schemeClr val="dk1"/>
-                        </a:buClr>
-                        <a:buSzPts val="1400"/>
-                        <a:buFont typeface="Arial"/>
-                        <a:buAutoNum type="arabicPeriod"/>
-                      </a:pPr>
-                      <a:r>
-                        <a:rPr lang="pt-BR" sz="1350" u="none" cap="none" strike="noStrike"/>
-                        <a:t>O operador entrega a nota fiscal ao cliente</a:t>
-                      </a:r>
-                      <a:endParaRPr sz="1350" u="none" cap="none" strike="noStrike"/>
-                    </a:p>
-                    <a:p>
-                      <a:pPr indent="-317500" lvl="0" marL="457200" marR="0" rtl="0" algn="l">
-                        <a:lnSpc>
-                          <a:spcPct val="100000"/>
-                        </a:lnSpc>
-                        <a:spcBef>
-                          <a:spcPts val="0"/>
-                        </a:spcBef>
-                        <a:spcAft>
-                          <a:spcPts val="0"/>
-                        </a:spcAft>
-                        <a:buClr>
-                          <a:schemeClr val="dk1"/>
-                        </a:buClr>
-                        <a:buSzPts val="1400"/>
-                        <a:buFont typeface="Arial"/>
-                        <a:buAutoNum type="arabicPeriod"/>
-                      </a:pPr>
-                      <a:r>
-                        <a:rPr lang="pt-BR" sz="1350" u="none" cap="none" strike="noStrike"/>
-                        <a:t>O sistema informa que a venda foi concluída com sucesso</a:t>
-                      </a:r>
-                      <a:endParaRPr sz="1350" u="none" cap="none" strike="noStrike"/>
+                        <a:rPr lang="pt-BR" sz="1350"/>
+                        <a:t>Sistema retorna para a tela de controle de produtos</a:t>
+                      </a:r>
+                      <a:endParaRPr sz="1350"/>
                     </a:p>
                   </a:txBody>
                   <a:tcPr marT="91425" marB="91425" marR="91425" marL="91425"/>
@@ -23666,128 +23882,9 @@
                     <a:bodyPr/>
                     <a:lstStyle/>
                     <a:p>
-                      <a:pPr indent="0" lvl="0" marL="0" marR="0" rtl="0" algn="l">
+                      <a:pPr indent="0" lvl="0" marL="0" rtl="0" algn="l">
                         <a:lnSpc>
-                          <a:spcPct val="100000"/>
-                        </a:lnSpc>
-                        <a:spcBef>
-                          <a:spcPts val="0"/>
-                        </a:spcBef>
-                        <a:spcAft>
-                          <a:spcPts val="0"/>
-                        </a:spcAft>
-                        <a:buClr>
-                          <a:schemeClr val="lt1"/>
-                        </a:buClr>
-                        <a:buSzPts val="1350"/>
-                        <a:buFont typeface="Arial"/>
-                        <a:buNone/>
-                      </a:pPr>
-                      <a:r>
-                        <a:rPr lang="pt-BR" sz="1350" u="none" cap="none" strike="noStrike"/>
-                        <a:t>3.1    O operador seleciona a opção “dinheiro”</a:t>
-                      </a:r>
-                      <a:endParaRPr sz="1350" u="none" cap="none" strike="noStrike"/>
-                    </a:p>
-                    <a:p>
-                      <a:pPr indent="0" lvl="0" marL="0" marR="0" rtl="0" algn="l">
-                        <a:lnSpc>
-                          <a:spcPct val="100000"/>
-                        </a:lnSpc>
-                        <a:spcBef>
-                          <a:spcPts val="0"/>
-                        </a:spcBef>
-                        <a:spcAft>
-                          <a:spcPts val="0"/>
-                        </a:spcAft>
-                        <a:buClr>
-                          <a:schemeClr val="lt1"/>
-                        </a:buClr>
-                        <a:buSzPts val="1350"/>
-                        <a:buFont typeface="Arial"/>
-                        <a:buNone/>
-                      </a:pPr>
-                      <a:r>
-                        <a:rPr lang="pt-BR" sz="1350" u="none" cap="none" strike="noStrike"/>
-                        <a:t>3.1.1 O operador registra no sistema a quantia entregue pelo cliente</a:t>
-                      </a:r>
-                      <a:endParaRPr sz="1350" u="none" cap="none" strike="noStrike"/>
-                    </a:p>
-                    <a:p>
-                      <a:pPr indent="0" lvl="0" marL="0" marR="0" rtl="0" algn="l">
-                        <a:lnSpc>
-                          <a:spcPct val="100000"/>
-                        </a:lnSpc>
-                        <a:spcBef>
-                          <a:spcPts val="0"/>
-                        </a:spcBef>
-                        <a:spcAft>
-                          <a:spcPts val="0"/>
-                        </a:spcAft>
-                        <a:buClr>
-                          <a:schemeClr val="lt1"/>
-                        </a:buClr>
-                        <a:buSzPts val="1350"/>
-                        <a:buFont typeface="Arial"/>
-                        <a:buNone/>
-                      </a:pPr>
-                      <a:r>
-                        <a:t/>
-                      </a:r>
-                      <a:endParaRPr sz="1350" u="none" cap="none" strike="noStrike"/>
-                    </a:p>
-                    <a:p>
-                      <a:pPr indent="0" lvl="0" marL="0" marR="0" rtl="0" algn="l">
-                        <a:lnSpc>
-                          <a:spcPct val="100000"/>
-                        </a:lnSpc>
-                        <a:spcBef>
-                          <a:spcPts val="0"/>
-                        </a:spcBef>
-                        <a:spcAft>
-                          <a:spcPts val="0"/>
-                        </a:spcAft>
-                        <a:buClr>
-                          <a:schemeClr val="lt1"/>
-                        </a:buClr>
-                        <a:buSzPts val="1350"/>
-                        <a:buFont typeface="Arial"/>
-                        <a:buNone/>
-                      </a:pPr>
-                      <a:r>
-                        <a:rPr lang="pt-BR" sz="1350" u="none" cap="none" strike="noStrike"/>
-                        <a:t>5.1    O pagamento é confirmado pelo operador</a:t>
-                      </a:r>
-                      <a:endParaRPr sz="1350" u="none" cap="none" strike="noStrike"/>
-                    </a:p>
-                    <a:p>
-                      <a:pPr indent="0" lvl="0" marL="0" marR="0" rtl="0" algn="l">
-                        <a:lnSpc>
-                          <a:spcPct val="100000"/>
-                        </a:lnSpc>
-                        <a:spcBef>
-                          <a:spcPts val="0"/>
-                        </a:spcBef>
-                        <a:spcAft>
-                          <a:spcPts val="0"/>
-                        </a:spcAft>
-                        <a:buClr>
-                          <a:schemeClr val="lt1"/>
-                        </a:buClr>
-                        <a:buSzPts val="1350"/>
-                        <a:buFont typeface="Arial"/>
-                        <a:buNone/>
-                      </a:pPr>
-                      <a:r>
-                        <a:rPr lang="pt-BR" sz="1350" u="none" cap="none" strike="noStrike"/>
-                        <a:t>5.1.1 O sistema informa que a quantia entregue é superior ao valor total da venda</a:t>
-                      </a:r>
-                      <a:endParaRPr sz="1350" u="none" cap="none" strike="noStrike"/>
-                    </a:p>
-                    <a:p>
-                      <a:pPr indent="0" lvl="0" marL="0" marR="0" rtl="0" algn="l">
-                        <a:lnSpc>
-                          <a:spcPct val="100000"/>
+                          <a:spcPct val="115000"/>
                         </a:lnSpc>
                         <a:spcBef>
                           <a:spcPts val="0"/>
@@ -23803,19 +23900,15 @@
                         <a:buNone/>
                       </a:pPr>
                       <a:r>
-                        <a:rPr lang="pt-BR" sz="1350" u="none" cap="none" strike="noStrike">
-                          <a:solidFill>
-                            <a:schemeClr val="dk1"/>
-                          </a:solidFill>
-                        </a:rPr>
-                        <a:t>5.1.2 O sistema informa a quantia a ser estornada ao cliente</a:t>
-                      </a:r>
-                      <a:endParaRPr sz="1350" u="none" cap="none" strike="noStrike"/>
+                        <a:rPr lang="pt-BR" sz="1350"/>
+                        <a:t>4.1 Sistema informa que o novo código de barras informado já está em uso por outro produto</a:t>
+                      </a:r>
+                      <a:endParaRPr sz="1350"/>
                     </a:p>
                     <a:p>
-                      <a:pPr indent="0" lvl="0" marL="0" marR="0" rtl="0" algn="l">
+                      <a:pPr indent="0" lvl="0" marL="0" rtl="0" algn="l">
                         <a:lnSpc>
-                          <a:spcPct val="100000"/>
+                          <a:spcPct val="115000"/>
                         </a:lnSpc>
                         <a:spcBef>
                           <a:spcPts val="0"/>
@@ -23824,21 +23917,30 @@
                           <a:spcPts val="0"/>
                         </a:spcAft>
                         <a:buClr>
-                          <a:schemeClr val="lt1"/>
+                          <a:schemeClr val="dk1"/>
                         </a:buClr>
-                        <a:buSzPts val="1350"/>
+                        <a:buSzPts val="1100"/>
                         <a:buFont typeface="Arial"/>
                         <a:buNone/>
                       </a:pPr>
                       <a:r>
-                        <a:t/>
-                      </a:r>
-                      <a:endParaRPr sz="1350" u="none" cap="none" strike="noStrike"/>
+                        <a:rPr lang="pt-BR" sz="1350"/>
+                        <a:t>4.1.1 Administrador seleciona para cancelar a edição d</a:t>
+                      </a:r>
+                      <a:r>
+                        <a:rPr lang="pt-BR" sz="1350"/>
+                        <a:t>o </a:t>
+                      </a:r>
+                      <a:r>
+                        <a:rPr lang="pt-BR" sz="1350"/>
+                        <a:t>produto</a:t>
+                      </a:r>
+                      <a:endParaRPr sz="1350"/>
                     </a:p>
                     <a:p>
-                      <a:pPr indent="0" lvl="0" marL="0" marR="0" rtl="0" algn="l">
+                      <a:pPr indent="0" lvl="0" marL="0" rtl="0" algn="l">
                         <a:lnSpc>
-                          <a:spcPct val="100000"/>
+                          <a:spcPct val="115000"/>
                         </a:lnSpc>
                         <a:spcBef>
                           <a:spcPts val="0"/>
@@ -23847,16 +23949,17 @@
                           <a:spcPts val="0"/>
                         </a:spcAft>
                         <a:buClr>
-                          <a:schemeClr val="lt1"/>
+                          <a:schemeClr val="dk1"/>
                         </a:buClr>
-                        <a:buSzPts val="1350"/>
+                        <a:buSzPts val="1100"/>
                         <a:buFont typeface="Arial"/>
                         <a:buNone/>
                       </a:pPr>
                       <a:r>
-                        <a:t/>
-                      </a:r>
-                      <a:endParaRPr sz="1350" u="none" cap="none" strike="noStrike"/>
+                        <a:rPr lang="pt-BR" sz="1350"/>
+                        <a:t>4.1.2 Sistema retorna para a tela de controle de produtos</a:t>
+                      </a:r>
+                      <a:endParaRPr sz="1350"/>
                     </a:p>
                   </a:txBody>
                   <a:tcPr marT="91425" marB="91425" marR="91425" marL="91425"/>
@@ -23966,7 +24069,7 @@
             <a:tbl>
               <a:tblPr>
                 <a:noFill/>
-                <a:tableStyleId>{2FBA5331-9FB4-4AE7-B17D-9EC093DBF87E}</a:tableStyleId>
+                <a:tableStyleId>{50B2C5D1-D99D-4A31-A7E5-88A7BF6D1CC2}</a:tableStyleId>
               </a:tblPr>
               <a:tblGrid>
                 <a:gridCol w="2055275"/>
@@ -24028,7 +24131,11 @@
                       </a:pPr>
                       <a:r>
                         <a:rPr lang="pt-BR" sz="1350" u="none" cap="none" strike="noStrike"/>
-                        <a:t>UC8 - Remover um produto da venda</a:t>
+                        <a:t>UC8 - </a:t>
+                      </a:r>
+                      <a:r>
+                        <a:rPr lang="pt-BR" sz="1350"/>
+                        <a:t>Efetuar venda</a:t>
                       </a:r>
                       <a:endParaRPr sz="1350" u="none" cap="none" strike="noStrike"/>
                     </a:p>
@@ -24155,8 +24262,8 @@
                         <a:buNone/>
                       </a:pPr>
                       <a:r>
-                        <a:rPr lang="pt-BR" sz="1350" u="none" cap="none" strike="noStrike"/>
-                        <a:t>Operador de caixa deseja remover um produto adicionado na venda</a:t>
+                        <a:rPr lang="pt-BR" sz="1350"/>
+                        <a:t>O operador deseja iniciar uma nova venda para o cliente que se encontra atualmente no caixa</a:t>
                       </a:r>
                       <a:endParaRPr sz="1350" u="none" cap="none" strike="noStrike"/>
                     </a:p>
@@ -24220,7 +24327,11 @@
                       </a:pPr>
                       <a:r>
                         <a:rPr lang="pt-BR" sz="1350" u="none" cap="none" strike="noStrike"/>
-                        <a:t>UC7</a:t>
+                        <a:t>UC</a:t>
+                      </a:r>
+                      <a:r>
+                        <a:rPr lang="pt-BR" sz="1350"/>
+                        <a:t>1</a:t>
                       </a:r>
                       <a:endParaRPr sz="1350" u="none" cap="none" strike="noStrike"/>
                     </a:p>
@@ -24283,8 +24394,8 @@
                         <a:buNone/>
                       </a:pPr>
                       <a:r>
-                        <a:rPr lang="pt-BR" sz="1350" u="none" cap="none" strike="noStrike"/>
-                        <a:t>Cliente solicita a remoção de um produto</a:t>
+                        <a:rPr lang="pt-BR" sz="1350"/>
+                        <a:t>Acessar a funcionalidade de vendas no painel do operador de caixa</a:t>
                       </a:r>
                       <a:endParaRPr sz="1350" u="none" cap="none" strike="noStrike"/>
                     </a:p>
@@ -24347,8 +24458,8 @@
                         <a:buNone/>
                       </a:pPr>
                       <a:r>
-                        <a:rPr lang="pt-BR" sz="1350" u="none" cap="none" strike="noStrike"/>
-                        <a:t>Produto adicionado na venda</a:t>
+                        <a:rPr lang="pt-BR" sz="1350"/>
+                        <a:t>Usuário autenticado no sistema</a:t>
                       </a:r>
                       <a:endParaRPr sz="1350" u="none" cap="none" strike="noStrike"/>
                     </a:p>
@@ -24411,8 +24522,8 @@
                         <a:buNone/>
                       </a:pPr>
                       <a:r>
-                        <a:rPr lang="pt-BR" sz="1350" u="none" cap="none" strike="noStrike"/>
-                        <a:t>Produto seleciona removido da venda</a:t>
+                        <a:rPr lang="pt-BR" sz="1350"/>
+                        <a:t>Venda realizada ou cancelada</a:t>
                       </a:r>
                       <a:endParaRPr sz="1350" u="none" cap="none" strike="noStrike"/>
                     </a:p>
@@ -24524,7 +24635,7 @@
             <a:tbl>
               <a:tblPr>
                 <a:noFill/>
-                <a:tableStyleId>{2FBA5331-9FB4-4AE7-B17D-9EC093DBF87E}</a:tableStyleId>
+                <a:tableStyleId>{50B2C5D1-D99D-4A31-A7E5-88A7BF6D1CC2}</a:tableStyleId>
               </a:tblPr>
               <a:tblGrid>
                 <a:gridCol w="1180100"/>
@@ -25497,13 +25608,13 @@
             <a:tbl>
               <a:tblPr>
                 <a:noFill/>
-                <a:tableStyleId>{2FBA5331-9FB4-4AE7-B17D-9EC093DBF87E}</a:tableStyleId>
+                <a:tableStyleId>{50B2C5D1-D99D-4A31-A7E5-88A7BF6D1CC2}</a:tableStyleId>
               </a:tblPr>
               <a:tblGrid>
                 <a:gridCol w="2049100"/>
                 <a:gridCol w="5880300"/>
               </a:tblGrid>
-              <a:tr h="2555475">
+              <a:tr h="2586925">
                 <a:tc>
                   <a:txBody>
                     <a:bodyPr/>
@@ -25540,7 +25651,7 @@
                     <a:bodyPr/>
                     <a:lstStyle/>
                     <a:p>
-                      <a:pPr indent="-317500" lvl="0" marL="457200" marR="0" rtl="0" algn="l">
+                      <a:pPr indent="-314325" lvl="0" marL="457200" marR="0" rtl="0" algn="l">
                         <a:lnSpc>
                           <a:spcPct val="100000"/>
                         </a:lnSpc>
@@ -25550,21 +25661,17 @@
                         <a:spcAft>
                           <a:spcPts val="0"/>
                         </a:spcAft>
-                        <a:buClr>
-                          <a:schemeClr val="dk1"/>
-                        </a:buClr>
-                        <a:buSzPts val="1400"/>
-                        <a:buFont typeface="Arial"/>
+                        <a:buSzPts val="1350"/>
                         <a:buAutoNum type="arabicPeriod"/>
                       </a:pPr>
                       <a:r>
-                        <a:rPr lang="pt-BR" sz="1350" u="none" cap="none" strike="noStrike"/>
-                        <a:t>Operador seleciona produto desejado</a:t>
-                      </a:r>
-                      <a:endParaRPr sz="1350" u="none" cap="none" strike="noStrike"/>
+                        <a:rPr lang="pt-BR" sz="1350"/>
+                        <a:t>Operador de caixa seleciona para iniciar uma venda</a:t>
+                      </a:r>
+                      <a:endParaRPr sz="1350"/>
                     </a:p>
                     <a:p>
-                      <a:pPr indent="-317500" lvl="0" marL="457200" marR="0" rtl="0" algn="l">
+                      <a:pPr indent="-314325" lvl="0" marL="457200" marR="0" rtl="0" algn="l">
                         <a:lnSpc>
                           <a:spcPct val="100000"/>
                         </a:lnSpc>
@@ -25574,21 +25681,17 @@
                         <a:spcAft>
                           <a:spcPts val="0"/>
                         </a:spcAft>
-                        <a:buClr>
-                          <a:schemeClr val="dk1"/>
-                        </a:buClr>
-                        <a:buSzPts val="1400"/>
-                        <a:buFont typeface="Arial"/>
+                        <a:buSzPts val="1350"/>
                         <a:buAutoNum type="arabicPeriod"/>
                       </a:pPr>
                       <a:r>
-                        <a:rPr lang="pt-BR" sz="1350" u="none" cap="none" strike="noStrike"/>
-                        <a:t>Sistema marca produto como selecionado</a:t>
-                      </a:r>
-                      <a:endParaRPr sz="1350" u="none" cap="none" strike="noStrike"/>
+                        <a:rPr lang="pt-BR" sz="1350"/>
+                        <a:t>Operador de caixa insere o código de barras e quantidade de cada produto que o cliente deseja comprar</a:t>
+                      </a:r>
+                      <a:endParaRPr sz="1350"/>
                     </a:p>
                     <a:p>
-                      <a:pPr indent="-317500" lvl="0" marL="457200" marR="0" rtl="0" algn="l">
+                      <a:pPr indent="-314325" lvl="0" marL="457200" marR="0" rtl="0" algn="l">
                         <a:lnSpc>
                           <a:spcPct val="100000"/>
                         </a:lnSpc>
@@ -25598,21 +25701,17 @@
                         <a:spcAft>
                           <a:spcPts val="0"/>
                         </a:spcAft>
-                        <a:buClr>
-                          <a:schemeClr val="dk1"/>
-                        </a:buClr>
-                        <a:buSzPts val="1400"/>
-                        <a:buFont typeface="Arial"/>
+                        <a:buSzPts val="1350"/>
                         <a:buAutoNum type="arabicPeriod"/>
                       </a:pPr>
                       <a:r>
-                        <a:rPr lang="pt-BR" sz="1350" u="none" cap="none" strike="noStrike"/>
-                        <a:t>Operador seleciona opção de remover</a:t>
-                      </a:r>
-                      <a:endParaRPr sz="1350" u="none" cap="none" strike="noStrike"/>
+                        <a:rPr lang="pt-BR" sz="1350"/>
+                        <a:t>Operador de caixa seleciona para finalizar a venda</a:t>
+                      </a:r>
+                      <a:endParaRPr sz="1350"/>
                     </a:p>
                     <a:p>
-                      <a:pPr indent="-317500" lvl="0" marL="457200" marR="0" rtl="0" algn="l">
+                      <a:pPr indent="-314325" lvl="0" marL="457200" marR="0" rtl="0" algn="l">
                         <a:lnSpc>
                           <a:spcPct val="100000"/>
                         </a:lnSpc>
@@ -25622,21 +25721,17 @@
                         <a:spcAft>
                           <a:spcPts val="0"/>
                         </a:spcAft>
-                        <a:buClr>
-                          <a:schemeClr val="dk1"/>
-                        </a:buClr>
-                        <a:buSzPts val="1400"/>
-                        <a:buFont typeface="Arial"/>
+                        <a:buSzPts val="1350"/>
                         <a:buAutoNum type="arabicPeriod"/>
                       </a:pPr>
                       <a:r>
-                        <a:rPr lang="pt-BR" sz="1350" u="none" cap="none" strike="noStrike"/>
-                        <a:t>Sistema remove produto selecionado</a:t>
-                      </a:r>
-                      <a:endParaRPr sz="1350" u="none" cap="none" strike="noStrike"/>
+                        <a:rPr lang="pt-BR" sz="1350"/>
+                        <a:t>Sistema solicita a forma de pagamento desejada</a:t>
+                      </a:r>
+                      <a:endParaRPr sz="1350"/>
                     </a:p>
                     <a:p>
-                      <a:pPr indent="0" lvl="0" marL="457200" marR="0" rtl="0" algn="l">
+                      <a:pPr indent="-314325" lvl="0" marL="457200" marR="0" rtl="0" algn="l">
                         <a:lnSpc>
                           <a:spcPct val="100000"/>
                         </a:lnSpc>
@@ -25646,17 +25741,94 @@
                         <a:spcAft>
                           <a:spcPts val="0"/>
                         </a:spcAft>
-                        <a:buClr>
-                          <a:schemeClr val="lt1"/>
-                        </a:buClr>
                         <a:buSzPts val="1350"/>
-                        <a:buFont typeface="Arial"/>
-                        <a:buNone/>
+                        <a:buAutoNum type="arabicPeriod"/>
                       </a:pPr>
                       <a:r>
-                        <a:t/>
-                      </a:r>
-                      <a:endParaRPr sz="1350" u="none" cap="none" strike="noStrike"/>
+                        <a:rPr lang="pt-BR" sz="1350"/>
+                        <a:t>Operador de caixa seleciona “Pagamento em dinheiro”</a:t>
+                      </a:r>
+                      <a:endParaRPr sz="1350"/>
+                    </a:p>
+                    <a:p>
+                      <a:pPr indent="-314325" lvl="0" marL="457200" marR="0" rtl="0" algn="l">
+                        <a:lnSpc>
+                          <a:spcPct val="100000"/>
+                        </a:lnSpc>
+                        <a:spcBef>
+                          <a:spcPts val="0"/>
+                        </a:spcBef>
+                        <a:spcAft>
+                          <a:spcPts val="0"/>
+                        </a:spcAft>
+                        <a:buSzPts val="1350"/>
+                        <a:buAutoNum type="arabicPeriod"/>
+                      </a:pPr>
+                      <a:r>
+                        <a:rPr lang="pt-BR" sz="1350"/>
+                        <a:t>Operador de caixa confirma o pagamento do cliente</a:t>
+                      </a:r>
+                      <a:endParaRPr sz="1350"/>
+                    </a:p>
+                    <a:p>
+                      <a:pPr indent="-314325" lvl="0" marL="457200" marR="0" rtl="0" algn="l">
+                        <a:lnSpc>
+                          <a:spcPct val="100000"/>
+                        </a:lnSpc>
+                        <a:spcBef>
+                          <a:spcPts val="0"/>
+                        </a:spcBef>
+                        <a:spcAft>
+                          <a:spcPts val="0"/>
+                        </a:spcAft>
+                        <a:buSzPts val="1350"/>
+                        <a:buAutoNum type="arabicPeriod"/>
+                      </a:pPr>
+                      <a:r>
+                        <a:rPr lang="pt-BR" sz="1350"/>
+                        <a:t>Sistema registra a saída dos produtos</a:t>
+                      </a:r>
+                      <a:endParaRPr sz="1350"/>
+                    </a:p>
+                    <a:p>
+                      <a:pPr indent="-314325" lvl="0" marL="457200" marR="0" rtl="0" algn="l">
+                        <a:lnSpc>
+                          <a:spcPct val="100000"/>
+                        </a:lnSpc>
+                        <a:spcBef>
+                          <a:spcPts val="0"/>
+                        </a:spcBef>
+                        <a:spcAft>
+                          <a:spcPts val="0"/>
+                        </a:spcAft>
+                        <a:buSzPts val="1350"/>
+                        <a:buAutoNum type="arabicPeriod"/>
+                      </a:pPr>
+                      <a:r>
+                        <a:rPr lang="pt-BR" sz="1350"/>
+                        <a:t>Sistema gera a nota fiscal da venda</a:t>
+                      </a:r>
+                      <a:endParaRPr sz="1350"/>
+                    </a:p>
+                    <a:p>
+                      <a:pPr indent="-314325" lvl="0" marL="457200" marR="0" rtl="0" algn="l">
+                        <a:lnSpc>
+                          <a:spcPct val="100000"/>
+                        </a:lnSpc>
+                        <a:spcBef>
+                          <a:spcPts val="0"/>
+                        </a:spcBef>
+                        <a:spcAft>
+                          <a:spcPts val="0"/>
+                        </a:spcAft>
+                        <a:buSzPts val="1350"/>
+                        <a:buAutoNum type="arabicPeriod"/>
+                      </a:pPr>
+                      <a:r>
+                        <a:rPr lang="pt-BR" sz="1350"/>
+                        <a:t>Sistema retorna para o painel inicial do operador de caixa</a:t>
+                      </a:r>
+                      <a:endParaRPr sz="1350"/>
                     </a:p>
                   </a:txBody>
                   <a:tcPr marT="91425" marB="91425" marR="91425" marL="91425"/>
@@ -25710,16 +25882,89 @@
                           <a:spcPts val="0"/>
                         </a:spcAft>
                         <a:buClr>
-                          <a:schemeClr val="lt1"/>
+                          <a:schemeClr val="dk1"/>
                         </a:buClr>
-                        <a:buSzPts val="1350"/>
+                        <a:buSzPts val="1100"/>
                         <a:buFont typeface="Arial"/>
                         <a:buNone/>
                       </a:pPr>
                       <a:r>
-                        <a:t/>
-                      </a:r>
-                      <a:endParaRPr sz="1350" u="none" cap="none" strike="noStrike"/>
+                        <a:rPr lang="pt-BR" sz="1350"/>
+                        <a:t>2.1 Operador de caixa seleciona um produto adicionado no carrinho para removê-lo da compra</a:t>
+                      </a:r>
+                      <a:endParaRPr sz="1350"/>
+                    </a:p>
+                    <a:p>
+                      <a:pPr indent="0" lvl="0" marL="0" marR="0" rtl="0" algn="l">
+                        <a:lnSpc>
+                          <a:spcPct val="100000"/>
+                        </a:lnSpc>
+                        <a:spcBef>
+                          <a:spcPts val="0"/>
+                        </a:spcBef>
+                        <a:spcAft>
+                          <a:spcPts val="0"/>
+                        </a:spcAft>
+                        <a:buClr>
+                          <a:schemeClr val="dk1"/>
+                        </a:buClr>
+                        <a:buSzPts val="1100"/>
+                        <a:buFont typeface="Arial"/>
+                        <a:buNone/>
+                      </a:pPr>
+                      <a:r>
+                        <a:rPr lang="pt-BR" sz="1350"/>
+                        <a:t>2.1.1 Operador de caixa confirma a remoção do produto</a:t>
+                      </a:r>
+                      <a:endParaRPr sz="1350"/>
+                    </a:p>
+                    <a:p>
+                      <a:pPr indent="0" lvl="0" marL="0" marR="0" rtl="0" algn="l">
+                        <a:lnSpc>
+                          <a:spcPct val="100000"/>
+                        </a:lnSpc>
+                        <a:spcBef>
+                          <a:spcPts val="0"/>
+                        </a:spcBef>
+                        <a:spcAft>
+                          <a:spcPts val="0"/>
+                        </a:spcAft>
+                        <a:buClr>
+                          <a:schemeClr val="dk1"/>
+                        </a:buClr>
+                        <a:buSzPts val="1100"/>
+                        <a:buFont typeface="Arial"/>
+                        <a:buNone/>
+                      </a:pPr>
+                      <a:r>
+                        <a:rPr lang="pt-BR" sz="1350"/>
+                        <a:t>2.1.2 Sistema informa que o produto foi removido com sucesso</a:t>
+                      </a:r>
+                      <a:endParaRPr sz="1350"/>
+                    </a:p>
+                    <a:p>
+                      <a:pPr indent="0" lvl="0" marL="0" marR="0" rtl="0" algn="l">
+                        <a:lnSpc>
+                          <a:spcPct val="100000"/>
+                        </a:lnSpc>
+                        <a:spcBef>
+                          <a:spcPts val="0"/>
+                        </a:spcBef>
+                        <a:spcAft>
+                          <a:spcPts val="0"/>
+                        </a:spcAft>
+                        <a:buClr>
+                          <a:schemeClr val="dk1"/>
+                        </a:buClr>
+                        <a:buSzPts val="1100"/>
+                        <a:buFont typeface="Arial"/>
+                        <a:buNone/>
+                      </a:pPr>
+                      <a:r>
+                        <a:rPr lang="pt-BR" sz="1350"/>
+                        <a:t>Fluxo continua a partir da etapa 3 do fluxo principal</a:t>
+                      </a:r>
+                      <a:endParaRPr sz="1350"/>
                     </a:p>
                   </a:txBody>
                   <a:tcPr marT="91425" marB="91425" marR="91425" marL="91425"/>
@@ -25754,9 +25999,333 @@
           <a:chExt cx="0" cy="0"/>
         </a:xfrm>
       </p:grpSpPr>
+      <p:graphicFrame>
+        <p:nvGraphicFramePr>
+          <p:cNvPr id="237" name="Google Shape;237;gf42afdaaeb_0_58"/>
+          <p:cNvGraphicFramePr/>
+          <p:nvPr/>
+        </p:nvGraphicFramePr>
+        <p:xfrm>
+          <a:off x="826936" y="525775"/>
+          <a:ext cx="3000000" cy="3000000"/>
+        </p:xfrm>
+        <a:graphic>
+          <a:graphicData uri="http://schemas.openxmlformats.org/drawingml/2006/table">
+            <a:tbl>
+              <a:tblPr>
+                <a:noFill/>
+                <a:tableStyleId>{50B2C5D1-D99D-4A31-A7E5-88A7BF6D1CC2}</a:tableStyleId>
+              </a:tblPr>
+              <a:tblGrid>
+                <a:gridCol w="2049100"/>
+                <a:gridCol w="5880300"/>
+              </a:tblGrid>
+              <a:tr h="4511150">
+                <a:tc>
+                  <a:txBody>
+                    <a:bodyPr/>
+                    <a:lstStyle/>
+                    <a:p>
+                      <a:pPr indent="0" lvl="0" marL="0" marR="0" rtl="0" algn="l">
+                        <a:lnSpc>
+                          <a:spcPct val="100000"/>
+                        </a:lnSpc>
+                        <a:spcBef>
+                          <a:spcPts val="0"/>
+                        </a:spcBef>
+                        <a:spcAft>
+                          <a:spcPts val="0"/>
+                        </a:spcAft>
+                        <a:buClr>
+                          <a:schemeClr val="lt1"/>
+                        </a:buClr>
+                        <a:buSzPts val="1350"/>
+                        <a:buFont typeface="Arial"/>
+                        <a:buNone/>
+                      </a:pPr>
+                      <a:r>
+                        <a:rPr lang="pt-BR" sz="1350" u="none" cap="none" strike="noStrike"/>
+                        <a:t>Fluxo </a:t>
+                      </a:r>
+                      <a:r>
+                        <a:rPr lang="pt-BR" sz="1350">
+                          <a:solidFill>
+                            <a:schemeClr val="dk1"/>
+                          </a:solidFill>
+                        </a:rPr>
+                        <a:t>alternativo</a:t>
+                      </a:r>
+                      <a:endParaRPr sz="1350" u="none" cap="none" strike="noStrike"/>
+                    </a:p>
+                  </a:txBody>
+                  <a:tcPr marT="91425" marB="91425" marR="91425" marL="91425"/>
+                </a:tc>
+                <a:tc>
+                  <a:txBody>
+                    <a:bodyPr/>
+                    <a:lstStyle/>
+                    <a:p>
+                      <a:pPr indent="0" lvl="0" marL="0" rtl="0" algn="l">
+                        <a:lnSpc>
+                          <a:spcPct val="115000"/>
+                        </a:lnSpc>
+                        <a:spcBef>
+                          <a:spcPts val="0"/>
+                        </a:spcBef>
+                        <a:spcAft>
+                          <a:spcPts val="0"/>
+                        </a:spcAft>
+                        <a:buNone/>
+                      </a:pPr>
+                      <a:r>
+                        <a:rPr lang="pt-BR" sz="1350"/>
+                        <a:t>3.1 Operador de caixa seleciona para cancelar a venda</a:t>
+                      </a:r>
+                      <a:endParaRPr sz="1350"/>
+                    </a:p>
+                    <a:p>
+                      <a:pPr indent="0" lvl="0" marL="0" rtl="0" algn="l">
+                        <a:lnSpc>
+                          <a:spcPct val="115000"/>
+                        </a:lnSpc>
+                        <a:spcBef>
+                          <a:spcPts val="0"/>
+                        </a:spcBef>
+                        <a:spcAft>
+                          <a:spcPts val="0"/>
+                        </a:spcAft>
+                        <a:buNone/>
+                      </a:pPr>
+                      <a:r>
+                        <a:rPr lang="pt-BR" sz="1350"/>
+                        <a:t>3.1.1 Sistema solicita a confirmação para cancelar a venda</a:t>
+                      </a:r>
+                      <a:endParaRPr sz="1350"/>
+                    </a:p>
+                    <a:p>
+                      <a:pPr indent="0" lvl="0" marL="0" rtl="0" algn="l">
+                        <a:lnSpc>
+                          <a:spcPct val="115000"/>
+                        </a:lnSpc>
+                        <a:spcBef>
+                          <a:spcPts val="0"/>
+                        </a:spcBef>
+                        <a:spcAft>
+                          <a:spcPts val="0"/>
+                        </a:spcAft>
+                        <a:buNone/>
+                      </a:pPr>
+                      <a:r>
+                        <a:rPr lang="pt-BR" sz="1350"/>
+                        <a:t>3.1.2 Operador de caixa confirma o cancelamento da venda</a:t>
+                      </a:r>
+                      <a:endParaRPr sz="1350"/>
+                    </a:p>
+                    <a:p>
+                      <a:pPr indent="0" lvl="0" marL="0" rtl="0" algn="l">
+                        <a:lnSpc>
+                          <a:spcPct val="115000"/>
+                        </a:lnSpc>
+                        <a:spcBef>
+                          <a:spcPts val="0"/>
+                        </a:spcBef>
+                        <a:spcAft>
+                          <a:spcPts val="0"/>
+                        </a:spcAft>
+                        <a:buNone/>
+                      </a:pPr>
+                      <a:r>
+                        <a:rPr lang="pt-BR" sz="1350"/>
+                        <a:t>3.1.3 Sistema retorna para o painel inicial do operador de caixa</a:t>
+                      </a:r>
+                      <a:endParaRPr sz="1350"/>
+                    </a:p>
+                    <a:p>
+                      <a:pPr indent="0" lvl="0" marL="0" rtl="0" algn="l">
+                        <a:lnSpc>
+                          <a:spcPct val="115000"/>
+                        </a:lnSpc>
+                        <a:spcBef>
+                          <a:spcPts val="0"/>
+                        </a:spcBef>
+                        <a:spcAft>
+                          <a:spcPts val="0"/>
+                        </a:spcAft>
+                        <a:buNone/>
+                      </a:pPr>
+                      <a:r>
+                        <a:t/>
+                      </a:r>
+                      <a:endParaRPr sz="1350"/>
+                    </a:p>
+                    <a:p>
+                      <a:pPr indent="0" lvl="0" marL="0" rtl="0" algn="l">
+                        <a:lnSpc>
+                          <a:spcPct val="115000"/>
+                        </a:lnSpc>
+                        <a:spcBef>
+                          <a:spcPts val="0"/>
+                        </a:spcBef>
+                        <a:spcAft>
+                          <a:spcPts val="0"/>
+                        </a:spcAft>
+                        <a:buNone/>
+                      </a:pPr>
+                      <a:r>
+                        <a:rPr lang="pt-BR" sz="1350"/>
+                        <a:t>3.1.2.1 Operador de caixa cancela o cancelamento da venda</a:t>
+                      </a:r>
+                      <a:endParaRPr sz="1350"/>
+                    </a:p>
+                    <a:p>
+                      <a:pPr indent="0" lvl="0" marL="0" rtl="0" algn="l">
+                        <a:lnSpc>
+                          <a:spcPct val="115000"/>
+                        </a:lnSpc>
+                        <a:spcBef>
+                          <a:spcPts val="0"/>
+                        </a:spcBef>
+                        <a:spcAft>
+                          <a:spcPts val="0"/>
+                        </a:spcAft>
+                        <a:buNone/>
+                      </a:pPr>
+                      <a:r>
+                        <a:rPr lang="pt-BR" sz="1350"/>
+                        <a:t>3.1.2.2 Sistema retorna para a tela da venda em andamento</a:t>
+                      </a:r>
+                      <a:endParaRPr sz="1350"/>
+                    </a:p>
+                    <a:p>
+                      <a:pPr indent="0" lvl="0" marL="0" rtl="0" algn="l">
+                        <a:lnSpc>
+                          <a:spcPct val="115000"/>
+                        </a:lnSpc>
+                        <a:spcBef>
+                          <a:spcPts val="0"/>
+                        </a:spcBef>
+                        <a:spcAft>
+                          <a:spcPts val="0"/>
+                        </a:spcAft>
+                        <a:buNone/>
+                      </a:pPr>
+                      <a:r>
+                        <a:t/>
+                      </a:r>
+                      <a:endParaRPr sz="1350"/>
+                    </a:p>
+                    <a:p>
+                      <a:pPr indent="0" lvl="0" marL="0" rtl="0" algn="l">
+                        <a:lnSpc>
+                          <a:spcPct val="115000"/>
+                        </a:lnSpc>
+                        <a:spcBef>
+                          <a:spcPts val="0"/>
+                        </a:spcBef>
+                        <a:spcAft>
+                          <a:spcPts val="0"/>
+                        </a:spcAft>
+                        <a:buNone/>
+                      </a:pPr>
+                      <a:r>
+                        <a:rPr lang="pt-BR" sz="1350"/>
+                        <a:t>5.1 Operador de caixa seleciona “Pagamento com cartão de crédito”</a:t>
+                      </a:r>
+                      <a:endParaRPr sz="1350"/>
+                    </a:p>
+                    <a:p>
+                      <a:pPr indent="0" lvl="0" marL="0" rtl="0" algn="l">
+                        <a:lnSpc>
+                          <a:spcPct val="115000"/>
+                        </a:lnSpc>
+                        <a:spcBef>
+                          <a:spcPts val="0"/>
+                        </a:spcBef>
+                        <a:spcAft>
+                          <a:spcPts val="0"/>
+                        </a:spcAft>
+                        <a:buNone/>
+                      </a:pPr>
+                      <a:r>
+                        <a:rPr lang="pt-BR" sz="1350"/>
+                        <a:t>5.1.1 Sistema envia os dados do valor da venda para o sistema de pagamentos</a:t>
+                      </a:r>
+                      <a:endParaRPr sz="1350"/>
+                    </a:p>
+                    <a:p>
+                      <a:pPr indent="0" lvl="0" marL="0" rtl="0" algn="l">
+                        <a:lnSpc>
+                          <a:spcPct val="115000"/>
+                        </a:lnSpc>
+                        <a:spcBef>
+                          <a:spcPts val="0"/>
+                        </a:spcBef>
+                        <a:spcAft>
+                          <a:spcPts val="0"/>
+                        </a:spcAft>
+                        <a:buNone/>
+                      </a:pPr>
+                      <a:r>
+                        <a:rPr lang="pt-BR" sz="1350"/>
+                        <a:t>5.1.2 Sistema de pagamentos informa ao sistema de vendas que a transação foi concluída com sucesso</a:t>
+                      </a:r>
+                      <a:endParaRPr sz="1350"/>
+                    </a:p>
+                    <a:p>
+                      <a:pPr indent="0" lvl="0" marL="0" rtl="0" algn="l">
+                        <a:lnSpc>
+                          <a:spcPct val="115000"/>
+                        </a:lnSpc>
+                        <a:spcBef>
+                          <a:spcPts val="0"/>
+                        </a:spcBef>
+                        <a:spcAft>
+                          <a:spcPts val="0"/>
+                        </a:spcAft>
+                        <a:buNone/>
+                      </a:pPr>
+                      <a:r>
+                        <a:rPr lang="pt-BR" sz="1350"/>
+                        <a:t>Fluxo continua a partir da etapa 7 do fluxo principal</a:t>
+                      </a:r>
+                      <a:endParaRPr sz="1350"/>
+                    </a:p>
+                  </a:txBody>
+                  <a:tcPr marT="91425" marB="91425" marR="91425" marL="91425"/>
+                </a:tc>
+              </a:tr>
+            </a:tbl>
+          </a:graphicData>
+        </a:graphic>
+      </p:graphicFrame>
+    </p:spTree>
+  </p:cSld>
+  <p:clrMapOvr>
+    <a:masterClrMapping/>
+  </p:clrMapOvr>
+</p:sld>
+</file>
+
+<file path=ppt/slides/slide22.xml><?xml version="1.0" encoding="utf-8"?>
+<p:sld xmlns:a="http://schemas.openxmlformats.org/drawingml/2006/main" xmlns:r="http://schemas.openxmlformats.org/officeDocument/2006/relationships" xmlns:mc="http://schemas.openxmlformats.org/markup-compatibility/2006" xmlns:mv="urn:schemas-microsoft-com:mac:vml" xmlns:p="http://schemas.openxmlformats.org/presentationml/2006/main" xmlns:c="http://schemas.openxmlformats.org/drawingml/2006/chart" xmlns:dgm="http://schemas.openxmlformats.org/drawingml/2006/diagram" xmlns:o="urn:schemas-microsoft-com:office:office" xmlns:v="urn:schemas-microsoft-com:vml" xmlns:pvml="urn:schemas-microsoft-com:office:powerpoint" xmlns:com="http://schemas.openxmlformats.org/drawingml/2006/compatibility" xmlns:p14="http://schemas.microsoft.com/office/powerpoint/2010/main" xmlns:p15="http://schemas.microsoft.com/office/powerpoint/2012/main" xmlns:ahyp="http://schemas.microsoft.com/office/drawing/2018/hyperlinkcolor">
+  <p:cSld>
+    <p:spTree>
+      <p:nvGrpSpPr>
+        <p:cNvPr id="241" name="Shape 241"/>
+        <p:cNvGrpSpPr/>
+        <p:nvPr/>
+      </p:nvGrpSpPr>
+      <p:grpSpPr>
+        <a:xfrm>
+          <a:off x="0" y="0"/>
+          <a:ext cx="0" cy="0"/>
+          <a:chOff x="0" y="0"/>
+          <a:chExt cx="0" cy="0"/>
+        </a:xfrm>
+      </p:grpSpPr>
       <p:sp>
         <p:nvSpPr>
-          <p:cNvPr id="237" name="Google Shape;237;p18"/>
+          <p:cNvPr id="242" name="Google Shape;242;p18"/>
           <p:cNvSpPr txBox="1"/>
           <p:nvPr>
             <p:ph type="title"/>
@@ -25816,7 +26385,7 @@
       </p:sp>
       <p:graphicFrame>
         <p:nvGraphicFramePr>
-          <p:cNvPr id="238" name="Google Shape;238;p18"/>
+          <p:cNvPr id="243" name="Google Shape;243;p18"/>
           <p:cNvGraphicFramePr/>
           <p:nvPr/>
         </p:nvGraphicFramePr>
@@ -25829,7 +26398,7 @@
             <a:tbl>
               <a:tblPr>
                 <a:noFill/>
-                <a:tableStyleId>{2FBA5331-9FB4-4AE7-B17D-9EC093DBF87E}</a:tableStyleId>
+                <a:tableStyleId>{50B2C5D1-D99D-4A31-A7E5-88A7BF6D1CC2}</a:tableStyleId>
               </a:tblPr>
               <a:tblGrid>
                 <a:gridCol w="2051150"/>
@@ -25891,7 +26460,11 @@
                       </a:pPr>
                       <a:r>
                         <a:rPr lang="pt-BR" sz="1350" u="none" cap="none" strike="noStrike"/>
-                        <a:t>UC9 - Cancelar venda</a:t>
+                        <a:t>UC9 - </a:t>
+                      </a:r>
+                      <a:r>
+                        <a:rPr lang="pt-BR" sz="1350"/>
+                        <a:t>Verificar preço do produto</a:t>
                       </a:r>
                       <a:endParaRPr sz="1350" u="none" cap="none" strike="noStrike"/>
                     </a:p>
@@ -26018,8 +26591,8 @@
                         <a:buNone/>
                       </a:pPr>
                       <a:r>
-                        <a:rPr lang="pt-BR" sz="1350" u="none" cap="none" strike="noStrike"/>
-                        <a:t>Cliente deseja cancelar compra</a:t>
+                        <a:rPr lang="pt-BR" sz="1350"/>
+                        <a:t>O cliente solicitou ao operador do caixa para verificar o preço de um determinado produto sem adicioná-lo ao carrinho</a:t>
                       </a:r>
                       <a:endParaRPr sz="1350" u="none" cap="none" strike="noStrike"/>
                     </a:p>
@@ -26082,8 +26655,8 @@
                         <a:buNone/>
                       </a:pPr>
                       <a:r>
-                        <a:rPr lang="pt-BR" sz="1350" u="none" cap="none" strike="noStrike"/>
-                        <a:t>UC7</a:t>
+                        <a:rPr lang="pt-BR" sz="1350"/>
+                        <a:t>UC1, UC8</a:t>
                       </a:r>
                       <a:endParaRPr sz="1350" u="none" cap="none" strike="noStrike"/>
                     </a:p>
@@ -26146,8 +26719,8 @@
                         <a:buNone/>
                       </a:pPr>
                       <a:r>
-                        <a:rPr lang="pt-BR" sz="1350" u="none" cap="none" strike="noStrike"/>
-                        <a:t>Cliente solicita o cancelamento da venda</a:t>
+                        <a:rPr lang="pt-BR" sz="1350"/>
+                        <a:t>Acessar a funcionalidade de consulta de preços no painel do operador de caixa</a:t>
                       </a:r>
                       <a:endParaRPr sz="1350" u="none" cap="none" strike="noStrike"/>
                     </a:p>
@@ -26210,8 +26783,32 @@
                         <a:buNone/>
                       </a:pPr>
                       <a:r>
-                        <a:rPr lang="pt-BR" sz="1350" u="none" cap="none" strike="noStrike"/>
-                        <a:t>Ter sido efetuado o registro de produtos na venda</a:t>
+                        <a:rPr lang="pt-BR" sz="1350"/>
+                        <a:t>Usuário autenticado no sistema</a:t>
+                      </a:r>
+                      <a:endParaRPr sz="1350"/>
+                    </a:p>
+                    <a:p>
+                      <a:pPr indent="0" lvl="0" marL="0" marR="0" rtl="0" algn="l">
+                        <a:lnSpc>
+                          <a:spcPct val="100000"/>
+                        </a:lnSpc>
+                        <a:spcBef>
+                          <a:spcPts val="0"/>
+                        </a:spcBef>
+                        <a:spcAft>
+                          <a:spcPts val="0"/>
+                        </a:spcAft>
+                        <a:buClr>
+                          <a:schemeClr val="lt1"/>
+                        </a:buClr>
+                        <a:buSzPts val="1350"/>
+                        <a:buFont typeface="Arial"/>
+                        <a:buNone/>
+                      </a:pPr>
+                      <a:r>
+                        <a:rPr lang="pt-BR" sz="1350"/>
+                        <a:t>Venda em andamento</a:t>
                       </a:r>
                       <a:endParaRPr sz="1350" u="none" cap="none" strike="noStrike"/>
                     </a:p>
@@ -26274,8 +26871,8 @@
                         <a:buNone/>
                       </a:pPr>
                       <a:r>
-                        <a:rPr lang="pt-BR" sz="1350" u="none" cap="none" strike="noStrike"/>
-                        <a:t>Venda cancelada</a:t>
+                        <a:rPr lang="pt-BR" sz="1350"/>
+                        <a:t>Preço do produto consultado</a:t>
                       </a:r>
                       <a:endParaRPr sz="1350" u="none" cap="none" strike="noStrike"/>
                     </a:p>
@@ -26295,12 +26892,12 @@
 </p:sld>
 </file>
 
-<file path=ppt/slides/slide22.xml><?xml version="1.0" encoding="utf-8"?>
+<file path=ppt/slides/slide23.xml><?xml version="1.0" encoding="utf-8"?>
 <p:sld xmlns:a="http://schemas.openxmlformats.org/drawingml/2006/main" xmlns:r="http://schemas.openxmlformats.org/officeDocument/2006/relationships" xmlns:mc="http://schemas.openxmlformats.org/markup-compatibility/2006" xmlns:mv="urn:schemas-microsoft-com:mac:vml" xmlns:p="http://schemas.openxmlformats.org/presentationml/2006/main" xmlns:c="http://schemas.openxmlformats.org/drawingml/2006/chart" xmlns:dgm="http://schemas.openxmlformats.org/drawingml/2006/diagram" xmlns:o="urn:schemas-microsoft-com:office:office" xmlns:v="urn:schemas-microsoft-com:vml" xmlns:pvml="urn:schemas-microsoft-com:office:powerpoint" xmlns:com="http://schemas.openxmlformats.org/drawingml/2006/compatibility" xmlns:p14="http://schemas.microsoft.com/office/powerpoint/2010/main" xmlns:p15="http://schemas.microsoft.com/office/powerpoint/2012/main" xmlns:ahyp="http://schemas.microsoft.com/office/drawing/2018/hyperlinkcolor">
   <p:cSld>
     <p:spTree>
       <p:nvGrpSpPr>
-        <p:cNvPr id="242" name="Shape 242"/>
+        <p:cNvPr id="247" name="Shape 247"/>
         <p:cNvGrpSpPr/>
         <p:nvPr/>
       </p:nvGrpSpPr>
@@ -26314,7 +26911,7 @@
       </p:grpSpPr>
       <p:graphicFrame>
         <p:nvGraphicFramePr>
-          <p:cNvPr id="243" name="Google Shape;243;p19"/>
+          <p:cNvPr id="248" name="Google Shape;248;p19"/>
           <p:cNvGraphicFramePr/>
           <p:nvPr/>
         </p:nvGraphicFramePr>
@@ -26327,7 +26924,7 @@
             <a:tbl>
               <a:tblPr>
                 <a:noFill/>
-                <a:tableStyleId>{2FBA5331-9FB4-4AE7-B17D-9EC093DBF87E}</a:tableStyleId>
+                <a:tableStyleId>{50B2C5D1-D99D-4A31-A7E5-88A7BF6D1CC2}</a:tableStyleId>
               </a:tblPr>
               <a:tblGrid>
                 <a:gridCol w="2055275"/>
@@ -26384,14 +26981,13 @@
                           <a:schemeClr val="dk1"/>
                         </a:buClr>
                         <a:buSzPts val="1400"/>
-                        <a:buFont typeface="Arial"/>
                         <a:buAutoNum type="arabicPeriod"/>
                       </a:pPr>
                       <a:r>
-                        <a:rPr lang="pt-BR" sz="1350" u="none" cap="none" strike="noStrike"/>
-                        <a:t>Operador seleciona a opção de cancelar venda</a:t>
-                      </a:r>
-                      <a:endParaRPr sz="1350" u="none" cap="none" strike="noStrike"/>
+                        <a:rPr lang="pt-BR" sz="1350"/>
+                        <a:t>Operador de caixa seleciona em seu painel para verificar o preço de um produto</a:t>
+                      </a:r>
+                      <a:endParaRPr sz="1350"/>
                     </a:p>
                     <a:p>
                       <a:pPr indent="-317500" lvl="0" marL="457200" marR="0" rtl="0" algn="l">
@@ -26408,14 +27004,13 @@
                           <a:schemeClr val="dk1"/>
                         </a:buClr>
                         <a:buSzPts val="1400"/>
-                        <a:buFont typeface="Arial"/>
                         <a:buAutoNum type="arabicPeriod"/>
                       </a:pPr>
                       <a:r>
-                        <a:rPr lang="pt-BR" sz="1350" u="none" cap="none" strike="noStrike"/>
-                        <a:t>Sistema apresenta tela de confirmação de cancelamento</a:t>
-                      </a:r>
-                      <a:endParaRPr sz="1350" u="none" cap="none" strike="noStrike"/>
+                        <a:rPr lang="pt-BR" sz="1350"/>
+                        <a:t>Sistema solicita o código de barras do produto</a:t>
+                      </a:r>
+                      <a:endParaRPr sz="1350"/>
                     </a:p>
                     <a:p>
                       <a:pPr indent="-317500" lvl="0" marL="457200" marR="0" rtl="0" algn="l">
@@ -26432,14 +27027,13 @@
                           <a:schemeClr val="dk1"/>
                         </a:buClr>
                         <a:buSzPts val="1400"/>
-                        <a:buFont typeface="Arial"/>
                         <a:buAutoNum type="arabicPeriod"/>
                       </a:pPr>
                       <a:r>
-                        <a:rPr lang="pt-BR" sz="1350" u="none" cap="none" strike="noStrike"/>
-                        <a:t>Operador seleciona a opção de confirmar cancelamento</a:t>
-                      </a:r>
-                      <a:endParaRPr sz="1350" u="none" cap="none" strike="noStrike"/>
+                        <a:rPr lang="pt-BR" sz="1350"/>
+                        <a:t>Operador de caixa preenche o código de barras do produto</a:t>
+                      </a:r>
+                      <a:endParaRPr sz="1350"/>
                     </a:p>
                     <a:p>
                       <a:pPr indent="-317500" lvl="0" marL="457200" marR="0" rtl="0" algn="l">
@@ -26456,14 +27050,82 @@
                           <a:schemeClr val="dk1"/>
                         </a:buClr>
                         <a:buSzPts val="1400"/>
-                        <a:buFont typeface="Arial"/>
                         <a:buAutoNum type="arabicPeriod"/>
                       </a:pPr>
                       <a:r>
-                        <a:rPr lang="pt-BR" sz="1350" u="none" cap="none" strike="noStrike"/>
-                        <a:t>Sistema retorna mensagem de venda cancelada</a:t>
-                      </a:r>
-                      <a:endParaRPr sz="1350" u="none" cap="none" strike="noStrike"/>
+                        <a:rPr lang="pt-BR" sz="1350"/>
+                        <a:t>Sistema informa o preço do produto cadastrado com esse código de barras</a:t>
+                      </a:r>
+                      <a:endParaRPr sz="1350"/>
+                    </a:p>
+                    <a:p>
+                      <a:pPr indent="-317500" lvl="0" marL="457200" marR="0" rtl="0" algn="l">
+                        <a:lnSpc>
+                          <a:spcPct val="100000"/>
+                        </a:lnSpc>
+                        <a:spcBef>
+                          <a:spcPts val="0"/>
+                        </a:spcBef>
+                        <a:spcAft>
+                          <a:spcPts val="0"/>
+                        </a:spcAft>
+                        <a:buClr>
+                          <a:schemeClr val="dk1"/>
+                        </a:buClr>
+                        <a:buSzPts val="1400"/>
+                        <a:buAutoNum type="arabicPeriod"/>
+                      </a:pPr>
+                      <a:r>
+                        <a:rPr lang="pt-BR" sz="1350"/>
+                        <a:t>Operador de caixa informa ao cliente o preço do produto</a:t>
+                      </a:r>
+                      <a:endParaRPr sz="1350"/>
+                    </a:p>
+                    <a:p>
+                      <a:pPr indent="-317500" lvl="0" marL="457200" marR="0" rtl="0" algn="l">
+                        <a:lnSpc>
+                          <a:spcPct val="100000"/>
+                        </a:lnSpc>
+                        <a:spcBef>
+                          <a:spcPts val="0"/>
+                        </a:spcBef>
+                        <a:spcAft>
+                          <a:spcPts val="0"/>
+                        </a:spcAft>
+                        <a:buClr>
+                          <a:schemeClr val="dk1"/>
+                        </a:buClr>
+                        <a:buSzPts val="1400"/>
+                        <a:buAutoNum type="arabicPeriod"/>
+                      </a:pPr>
+                      <a:r>
+                        <a:rPr lang="pt-BR" sz="1350"/>
+                        <a:t>Operador de caixa fecha a consulta de preço</a:t>
+                      </a:r>
+                      <a:endParaRPr sz="1350"/>
+                    </a:p>
+                    <a:p>
+                      <a:pPr indent="-317500" lvl="0" marL="457200" marR="0" rtl="0" algn="l">
+                        <a:lnSpc>
+                          <a:spcPct val="100000"/>
+                        </a:lnSpc>
+                        <a:spcBef>
+                          <a:spcPts val="0"/>
+                        </a:spcBef>
+                        <a:spcAft>
+                          <a:spcPts val="0"/>
+                        </a:spcAft>
+                        <a:buClr>
+                          <a:schemeClr val="dk1"/>
+                        </a:buClr>
+                        <a:buSzPts val="1400"/>
+                        <a:buAutoNum type="arabicPeriod"/>
+                      </a:pPr>
+                      <a:r>
+                        <a:rPr lang="pt-BR" sz="1350"/>
+                        <a:t>Sistema retorna para a tela da venda em andamento</a:t>
+                      </a:r>
+                      <a:endParaRPr sz="1350"/>
                     </a:p>
                   </a:txBody>
                   <a:tcPr marT="91425" marB="91425" marR="91425" marL="91425"/>
@@ -26524,10 +27186,10 @@
                         <a:buNone/>
                       </a:pPr>
                       <a:r>
-                        <a:rPr lang="pt-BR" sz="1350" u="none" cap="none" strike="noStrike"/>
-                        <a:t>3.1	Operador seleciona a opção de voltar</a:t>
-                      </a:r>
-                      <a:endParaRPr sz="1350" u="none" cap="none" strike="noStrike"/>
+                        <a:rPr lang="pt-BR" sz="1350"/>
+                        <a:t>4.1 Sistema informa que o código informado não possui um produto atrelado</a:t>
+                      </a:r>
+                      <a:endParaRPr sz="1350"/>
                     </a:p>
                     <a:p>
                       <a:pPr indent="0" lvl="0" marL="0" marR="0" rtl="0" algn="l">
@@ -26541,17 +27203,41 @@
                           <a:spcPts val="0"/>
                         </a:spcAft>
                         <a:buClr>
-                          <a:schemeClr val="lt1"/>
+                          <a:schemeClr val="dk1"/>
                         </a:buClr>
-                        <a:buSzPts val="1350"/>
+                        <a:buSzPts val="1100"/>
                         <a:buFont typeface="Arial"/>
                         <a:buNone/>
                       </a:pPr>
                       <a:r>
-                        <a:rPr lang="pt-BR" sz="1350" u="none" cap="none" strike="noStrike"/>
-                        <a:t>3.1.1 Sistema retorna para a tela de venda</a:t>
-                      </a:r>
-                      <a:endParaRPr sz="1350" u="none" cap="none" strike="noStrike"/>
+                        <a:rPr lang="pt-BR" sz="1350"/>
+                        <a:t>4.1.1 Operador de caixa fecha a consulta de preço</a:t>
+                      </a:r>
+                      <a:endParaRPr sz="1350"/>
+                    </a:p>
+                    <a:p>
+                      <a:pPr indent="0" lvl="0" marL="0" marR="0" rtl="0" algn="l">
+                        <a:lnSpc>
+                          <a:spcPct val="100000"/>
+                        </a:lnSpc>
+                        <a:spcBef>
+                          <a:spcPts val="0"/>
+                        </a:spcBef>
+                        <a:spcAft>
+                          <a:spcPts val="0"/>
+                        </a:spcAft>
+                        <a:buClr>
+                          <a:schemeClr val="dk1"/>
+                        </a:buClr>
+                        <a:buSzPts val="1100"/>
+                        <a:buFont typeface="Arial"/>
+                        <a:buNone/>
+                      </a:pPr>
+                      <a:r>
+                        <a:rPr lang="pt-BR" sz="1350"/>
+                        <a:t>4.1.2 Sistema retorna para a tela da venda em andamento</a:t>
+                      </a:r>
+                      <a:endParaRPr sz="1350"/>
                     </a:p>
                   </a:txBody>
                   <a:tcPr marT="91425" marB="91425" marR="91425" marL="91425"/>
@@ -26661,7 +27347,7 @@
             <a:tbl>
               <a:tblPr>
                 <a:noFill/>
-                <a:tableStyleId>{2FBA5331-9FB4-4AE7-B17D-9EC093DBF87E}</a:tableStyleId>
+                <a:tableStyleId>{50B2C5D1-D99D-4A31-A7E5-88A7BF6D1CC2}</a:tableStyleId>
               </a:tblPr>
               <a:tblGrid>
                 <a:gridCol w="761900"/>
@@ -27973,7 +28659,7 @@
             <a:tbl>
               <a:tblPr>
                 <a:noFill/>
-                <a:tableStyleId>{2FBA5331-9FB4-4AE7-B17D-9EC093DBF87E}</a:tableStyleId>
+                <a:tableStyleId>{50B2C5D1-D99D-4A31-A7E5-88A7BF6D1CC2}</a:tableStyleId>
               </a:tblPr>
               <a:tblGrid>
                 <a:gridCol w="2129750"/>
@@ -28411,7 +29097,7 @@
             <a:tbl>
               <a:tblPr>
                 <a:noFill/>
-                <a:tableStyleId>{2FBA5331-9FB4-4AE7-B17D-9EC093DBF87E}</a:tableStyleId>
+                <a:tableStyleId>{50B2C5D1-D99D-4A31-A7E5-88A7BF6D1CC2}</a:tableStyleId>
               </a:tblPr>
               <a:tblGrid>
                 <a:gridCol w="2042950"/>
@@ -28928,7 +29614,7 @@
             <a:tbl>
               <a:tblPr>
                 <a:noFill/>
-                <a:tableStyleId>{2FBA5331-9FB4-4AE7-B17D-9EC093DBF87E}</a:tableStyleId>
+                <a:tableStyleId>{50B2C5D1-D99D-4A31-A7E5-88A7BF6D1CC2}</a:tableStyleId>
               </a:tblPr>
               <a:tblGrid>
                 <a:gridCol w="2045000"/>
@@ -28985,14 +29671,13 @@
                           <a:schemeClr val="dk1"/>
                         </a:buClr>
                         <a:buSzPts val="1400"/>
-                        <a:buFont typeface="Arial"/>
                         <a:buAutoNum type="arabicPeriod"/>
                       </a:pPr>
                       <a:r>
-                        <a:rPr lang="pt-BR" sz="1350" u="none" cap="none" strike="noStrike"/>
-                        <a:t>Usuário inicia sistema</a:t>
-                      </a:r>
-                      <a:endParaRPr sz="1350" u="none" cap="none" strike="noStrike"/>
+                        <a:rPr lang="pt-BR" sz="1350"/>
+                        <a:t>Usuário inicia o sistema</a:t>
+                      </a:r>
+                      <a:endParaRPr sz="1350"/>
                     </a:p>
                     <a:p>
                       <a:pPr indent="-317500" lvl="0" marL="457200" marR="0" rtl="0" algn="l">
@@ -29009,14 +29694,13 @@
                           <a:schemeClr val="dk1"/>
                         </a:buClr>
                         <a:buSzPts val="1400"/>
-                        <a:buFont typeface="Arial"/>
                         <a:buAutoNum type="arabicPeriod"/>
                       </a:pPr>
                       <a:r>
-                        <a:rPr lang="pt-BR" sz="1350" u="none" cap="none" strike="noStrike"/>
-                        <a:t>Usuário acessa página de login</a:t>
-                      </a:r>
-                      <a:endParaRPr sz="1350" u="none" cap="none" strike="noStrike"/>
+                        <a:rPr lang="pt-BR" sz="1350"/>
+                        <a:t>Usuário acessa a página de login</a:t>
+                      </a:r>
+                      <a:endParaRPr sz="1350"/>
                     </a:p>
                     <a:p>
                       <a:pPr indent="-317500" lvl="0" marL="457200" marR="0" rtl="0" algn="l">
@@ -29033,26 +29717,13 @@
                           <a:schemeClr val="dk1"/>
                         </a:buClr>
                         <a:buSzPts val="1400"/>
-                        <a:buFont typeface="Arial"/>
                         <a:buAutoNum type="arabicPeriod"/>
                       </a:pPr>
                       <a:r>
-                        <a:rPr lang="pt-BR" sz="1350" u="none" cap="none" strike="noStrike">
-                          <a:solidFill>
-                            <a:schemeClr val="dk1"/>
-                          </a:solidFill>
-                        </a:rPr>
-                        <a:t>Usuário </a:t>
-                      </a:r>
-                      <a:r>
-                        <a:rPr lang="pt-BR" sz="1350" u="none" cap="none" strike="noStrike"/>
-                        <a:t>preenche suas credenciais de acesso (usuário e senha</a:t>
-                      </a:r>
-                      <a:r>
                         <a:rPr lang="pt-BR" sz="1350"/>
-                        <a:t>)</a:t>
-                      </a:r>
-                      <a:endParaRPr sz="1350" u="none" cap="none" strike="noStrike"/>
+                        <a:t>Usuário preenche suas credenciais de acesso no sistema (login e senha)</a:t>
+                      </a:r>
+                      <a:endParaRPr sz="1350"/>
                     </a:p>
                     <a:p>
                       <a:pPr indent="-317500" lvl="0" marL="457200" marR="0" rtl="0" algn="l">
@@ -29069,22 +29740,13 @@
                           <a:schemeClr val="dk1"/>
                         </a:buClr>
                         <a:buSzPts val="1400"/>
-                        <a:buFont typeface="Arial"/>
                         <a:buAutoNum type="arabicPeriod"/>
                       </a:pPr>
                       <a:r>
-                        <a:rPr lang="pt-BR" sz="1350" u="none" cap="none" strike="noStrike">
-                          <a:solidFill>
-                            <a:schemeClr val="dk1"/>
-                          </a:solidFill>
-                        </a:rPr>
-                        <a:t>Usuário </a:t>
-                      </a:r>
-                      <a:r>
-                        <a:rPr lang="pt-BR" sz="1350" u="none" cap="none" strike="noStrike"/>
-                        <a:t>clica em entrar</a:t>
-                      </a:r>
-                      <a:endParaRPr sz="1350" u="none" cap="none" strike="noStrike"/>
+                        <a:rPr lang="pt-BR" sz="1350"/>
+                        <a:t>Usuário clica em “entrar”</a:t>
+                      </a:r>
+                      <a:endParaRPr sz="1350"/>
                     </a:p>
                     <a:p>
                       <a:pPr indent="-317500" lvl="0" marL="457200" marR="0" rtl="0" algn="l">
@@ -29101,14 +29763,13 @@
                           <a:schemeClr val="dk1"/>
                         </a:buClr>
                         <a:buSzPts val="1400"/>
-                        <a:buFont typeface="Arial"/>
                         <a:buAutoNum type="arabicPeriod"/>
                       </a:pPr>
                       <a:r>
-                        <a:rPr lang="pt-BR" sz="1350" u="none" cap="none" strike="noStrike"/>
-                        <a:t>Sistema libera acesso para o usuário</a:t>
-                      </a:r>
-                      <a:endParaRPr sz="1350" u="none" cap="none" strike="noStrike"/>
+                        <a:rPr lang="pt-BR" sz="1350"/>
+                        <a:t>Sistema libera o acesso para o usuário</a:t>
+                      </a:r>
+                      <a:endParaRPr sz="1350"/>
                     </a:p>
                     <a:p>
                       <a:pPr indent="0" lvl="0" marL="457200" marR="0" rtl="0" algn="l">
@@ -29185,16 +29846,113 @@
                           <a:spcPts val="0"/>
                         </a:spcAft>
                         <a:buClr>
-                          <a:schemeClr val="lt1"/>
+                          <a:schemeClr val="dk1"/>
                         </a:buClr>
-                        <a:buSzPts val="1350"/>
+                        <a:buSzPts val="1100"/>
                         <a:buFont typeface="Arial"/>
                         <a:buNone/>
                       </a:pPr>
                       <a:r>
-                        <a:t/>
-                      </a:r>
-                      <a:endParaRPr sz="1350" u="none" cap="none" strike="noStrike"/>
+                        <a:rPr lang="pt-BR" sz="1350"/>
+                        <a:t>5.1 Sistema solicita para o usuário definir uma nova senha</a:t>
+                      </a:r>
+                      <a:endParaRPr sz="1350"/>
+                    </a:p>
+                    <a:p>
+                      <a:pPr indent="0" lvl="0" marL="0" marR="0" rtl="0" algn="l">
+                        <a:lnSpc>
+                          <a:spcPct val="100000"/>
+                        </a:lnSpc>
+                        <a:spcBef>
+                          <a:spcPts val="0"/>
+                        </a:spcBef>
+                        <a:spcAft>
+                          <a:spcPts val="0"/>
+                        </a:spcAft>
+                        <a:buClr>
+                          <a:schemeClr val="dk1"/>
+                        </a:buClr>
+                        <a:buSzPts val="1100"/>
+                        <a:buFont typeface="Arial"/>
+                        <a:buNone/>
+                      </a:pPr>
+                      <a:r>
+                        <a:rPr lang="pt-BR" sz="1350"/>
+                        <a:t>5.1.1 Usuário preenche uma nova senha</a:t>
+                      </a:r>
+                      <a:endParaRPr sz="1350"/>
+                    </a:p>
+                    <a:p>
+                      <a:pPr indent="0" lvl="0" marL="0" marR="0" rtl="0" algn="l">
+                        <a:lnSpc>
+                          <a:spcPct val="100000"/>
+                        </a:lnSpc>
+                        <a:spcBef>
+                          <a:spcPts val="0"/>
+                        </a:spcBef>
+                        <a:spcAft>
+                          <a:spcPts val="0"/>
+                        </a:spcAft>
+                        <a:buClr>
+                          <a:schemeClr val="dk1"/>
+                        </a:buClr>
+                        <a:buSzPts val="1100"/>
+                        <a:buFont typeface="Arial"/>
+                        <a:buNone/>
+                      </a:pPr>
+                      <a:r>
+                        <a:rPr lang="pt-BR" sz="1350"/>
+                        <a:t>5.1.2 Usuário seleciona para salvar</a:t>
+                      </a:r>
+                      <a:endParaRPr sz="1350"/>
+                    </a:p>
+                    <a:p>
+                      <a:pPr indent="0" lvl="0" marL="0" marR="0" rtl="0" algn="l">
+                        <a:lnSpc>
+                          <a:spcPct val="100000"/>
+                        </a:lnSpc>
+                        <a:spcBef>
+                          <a:spcPts val="0"/>
+                        </a:spcBef>
+                        <a:spcAft>
+                          <a:spcPts val="0"/>
+                        </a:spcAft>
+                        <a:buClr>
+                          <a:schemeClr val="dk1"/>
+                        </a:buClr>
+                        <a:buSzPts val="1100"/>
+                        <a:buFont typeface="Arial"/>
+                        <a:buNone/>
+                      </a:pPr>
+                      <a:r>
+                        <a:rPr lang="pt-BR" sz="1350"/>
+                        <a:t>5.1.3 Sistema informa que a senha foi atualizada com sucesso</a:t>
+                      </a:r>
+                      <a:endParaRPr sz="1350"/>
+                    </a:p>
+                    <a:p>
+                      <a:pPr indent="0" lvl="0" marL="0" marR="0" rtl="0" algn="l">
+                        <a:lnSpc>
+                          <a:spcPct val="100000"/>
+                        </a:lnSpc>
+                        <a:spcBef>
+                          <a:spcPts val="0"/>
+                        </a:spcBef>
+                        <a:spcAft>
+                          <a:spcPts val="0"/>
+                        </a:spcAft>
+                        <a:buClr>
+                          <a:schemeClr val="dk1"/>
+                        </a:buClr>
+                        <a:buSzPts val="1100"/>
+                        <a:buFont typeface="Arial"/>
+                        <a:buNone/>
+                      </a:pPr>
+                      <a:r>
+                        <a:rPr lang="pt-BR" sz="1350"/>
+                        <a:t>5.1.4 Sistema libera o acesso para o usuário</a:t>
+                      </a:r>
+                      <a:endParaRPr sz="1350"/>
                     </a:p>
                   </a:txBody>
                   <a:tcPr marT="91425" marB="91425" marR="91425" marL="91425"/>
@@ -29304,7 +30062,7 @@
             <a:tbl>
               <a:tblPr>
                 <a:noFill/>
-                <a:tableStyleId>{2FBA5331-9FB4-4AE7-B17D-9EC093DBF87E}</a:tableStyleId>
+                <a:tableStyleId>{50B2C5D1-D99D-4A31-A7E5-88A7BF6D1CC2}</a:tableStyleId>
               </a:tblPr>
               <a:tblGrid>
                 <a:gridCol w="2049100"/>
@@ -29365,8 +30123,8 @@
                         <a:buNone/>
                       </a:pPr>
                       <a:r>
-                        <a:rPr lang="pt-BR" sz="1350" u="none" cap="none" strike="noStrike"/>
-                        <a:t>UC2 - Cadastrar produto no sistema</a:t>
+                        <a:rPr lang="pt-BR" sz="1350"/>
+                        <a:t>UC2 - Cadastrar novo usuário</a:t>
                       </a:r>
                       <a:endParaRPr sz="1350" u="none" cap="none" strike="noStrike"/>
                     </a:p>
@@ -29494,8 +30252,8 @@
                         <a:buNone/>
                       </a:pPr>
                       <a:r>
-                        <a:rPr lang="pt-BR" sz="1350" u="none" cap="none" strike="noStrike"/>
-                        <a:t>O administrador deseja cadastrar no sistema os produtos disponíveis em seu negócio.</a:t>
+                        <a:rPr lang="pt-BR" sz="1350"/>
+                        <a:t>O administrador deseja cadastrar um novo administrador ou operador de caixa</a:t>
                       </a:r>
                       <a:endParaRPr sz="1350" u="none" cap="none" strike="noStrike"/>
                     </a:p>
@@ -29626,8 +30384,8 @@
                         <a:buNone/>
                       </a:pPr>
                       <a:r>
-                        <a:rPr lang="pt-BR" sz="1350" u="none" cap="none" strike="noStrike"/>
-                        <a:t>Acessar a funcionalidade de cadastro de produtos</a:t>
+                        <a:rPr lang="pt-BR" sz="1350"/>
+                        <a:t>Acessar a funcionalidade de cadastro de usuários no painel do administrador</a:t>
                       </a:r>
                       <a:endParaRPr sz="1350" u="none" cap="none" strike="noStrike"/>
                     </a:p>
@@ -29690,7 +30448,7 @@
                         <a:buNone/>
                       </a:pPr>
                       <a:r>
-                        <a:rPr lang="pt-BR" sz="1350" u="none" cap="none" strike="noStrike"/>
+                        <a:rPr lang="pt-BR" sz="1350"/>
                         <a:t>Administrador autenticado no sistema</a:t>
                       </a:r>
                       <a:endParaRPr sz="1350" u="none" cap="none" strike="noStrike"/>
@@ -29754,8 +30512,8 @@
                         <a:buNone/>
                       </a:pPr>
                       <a:r>
-                        <a:rPr lang="pt-BR" sz="1350" u="none" cap="none" strike="noStrike"/>
-                        <a:t>Produto cadastrado no sistema</a:t>
+                        <a:rPr lang="pt-BR" sz="1350"/>
+                        <a:t>Novo usuário cadastrado no sistema</a:t>
                       </a:r>
                       <a:endParaRPr sz="1350" u="none" cap="none" strike="noStrike"/>
                     </a:p>
@@ -29807,7 +30565,7 @@
             <a:tbl>
               <a:tblPr>
                 <a:noFill/>
-                <a:tableStyleId>{2FBA5331-9FB4-4AE7-B17D-9EC093DBF87E}</a:tableStyleId>
+                <a:tableStyleId>{50B2C5D1-D99D-4A31-A7E5-88A7BF6D1CC2}</a:tableStyleId>
               </a:tblPr>
               <a:tblGrid>
                 <a:gridCol w="2040875"/>
@@ -29864,14 +30622,13 @@
                           <a:schemeClr val="dk1"/>
                         </a:buClr>
                         <a:buSzPts val="1400"/>
-                        <a:buFont typeface="Arial"/>
                         <a:buAutoNum type="arabicPeriod"/>
                       </a:pPr>
                       <a:r>
-                        <a:rPr lang="pt-BR" sz="1350" u="none" cap="none" strike="noStrike"/>
-                        <a:t>Administrador acessa a área de cadastro de produtos</a:t>
-                      </a:r>
-                      <a:endParaRPr sz="1350" u="none" cap="none" strike="noStrike"/>
+                        <a:rPr lang="pt-BR" sz="1350"/>
+                        <a:t>Administrador acessa a área de controle de usuários em seu painel</a:t>
+                      </a:r>
+                      <a:endParaRPr sz="1350"/>
                     </a:p>
                     <a:p>
                       <a:pPr indent="-317500" lvl="0" marL="457200" marR="0" rtl="0" algn="l">
@@ -29888,14 +30645,13 @@
                           <a:schemeClr val="dk1"/>
                         </a:buClr>
                         <a:buSzPts val="1400"/>
-                        <a:buFont typeface="Arial"/>
                         <a:buAutoNum type="arabicPeriod"/>
                       </a:pPr>
                       <a:r>
-                        <a:rPr lang="pt-BR" sz="1350" u="none" cap="none" strike="noStrike"/>
-                        <a:t>Administrador seleciona para cadastrar um novo produto</a:t>
-                      </a:r>
-                      <a:endParaRPr sz="1350" u="none" cap="none" strike="noStrike"/>
+                        <a:rPr lang="pt-BR" sz="1350"/>
+                        <a:t>Administrador seleciona para cadastrar um novo usuário</a:t>
+                      </a:r>
+                      <a:endParaRPr sz="1350"/>
                     </a:p>
                     <a:p>
                       <a:pPr indent="-317500" lvl="0" marL="457200" marR="0" rtl="0" algn="l">
@@ -29912,18 +30668,13 @@
                           <a:schemeClr val="dk1"/>
                         </a:buClr>
                         <a:buSzPts val="1400"/>
-                        <a:buFont typeface="Arial"/>
                         <a:buAutoNum type="arabicPeriod"/>
                       </a:pPr>
                       <a:r>
-                        <a:rPr lang="pt-BR" sz="1350" u="none" cap="none" strike="noStrike"/>
-                        <a:t>Administrador preenche </a:t>
-                      </a:r>
-                      <a:r>
                         <a:rPr lang="pt-BR" sz="1350"/>
-                        <a:t>o código de barras, nome, preço e quantidade do produto</a:t>
-                      </a:r>
-                      <a:endParaRPr sz="1350" u="none" cap="none" strike="noStrike"/>
+                        <a:t>Administrador preenche o nome e matrícula do usuário</a:t>
+                      </a:r>
+                      <a:endParaRPr sz="1350"/>
                     </a:p>
                     <a:p>
                       <a:pPr indent="-317500" lvl="0" marL="457200" marR="0" rtl="0" algn="l">
@@ -29940,14 +30691,13 @@
                           <a:schemeClr val="dk1"/>
                         </a:buClr>
                         <a:buSzPts val="1400"/>
-                        <a:buFont typeface="Arial"/>
                         <a:buAutoNum type="arabicPeriod"/>
                       </a:pPr>
                       <a:r>
-                        <a:rPr lang="pt-BR" sz="1350" u="none" cap="none" strike="noStrike"/>
-                        <a:t>Administrador salva o produto preenchido </a:t>
-                      </a:r>
-                      <a:endParaRPr sz="1350" u="none" cap="none" strike="noStrike"/>
+                        <a:rPr lang="pt-BR" sz="1350"/>
+                        <a:t>Administrador seleciona para salvar o novo usuário</a:t>
+                      </a:r>
+                      <a:endParaRPr sz="1350"/>
                     </a:p>
                     <a:p>
                       <a:pPr indent="-317500" lvl="0" marL="457200" marR="0" rtl="0" algn="l">
@@ -29964,14 +30714,105 @@
                           <a:schemeClr val="dk1"/>
                         </a:buClr>
                         <a:buSzPts val="1400"/>
-                        <a:buFont typeface="Arial"/>
                         <a:buAutoNum type="arabicPeriod"/>
                       </a:pPr>
                       <a:r>
-                        <a:rPr lang="pt-BR" sz="1350" u="none" cap="none" strike="noStrike"/>
-                        <a:t>O sistema informa que o cadastro foi realizado com sucesso</a:t>
-                      </a:r>
-                      <a:endParaRPr sz="1350" u="none" cap="none" strike="noStrike"/>
+                        <a:rPr lang="pt-BR" sz="1350"/>
+                        <a:t>Sistema informa que o cadastro foi realizado com sucesso</a:t>
+                      </a:r>
+                      <a:endParaRPr sz="1350"/>
+                    </a:p>
+                    <a:p>
+                      <a:pPr indent="-317500" lvl="0" marL="457200" marR="0" rtl="0" algn="l">
+                        <a:lnSpc>
+                          <a:spcPct val="100000"/>
+                        </a:lnSpc>
+                        <a:spcBef>
+                          <a:spcPts val="0"/>
+                        </a:spcBef>
+                        <a:spcAft>
+                          <a:spcPts val="0"/>
+                        </a:spcAft>
+                        <a:buClr>
+                          <a:schemeClr val="dk1"/>
+                        </a:buClr>
+                        <a:buSzPts val="1400"/>
+                        <a:buAutoNum type="arabicPeriod"/>
+                      </a:pPr>
+                      <a:r>
+                        <a:rPr lang="pt-BR" sz="1350"/>
+                        <a:t>Sistema gera uma senha temporária para que o administrador passe para o novo usuário</a:t>
+                      </a:r>
+                      <a:endParaRPr sz="1350"/>
+                    </a:p>
+                    <a:p>
+                      <a:pPr indent="-317500" lvl="0" marL="457200" marR="0" rtl="0" algn="l">
+                        <a:lnSpc>
+                          <a:spcPct val="100000"/>
+                        </a:lnSpc>
+                        <a:spcBef>
+                          <a:spcPts val="0"/>
+                        </a:spcBef>
+                        <a:spcAft>
+                          <a:spcPts val="0"/>
+                        </a:spcAft>
+                        <a:buClr>
+                          <a:schemeClr val="dk1"/>
+                        </a:buClr>
+                        <a:buSzPts val="1400"/>
+                        <a:buAutoNum type="arabicPeriod"/>
+                      </a:pPr>
+                      <a:r>
+                        <a:rPr lang="pt-BR" sz="1350"/>
+                        <a:t>Administrador seleciona para copiar a senha temporária informada</a:t>
+                      </a:r>
+                      <a:endParaRPr sz="1350"/>
+                    </a:p>
+                    <a:p>
+                      <a:pPr indent="-317500" lvl="0" marL="457200" marR="0" rtl="0" algn="l">
+                        <a:lnSpc>
+                          <a:spcPct val="100000"/>
+                        </a:lnSpc>
+                        <a:spcBef>
+                          <a:spcPts val="0"/>
+                        </a:spcBef>
+                        <a:spcAft>
+                          <a:spcPts val="0"/>
+                        </a:spcAft>
+                        <a:buClr>
+                          <a:schemeClr val="dk1"/>
+                        </a:buClr>
+                        <a:buSzPts val="1400"/>
+                        <a:buAutoNum type="arabicPeriod"/>
+                      </a:pPr>
+                      <a:r>
+                        <a:rPr lang="pt-BR" sz="1350"/>
+                        <a:t>Administrador seleciona para voltar para o painel de controle</a:t>
+                      </a:r>
+                      <a:endParaRPr sz="1350"/>
+                    </a:p>
+                    <a:p>
+                      <a:pPr indent="-317500" lvl="0" marL="457200" marR="0" rtl="0" algn="l">
+                        <a:lnSpc>
+                          <a:spcPct val="100000"/>
+                        </a:lnSpc>
+                        <a:spcBef>
+                          <a:spcPts val="0"/>
+                        </a:spcBef>
+                        <a:spcAft>
+                          <a:spcPts val="0"/>
+                        </a:spcAft>
+                        <a:buClr>
+                          <a:schemeClr val="dk1"/>
+                        </a:buClr>
+                        <a:buSzPts val="1400"/>
+                        <a:buAutoNum type="arabicPeriod"/>
+                      </a:pPr>
+                      <a:r>
+                        <a:rPr lang="pt-BR" sz="1350"/>
+                        <a:t>Sistema retorna para a tela de controle de usuários</a:t>
+                      </a:r>
+                      <a:endParaRPr sz="1350"/>
                     </a:p>
                   </a:txBody>
                   <a:tcPr marT="91425" marB="91425" marR="91425" marL="91425"/>
@@ -30014,7 +30855,7 @@
                     <a:bodyPr/>
                     <a:lstStyle/>
                     <a:p>
-                      <a:pPr indent="0" lvl="0" marL="0" marR="0" rtl="0" algn="l">
+                      <a:pPr indent="0" lvl="0" marL="0" rtl="0" algn="l">
                         <a:lnSpc>
                           <a:spcPct val="100000"/>
                         </a:lnSpc>
@@ -30025,20 +30866,20 @@
                           <a:spcPts val="0"/>
                         </a:spcAft>
                         <a:buClr>
-                          <a:srgbClr val="000000"/>
+                          <a:schemeClr val="dk1"/>
                         </a:buClr>
-                        <a:buSzPts val="1350"/>
+                        <a:buSzPts val="1100"/>
                         <a:buFont typeface="Arial"/>
                         <a:buNone/>
                       </a:pPr>
                       <a:r>
-                        <a:rPr lang="pt-BR" sz="1350" u="none" cap="none" strike="noStrike"/>
-                        <a:t>2.1     O sistema informa que o código do produto que se deseja cadastrar já foi cadastrado previamente</a:t>
-                      </a:r>
-                      <a:endParaRPr sz="1400" u="none" cap="none" strike="noStrike"/>
+                        <a:rPr lang="pt-BR" sz="1350"/>
+                        <a:t>4.1 Sistema informa que já existe um usuário cadastrado com a matrícula informada</a:t>
+                      </a:r>
+                      <a:endParaRPr sz="1350"/>
                     </a:p>
                     <a:p>
-                      <a:pPr indent="0" lvl="0" marL="0" marR="0" rtl="0" algn="l">
+                      <a:pPr indent="0" lvl="0" marL="0" rtl="0" algn="l">
                         <a:lnSpc>
                           <a:spcPct val="100000"/>
                         </a:lnSpc>
@@ -30049,17 +30890,41 @@
                           <a:spcPts val="0"/>
                         </a:spcAft>
                         <a:buClr>
-                          <a:srgbClr val="000000"/>
+                          <a:schemeClr val="dk1"/>
                         </a:buClr>
-                        <a:buSzPts val="1350"/>
+                        <a:buSzPts val="1100"/>
                         <a:buFont typeface="Arial"/>
                         <a:buNone/>
                       </a:pPr>
                       <a:r>
-                        <a:rPr lang="pt-BR" sz="1350" u="none" cap="none" strike="noStrike"/>
-                        <a:t>2.1.1  O administrador cancela o cadastro do produto</a:t>
-                      </a:r>
-                      <a:endParaRPr sz="1400" u="none" cap="none" strike="noStrike"/>
+                        <a:rPr lang="pt-BR" sz="1350"/>
+                        <a:t>4.1.1 Administrador seleciona para cancelar o cadastro</a:t>
+                      </a:r>
+                      <a:endParaRPr sz="1350"/>
+                    </a:p>
+                    <a:p>
+                      <a:pPr indent="0" lvl="0" marL="0" rtl="0" algn="l">
+                        <a:lnSpc>
+                          <a:spcPct val="100000"/>
+                        </a:lnSpc>
+                        <a:spcBef>
+                          <a:spcPts val="0"/>
+                        </a:spcBef>
+                        <a:spcAft>
+                          <a:spcPts val="0"/>
+                        </a:spcAft>
+                        <a:buClr>
+                          <a:schemeClr val="dk1"/>
+                        </a:buClr>
+                        <a:buSzPts val="1100"/>
+                        <a:buFont typeface="Arial"/>
+                        <a:buNone/>
+                      </a:pPr>
+                      <a:r>
+                        <a:rPr lang="pt-BR" sz="1350"/>
+                        <a:t>4.1.2 Sistema retorna para a tela de controle de usuários</a:t>
+                      </a:r>
+                      <a:endParaRPr sz="1350"/>
                     </a:p>
                   </a:txBody>
                   <a:tcPr marT="91425" marB="91425" marR="91425" marL="91425"/>
@@ -30169,7 +31034,7 @@
             <a:tbl>
               <a:tblPr>
                 <a:noFill/>
-                <a:tableStyleId>{2FBA5331-9FB4-4AE7-B17D-9EC093DBF87E}</a:tableStyleId>
+                <a:tableStyleId>{50B2C5D1-D99D-4A31-A7E5-88A7BF6D1CC2}</a:tableStyleId>
               </a:tblPr>
               <a:tblGrid>
                 <a:gridCol w="2049100"/>
@@ -30231,7 +31096,11 @@
                       </a:pPr>
                       <a:r>
                         <a:rPr lang="pt-BR" sz="1350" u="none" cap="none" strike="noStrike"/>
-                        <a:t>UC3 - Editar produto cadastrado</a:t>
+                        <a:t>UC3 - </a:t>
+                      </a:r>
+                      <a:r>
+                        <a:rPr lang="pt-BR" sz="1350"/>
+                        <a:t>Editar usuário cadastrado</a:t>
                       </a:r>
                       <a:endParaRPr sz="1350" u="none" cap="none" strike="noStrike"/>
                     </a:p>
@@ -30358,8 +31227,8 @@
                         <a:buNone/>
                       </a:pPr>
                       <a:r>
-                        <a:rPr lang="pt-BR" sz="1350" u="none" cap="none" strike="noStrike"/>
-                        <a:t>O administrador deseja editar o cadastro de um produto</a:t>
+                        <a:rPr lang="pt-BR" sz="1350"/>
+                        <a:t>O administrador deseja editar o cadastro de um usuário</a:t>
                       </a:r>
                       <a:endParaRPr sz="1350" u="none" cap="none" strike="noStrike"/>
                     </a:p>
@@ -30422,8 +31291,8 @@
                         <a:buNone/>
                       </a:pPr>
                       <a:r>
-                        <a:rPr lang="pt-BR" sz="1350" u="none" cap="none" strike="noStrike"/>
-                        <a:t>UC1</a:t>
+                        <a:rPr lang="pt-BR" sz="1350"/>
+                        <a:t>UC1, UC3</a:t>
                       </a:r>
                       <a:endParaRPr sz="1350" u="none" cap="none" strike="noStrike"/>
                     </a:p>
@@ -30486,8 +31355,8 @@
                         <a:buNone/>
                       </a:pPr>
                       <a:r>
-                        <a:rPr lang="pt-BR" sz="1350" u="none" cap="none" strike="noStrike"/>
-                        <a:t>Acessar a funcionalidade de edição de produto</a:t>
+                        <a:rPr lang="pt-BR" sz="1350"/>
+                        <a:t>Acessar a funcionalidade de edição de usuários no painel do administrador</a:t>
                       </a:r>
                       <a:endParaRPr sz="1350" u="none" cap="none" strike="noStrike"/>
                     </a:p>
@@ -30550,10 +31419,10 @@
                         <a:buNone/>
                       </a:pPr>
                       <a:r>
-                        <a:rPr lang="pt-BR" sz="1350" u="none" cap="none" strike="noStrike"/>
-                        <a:t>Administrador logado no sistema</a:t>
-                      </a:r>
-                      <a:endParaRPr sz="1350" u="none" cap="none" strike="noStrike"/>
+                        <a:rPr lang="pt-BR" sz="1350"/>
+                        <a:t>Administrador autenticado no sistema</a:t>
+                      </a:r>
+                      <a:endParaRPr sz="1350"/>
                     </a:p>
                     <a:p>
                       <a:pPr indent="0" lvl="0" marL="0" marR="0" rtl="0" algn="l">
@@ -30574,8 +31443,8 @@
                         <a:buNone/>
                       </a:pPr>
                       <a:r>
-                        <a:rPr lang="pt-BR" sz="1350" u="none" cap="none" strike="noStrike"/>
-                        <a:t>Produto cadastrado no sistema</a:t>
+                        <a:rPr lang="pt-BR" sz="1350"/>
+                        <a:t>Usuário cadastrado no sistema</a:t>
                       </a:r>
                       <a:endParaRPr sz="1350" u="none" cap="none" strike="noStrike"/>
                     </a:p>
@@ -30638,8 +31507,12 @@
                         <a:buNone/>
                       </a:pPr>
                       <a:r>
+                        <a:rPr lang="pt-BR" sz="1350"/>
+                        <a:t>Usuário </a:t>
+                      </a:r>
+                      <a:r>
                         <a:rPr lang="pt-BR" sz="1350" u="none" cap="none" strike="noStrike"/>
-                        <a:t>Produto editado</a:t>
+                        <a:t>editado</a:t>
                       </a:r>
                       <a:endParaRPr sz="1350" u="none" cap="none" strike="noStrike"/>
                     </a:p>
@@ -30660,6 +31533,285 @@
 </file>
 
 <file path=ppt/theme/theme1.xml><?xml version="1.0" encoding="utf-8"?>
+<a:theme xmlns:a="http://schemas.openxmlformats.org/drawingml/2006/main" xmlns:r="http://schemas.openxmlformats.org/officeDocument/2006/relationships">
+  <a:themeElements>
+    <a:clrScheme name="Default">
+      <a:dk1>
+        <a:srgbClr val="000000"/>
+      </a:dk1>
+      <a:lt1>
+        <a:srgbClr val="FFFFFF"/>
+      </a:lt1>
+      <a:dk2>
+        <a:srgbClr val="158158"/>
+      </a:dk2>
+      <a:lt2>
+        <a:srgbClr val="F3F3F3"/>
+      </a:lt2>
+      <a:accent1>
+        <a:srgbClr val="058DC7"/>
+      </a:accent1>
+      <a:accent2>
+        <a:srgbClr val="50B432"/>
+      </a:accent2>
+      <a:accent3>
+        <a:srgbClr val="ED561B"/>
+      </a:accent3>
+      <a:accent4>
+        <a:srgbClr val="EDEF00"/>
+      </a:accent4>
+      <a:accent5>
+        <a:srgbClr val="24CBE5"/>
+      </a:accent5>
+      <a:accent6>
+        <a:srgbClr val="64E572"/>
+      </a:accent6>
+      <a:hlink>
+        <a:srgbClr val="2200CC"/>
+      </a:hlink>
+      <a:folHlink>
+        <a:srgbClr val="551A8B"/>
+      </a:folHlink>
+    </a:clrScheme>
+    <a:fontScheme name="Office">
+      <a:majorFont>
+        <a:latin typeface="Arial"/>
+        <a:ea typeface=""/>
+        <a:cs typeface=""/>
+        <a:font script="Jpan" typeface="ＭＳ Ｐゴシック"/>
+        <a:font script="Hang" typeface="맑은 고딕"/>
+        <a:font script="Hans" typeface="宋体"/>
+        <a:font script="Hant" typeface="新細明體"/>
+        <a:font script="Arab" typeface="Times New Roman"/>
+        <a:font script="Hebr" typeface="Times New Roman"/>
+        <a:font script="Thai" typeface="Angsana New"/>
+        <a:font script="Ethi" typeface="Nyala"/>
+        <a:font script="Beng" typeface="Vrinda"/>
+        <a:font script="Gujr" typeface="Shruti"/>
+        <a:font script="Khmr" typeface="MoolBoran"/>
+        <a:font script="Knda" typeface="Tunga"/>
+        <a:font script="Guru" typeface="Raavi"/>
+        <a:font script="Cans" typeface="Euphemia"/>
+        <a:font script="Cher" typeface="Plantagenet Cherokee"/>
+        <a:font script="Yiii" typeface="Microsoft Yi Baiti"/>
+        <a:font script="Tibt" typeface="Microsoft Himalaya"/>
+        <a:font script="Thaa" typeface="MV Boli"/>
+        <a:font script="Deva" typeface="Mangal"/>
+        <a:font script="Telu" typeface="Gautami"/>
+        <a:font script="Taml" typeface="Latha"/>
+        <a:font script="Syrc" typeface="Estrangelo Edessa"/>
+        <a:font script="Orya" typeface="Kalinga"/>
+        <a:font script="Mlym" typeface="Kartika"/>
+        <a:font script="Laoo" typeface="DokChampa"/>
+        <a:font script="Sinh" typeface="Iskoola Pota"/>
+        <a:font script="Mong" typeface="Mongolian Baiti"/>
+        <a:font script="Viet" typeface="Times New Roman"/>
+        <a:font script="Uigh" typeface="Microsoft Uighur"/>
+        <a:font script="Geor" typeface="Sylfaen"/>
+      </a:majorFont>
+      <a:minorFont>
+        <a:latin typeface="Arial"/>
+        <a:ea typeface=""/>
+        <a:cs typeface=""/>
+        <a:font script="Jpan" typeface="ＭＳ Ｐゴシック"/>
+        <a:font script="Hang" typeface="맑은 고딕"/>
+        <a:font script="Hans" typeface="宋体"/>
+        <a:font script="Hant" typeface="新細明體"/>
+        <a:font script="Arab" typeface="Arial"/>
+        <a:font script="Hebr" typeface="Arial"/>
+        <a:font script="Thai" typeface="Cordia New"/>
+        <a:font script="Ethi" typeface="Nyala"/>
+        <a:font script="Beng" typeface="Vrinda"/>
+        <a:font script="Gujr" typeface="Shruti"/>
+        <a:font script="Khmr" typeface="DaunPenh"/>
+        <a:font script="Knda" typeface="Tunga"/>
+        <a:font script="Guru" typeface="Raavi"/>
+        <a:font script="Cans" typeface="Euphemia"/>
+        <a:font script="Cher" typeface="Plantagenet Cherokee"/>
+        <a:font script="Yiii" typeface="Microsoft Yi Baiti"/>
+        <a:font script="Tibt" typeface="Microsoft Himalaya"/>
+        <a:font script="Thaa" typeface="MV Boli"/>
+        <a:font script="Deva" typeface="Mangal"/>
+        <a:font script="Telu" typeface="Gautami"/>
+        <a:font script="Taml" typeface="Latha"/>
+        <a:font script="Syrc" typeface="Estrangelo Edessa"/>
+        <a:font script="Orya" typeface="Kalinga"/>
+        <a:font script="Mlym" typeface="Kartika"/>
+        <a:font script="Laoo" typeface="DokChampa"/>
+        <a:font script="Sinh" typeface="Iskoola Pota"/>
+        <a:font script="Mong" typeface="Mongolian Baiti"/>
+        <a:font script="Viet" typeface="Arial"/>
+        <a:font script="Uigh" typeface="Microsoft Uighur"/>
+        <a:font script="Geor" typeface="Sylfaen"/>
+      </a:minorFont>
+    </a:fontScheme>
+    <a:fmtScheme name="Office">
+      <a:fillStyleLst>
+        <a:solidFill>
+          <a:schemeClr val="phClr"/>
+        </a:solidFill>
+        <a:gradFill rotWithShape="1">
+          <a:gsLst>
+            <a:gs pos="0">
+              <a:schemeClr val="phClr">
+                <a:tint val="50000"/>
+                <a:satMod val="300000"/>
+              </a:schemeClr>
+            </a:gs>
+            <a:gs pos="35000">
+              <a:schemeClr val="phClr">
+                <a:tint val="37000"/>
+                <a:satMod val="300000"/>
+              </a:schemeClr>
+            </a:gs>
+            <a:gs pos="100000">
+              <a:schemeClr val="phClr">
+                <a:tint val="15000"/>
+                <a:satMod val="350000"/>
+              </a:schemeClr>
+            </a:gs>
+          </a:gsLst>
+          <a:lin ang="16200000" scaled="1"/>
+        </a:gradFill>
+        <a:gradFill rotWithShape="1">
+          <a:gsLst>
+            <a:gs pos="0">
+              <a:schemeClr val="phClr">
+                <a:tint val="100000"/>
+                <a:shade val="100000"/>
+                <a:satMod val="130000"/>
+              </a:schemeClr>
+            </a:gs>
+            <a:gs pos="100000">
+              <a:schemeClr val="phClr">
+                <a:tint val="50000"/>
+                <a:shade val="100000"/>
+                <a:satMod val="350000"/>
+              </a:schemeClr>
+            </a:gs>
+          </a:gsLst>
+          <a:lin ang="16200000" scaled="0"/>
+        </a:gradFill>
+      </a:fillStyleLst>
+      <a:lnStyleLst>
+        <a:ln w="9525" cap="flat" cmpd="sng" algn="ctr">
+          <a:solidFill>
+            <a:schemeClr val="phClr">
+              <a:shade val="95000"/>
+              <a:satMod val="105000"/>
+            </a:schemeClr>
+          </a:solidFill>
+          <a:prstDash val="solid"/>
+        </a:ln>
+        <a:ln w="25400" cap="flat" cmpd="sng" algn="ctr">
+          <a:solidFill>
+            <a:schemeClr val="phClr"/>
+          </a:solidFill>
+          <a:prstDash val="solid"/>
+        </a:ln>
+        <a:ln w="38100" cap="flat" cmpd="sng" algn="ctr">
+          <a:solidFill>
+            <a:schemeClr val="phClr"/>
+          </a:solidFill>
+          <a:prstDash val="solid"/>
+        </a:ln>
+      </a:lnStyleLst>
+      <a:effectStyleLst>
+        <a:effectStyle>
+          <a:effectLst>
+            <a:outerShdw blurRad="40000" dist="20000" dir="5400000" rotWithShape="0">
+              <a:srgbClr val="000000">
+                <a:alpha val="38000"/>
+              </a:srgbClr>
+            </a:outerShdw>
+          </a:effectLst>
+        </a:effectStyle>
+        <a:effectStyle>
+          <a:effectLst>
+            <a:outerShdw blurRad="40000" dist="23000" dir="5400000" rotWithShape="0">
+              <a:srgbClr val="000000">
+                <a:alpha val="35000"/>
+              </a:srgbClr>
+            </a:outerShdw>
+          </a:effectLst>
+        </a:effectStyle>
+        <a:effectStyle>
+          <a:effectLst>
+            <a:outerShdw blurRad="40000" dist="23000" dir="5400000" rotWithShape="0">
+              <a:srgbClr val="000000">
+                <a:alpha val="35000"/>
+              </a:srgbClr>
+            </a:outerShdw>
+          </a:effectLst>
+          <a:scene3d>
+            <a:camera prst="orthographicFront">
+              <a:rot lat="0" lon="0" rev="0"/>
+            </a:camera>
+            <a:lightRig rig="threePt" dir="t">
+              <a:rot lat="0" lon="0" rev="1200000"/>
+            </a:lightRig>
+          </a:scene3d>
+          <a:sp3d>
+            <a:bevelT w="63500" h="25400"/>
+          </a:sp3d>
+        </a:effectStyle>
+      </a:effectStyleLst>
+      <a:bgFillStyleLst>
+        <a:solidFill>
+          <a:schemeClr val="phClr"/>
+        </a:solidFill>
+        <a:gradFill rotWithShape="1">
+          <a:gsLst>
+            <a:gs pos="0">
+              <a:schemeClr val="phClr">
+                <a:tint val="40000"/>
+                <a:satMod val="350000"/>
+              </a:schemeClr>
+            </a:gs>
+            <a:gs pos="40000">
+              <a:schemeClr val="phClr">
+                <a:tint val="45000"/>
+                <a:shade val="99000"/>
+                <a:satMod val="350000"/>
+              </a:schemeClr>
+            </a:gs>
+            <a:gs pos="100000">
+              <a:schemeClr val="phClr">
+                <a:shade val="20000"/>
+                <a:satMod val="255000"/>
+              </a:schemeClr>
+            </a:gs>
+          </a:gsLst>
+          <a:path path="circle">
+            <a:fillToRect l="50000" t="-80000" r="50000" b="180000"/>
+          </a:path>
+        </a:gradFill>
+        <a:gradFill rotWithShape="1">
+          <a:gsLst>
+            <a:gs pos="0">
+              <a:schemeClr val="phClr">
+                <a:tint val="80000"/>
+                <a:satMod val="300000"/>
+              </a:schemeClr>
+            </a:gs>
+            <a:gs pos="100000">
+              <a:schemeClr val="phClr">
+                <a:shade val="30000"/>
+                <a:satMod val="200000"/>
+              </a:schemeClr>
+            </a:gs>
+          </a:gsLst>
+          <a:path path="circle">
+            <a:fillToRect l="50000" t="50000" r="50000" b="50000"/>
+          </a:path>
+        </a:gradFill>
+      </a:bgFillStyleLst>
+    </a:fmtScheme>
+  </a:themeElements>
+</a:theme>
+</file>
+
+<file path=ppt/theme/theme2.xml><?xml version="1.0" encoding="utf-8"?>
 <a:theme xmlns:a="http://schemas.openxmlformats.org/drawingml/2006/main" xmlns:r="http://schemas.openxmlformats.org/officeDocument/2006/relationships" name="Madison">
   <a:themeElements>
     <a:clrScheme name="Madison">
@@ -30936,283 +32088,4 @@
     </a:fmtScheme>
   </a:themeElements>
 </a:theme>
-</file>
-
-<file path=ppt/theme/theme2.xml><?xml version="1.0" encoding="utf-8"?>
-<a:theme xmlns:a="http://schemas.openxmlformats.org/drawingml/2006/main" xmlns:r="http://schemas.openxmlformats.org/officeDocument/2006/relationships">
-  <a:themeElements>
-    <a:clrScheme name="Default">
-      <a:dk1>
-        <a:srgbClr val="000000"/>
-      </a:dk1>
-      <a:lt1>
-        <a:srgbClr val="FFFFFF"/>
-      </a:lt1>
-      <a:dk2>
-        <a:srgbClr val="158158"/>
-      </a:dk2>
-      <a:lt2>
-        <a:srgbClr val="F3F3F3"/>
-      </a:lt2>
-      <a:accent1>
-        <a:srgbClr val="058DC7"/>
-      </a:accent1>
-      <a:accent2>
-        <a:srgbClr val="50B432"/>
-      </a:accent2>
-      <a:accent3>
-        <a:srgbClr val="ED561B"/>
-      </a:accent3>
-      <a:accent4>
-        <a:srgbClr val="EDEF00"/>
-      </a:accent4>
-      <a:accent5>
-        <a:srgbClr val="24CBE5"/>
-      </a:accent5>
-      <a:accent6>
-        <a:srgbClr val="64E572"/>
-      </a:accent6>
-      <a:hlink>
-        <a:srgbClr val="2200CC"/>
-      </a:hlink>
-      <a:folHlink>
-        <a:srgbClr val="551A8B"/>
-      </a:folHlink>
-    </a:clrScheme>
-    <a:fontScheme name="Office">
-      <a:majorFont>
-        <a:latin typeface="Arial"/>
-        <a:ea typeface=""/>
-        <a:cs typeface=""/>
-        <a:font script="Jpan" typeface="ＭＳ Ｐゴシック"/>
-        <a:font script="Hang" typeface="맑은 고딕"/>
-        <a:font script="Hans" typeface="宋体"/>
-        <a:font script="Hant" typeface="新細明體"/>
-        <a:font script="Arab" typeface="Times New Roman"/>
-        <a:font script="Hebr" typeface="Times New Roman"/>
-        <a:font script="Thai" typeface="Angsana New"/>
-        <a:font script="Ethi" typeface="Nyala"/>
-        <a:font script="Beng" typeface="Vrinda"/>
-        <a:font script="Gujr" typeface="Shruti"/>
-        <a:font script="Khmr" typeface="MoolBoran"/>
-        <a:font script="Knda" typeface="Tunga"/>
-        <a:font script="Guru" typeface="Raavi"/>
-        <a:font script="Cans" typeface="Euphemia"/>
-        <a:font script="Cher" typeface="Plantagenet Cherokee"/>
-        <a:font script="Yiii" typeface="Microsoft Yi Baiti"/>
-        <a:font script="Tibt" typeface="Microsoft Himalaya"/>
-        <a:font script="Thaa" typeface="MV Boli"/>
-        <a:font script="Deva" typeface="Mangal"/>
-        <a:font script="Telu" typeface="Gautami"/>
-        <a:font script="Taml" typeface="Latha"/>
-        <a:font script="Syrc" typeface="Estrangelo Edessa"/>
-        <a:font script="Orya" typeface="Kalinga"/>
-        <a:font script="Mlym" typeface="Kartika"/>
-        <a:font script="Laoo" typeface="DokChampa"/>
-        <a:font script="Sinh" typeface="Iskoola Pota"/>
-        <a:font script="Mong" typeface="Mongolian Baiti"/>
-        <a:font script="Viet" typeface="Times New Roman"/>
-        <a:font script="Uigh" typeface="Microsoft Uighur"/>
-        <a:font script="Geor" typeface="Sylfaen"/>
-      </a:majorFont>
-      <a:minorFont>
-        <a:latin typeface="Arial"/>
-        <a:ea typeface=""/>
-        <a:cs typeface=""/>
-        <a:font script="Jpan" typeface="ＭＳ Ｐゴシック"/>
-        <a:font script="Hang" typeface="맑은 고딕"/>
-        <a:font script="Hans" typeface="宋体"/>
-        <a:font script="Hant" typeface="新細明體"/>
-        <a:font script="Arab" typeface="Arial"/>
-        <a:font script="Hebr" typeface="Arial"/>
-        <a:font script="Thai" typeface="Cordia New"/>
-        <a:font script="Ethi" typeface="Nyala"/>
-        <a:font script="Beng" typeface="Vrinda"/>
-        <a:font script="Gujr" typeface="Shruti"/>
-        <a:font script="Khmr" typeface="DaunPenh"/>
-        <a:font script="Knda" typeface="Tunga"/>
-        <a:font script="Guru" typeface="Raavi"/>
-        <a:font script="Cans" typeface="Euphemia"/>
-        <a:font script="Cher" typeface="Plantagenet Cherokee"/>
-        <a:font script="Yiii" typeface="Microsoft Yi Baiti"/>
-        <a:font script="Tibt" typeface="Microsoft Himalaya"/>
-        <a:font script="Thaa" typeface="MV Boli"/>
-        <a:font script="Deva" typeface="Mangal"/>
-        <a:font script="Telu" typeface="Gautami"/>
-        <a:font script="Taml" typeface="Latha"/>
-        <a:font script="Syrc" typeface="Estrangelo Edessa"/>
-        <a:font script="Orya" typeface="Kalinga"/>
-        <a:font script="Mlym" typeface="Kartika"/>
-        <a:font script="Laoo" typeface="DokChampa"/>
-        <a:font script="Sinh" typeface="Iskoola Pota"/>
-        <a:font script="Mong" typeface="Mongolian Baiti"/>
-        <a:font script="Viet" typeface="Arial"/>
-        <a:font script="Uigh" typeface="Microsoft Uighur"/>
-        <a:font script="Geor" typeface="Sylfaen"/>
-      </a:minorFont>
-    </a:fontScheme>
-    <a:fmtScheme name="Office">
-      <a:fillStyleLst>
-        <a:solidFill>
-          <a:schemeClr val="phClr"/>
-        </a:solidFill>
-        <a:gradFill rotWithShape="1">
-          <a:gsLst>
-            <a:gs pos="0">
-              <a:schemeClr val="phClr">
-                <a:tint val="50000"/>
-                <a:satMod val="300000"/>
-              </a:schemeClr>
-            </a:gs>
-            <a:gs pos="35000">
-              <a:schemeClr val="phClr">
-                <a:tint val="37000"/>
-                <a:satMod val="300000"/>
-              </a:schemeClr>
-            </a:gs>
-            <a:gs pos="100000">
-              <a:schemeClr val="phClr">
-                <a:tint val="15000"/>
-                <a:satMod val="350000"/>
-              </a:schemeClr>
-            </a:gs>
-          </a:gsLst>
-          <a:lin ang="16200000" scaled="1"/>
-        </a:gradFill>
-        <a:gradFill rotWithShape="1">
-          <a:gsLst>
-            <a:gs pos="0">
-              <a:schemeClr val="phClr">
-                <a:tint val="100000"/>
-                <a:shade val="100000"/>
-                <a:satMod val="130000"/>
-              </a:schemeClr>
-            </a:gs>
-            <a:gs pos="100000">
-              <a:schemeClr val="phClr">
-                <a:tint val="50000"/>
-                <a:shade val="100000"/>
-                <a:satMod val="350000"/>
-              </a:schemeClr>
-            </a:gs>
-          </a:gsLst>
-          <a:lin ang="16200000" scaled="0"/>
-        </a:gradFill>
-      </a:fillStyleLst>
-      <a:lnStyleLst>
-        <a:ln w="9525" cap="flat" cmpd="sng" algn="ctr">
-          <a:solidFill>
-            <a:schemeClr val="phClr">
-              <a:shade val="95000"/>
-              <a:satMod val="105000"/>
-            </a:schemeClr>
-          </a:solidFill>
-          <a:prstDash val="solid"/>
-        </a:ln>
-        <a:ln w="25400" cap="flat" cmpd="sng" algn="ctr">
-          <a:solidFill>
-            <a:schemeClr val="phClr"/>
-          </a:solidFill>
-          <a:prstDash val="solid"/>
-        </a:ln>
-        <a:ln w="38100" cap="flat" cmpd="sng" algn="ctr">
-          <a:solidFill>
-            <a:schemeClr val="phClr"/>
-          </a:solidFill>
-          <a:prstDash val="solid"/>
-        </a:ln>
-      </a:lnStyleLst>
-      <a:effectStyleLst>
-        <a:effectStyle>
-          <a:effectLst>
-            <a:outerShdw blurRad="40000" dist="20000" dir="5400000" rotWithShape="0">
-              <a:srgbClr val="000000">
-                <a:alpha val="38000"/>
-              </a:srgbClr>
-            </a:outerShdw>
-          </a:effectLst>
-        </a:effectStyle>
-        <a:effectStyle>
-          <a:effectLst>
-            <a:outerShdw blurRad="40000" dist="23000" dir="5400000" rotWithShape="0">
-              <a:srgbClr val="000000">
-                <a:alpha val="35000"/>
-              </a:srgbClr>
-            </a:outerShdw>
-          </a:effectLst>
-        </a:effectStyle>
-        <a:effectStyle>
-          <a:effectLst>
-            <a:outerShdw blurRad="40000" dist="23000" dir="5400000" rotWithShape="0">
-              <a:srgbClr val="000000">
-                <a:alpha val="35000"/>
-              </a:srgbClr>
-            </a:outerShdw>
-          </a:effectLst>
-          <a:scene3d>
-            <a:camera prst="orthographicFront">
-              <a:rot lat="0" lon="0" rev="0"/>
-            </a:camera>
-            <a:lightRig rig="threePt" dir="t">
-              <a:rot lat="0" lon="0" rev="1200000"/>
-            </a:lightRig>
-          </a:scene3d>
-          <a:sp3d>
-            <a:bevelT w="63500" h="25400"/>
-          </a:sp3d>
-        </a:effectStyle>
-      </a:effectStyleLst>
-      <a:bgFillStyleLst>
-        <a:solidFill>
-          <a:schemeClr val="phClr"/>
-        </a:solidFill>
-        <a:gradFill rotWithShape="1">
-          <a:gsLst>
-            <a:gs pos="0">
-              <a:schemeClr val="phClr">
-                <a:tint val="40000"/>
-                <a:satMod val="350000"/>
-              </a:schemeClr>
-            </a:gs>
-            <a:gs pos="40000">
-              <a:schemeClr val="phClr">
-                <a:tint val="45000"/>
-                <a:shade val="99000"/>
-                <a:satMod val="350000"/>
-              </a:schemeClr>
-            </a:gs>
-            <a:gs pos="100000">
-              <a:schemeClr val="phClr">
-                <a:shade val="20000"/>
-                <a:satMod val="255000"/>
-              </a:schemeClr>
-            </a:gs>
-          </a:gsLst>
-          <a:path path="circle">
-            <a:fillToRect l="50000" t="-80000" r="50000" b="180000"/>
-          </a:path>
-        </a:gradFill>
-        <a:gradFill rotWithShape="1">
-          <a:gsLst>
-            <a:gs pos="0">
-              <a:schemeClr val="phClr">
-                <a:tint val="80000"/>
-                <a:satMod val="300000"/>
-              </a:schemeClr>
-            </a:gs>
-            <a:gs pos="100000">
-              <a:schemeClr val="phClr">
-                <a:shade val="30000"/>
-                <a:satMod val="200000"/>
-              </a:schemeClr>
-            </a:gs>
-          </a:gsLst>
-          <a:path path="circle">
-            <a:fillToRect l="50000" t="50000" r="50000" b="50000"/>
-          </a:path>
-        </a:gradFill>
-      </a:bgFillStyleLst>
-    </a:fmtScheme>
-  </a:themeElements>
-</a:theme>
 </file>
</xml_diff>